<commit_message>
Updated powerpoint with new benchmark scores
</commit_message>
<xml_diff>
--- a/Introduction to Julia.pptx
+++ b/Introduction to Julia.pptx
@@ -5,27 +5,29 @@
     <p:sldMasterId id="2147483660" r:id="rId4"/>
   </p:sldMasterIdLst>
   <p:notesMasterIdLst>
-    <p:notesMasterId r:id="rId20"/>
+    <p:notesMasterId r:id="rId22"/>
   </p:notesMasterIdLst>
   <p:handoutMasterIdLst>
-    <p:handoutMasterId r:id="rId21"/>
+    <p:handoutMasterId r:id="rId23"/>
   </p:handoutMasterIdLst>
   <p:sldIdLst>
     <p:sldId id="257" r:id="rId5"/>
     <p:sldId id="268" r:id="rId6"/>
     <p:sldId id="272" r:id="rId7"/>
     <p:sldId id="273" r:id="rId8"/>
-    <p:sldId id="284" r:id="rId9"/>
-    <p:sldId id="267" r:id="rId10"/>
-    <p:sldId id="274" r:id="rId11"/>
-    <p:sldId id="279" r:id="rId12"/>
-    <p:sldId id="280" r:id="rId13"/>
-    <p:sldId id="281" r:id="rId14"/>
-    <p:sldId id="282" r:id="rId15"/>
-    <p:sldId id="283" r:id="rId16"/>
-    <p:sldId id="275" r:id="rId17"/>
-    <p:sldId id="276" r:id="rId18"/>
-    <p:sldId id="278" r:id="rId19"/>
+    <p:sldId id="267" r:id="rId9"/>
+    <p:sldId id="274" r:id="rId10"/>
+    <p:sldId id="279" r:id="rId11"/>
+    <p:sldId id="280" r:id="rId12"/>
+    <p:sldId id="281" r:id="rId13"/>
+    <p:sldId id="285" r:id="rId14"/>
+    <p:sldId id="286" r:id="rId15"/>
+    <p:sldId id="287" r:id="rId16"/>
+    <p:sldId id="288" r:id="rId17"/>
+    <p:sldId id="289" r:id="rId18"/>
+    <p:sldId id="275" r:id="rId19"/>
+    <p:sldId id="276" r:id="rId20"/>
+    <p:sldId id="284" r:id="rId21"/>
   </p:sldIdLst>
   <p:sldSz cx="12188825" cy="6858000"/>
   <p:notesSz cx="6858000" cy="9144000"/>
@@ -5232,7 +5234,7 @@
           <p:cNvPr id="2" name="Title 1">
             <a:extLst>
               <a:ext uri="{FF2B5EF4-FFF2-40B4-BE49-F238E27FC236}">
-                <a16:creationId xmlns:a16="http://schemas.microsoft.com/office/drawing/2014/main" id="{FB63C181-98E7-4318-849D-41C99B0D9267}"/>
+                <a16:creationId xmlns:a16="http://schemas.microsoft.com/office/drawing/2014/main" id="{9137CA74-7E3A-4855-96B6-F63E0A72FC8B}"/>
               </a:ext>
             </a:extLst>
           </p:cNvPr>
@@ -5243,29 +5245,86 @@
             <p:ph type="title"/>
           </p:nvPr>
         </p:nvSpPr>
+        <p:spPr/>
+        <p:txBody>
+          <a:bodyPr/>
+          <a:lstStyle/>
+          <a:p>
+            <a:r>
+              <a:rPr lang="en-GB" dirty="0"/>
+              <a:t>Interesting language features</a:t>
+            </a:r>
+          </a:p>
+        </p:txBody>
+      </p:sp>
+      <p:sp>
+        <p:nvSpPr>
+          <p:cNvPr id="3" name="Content Placeholder 2">
+            <a:extLst>
+              <a:ext uri="{FF2B5EF4-FFF2-40B4-BE49-F238E27FC236}">
+                <a16:creationId xmlns:a16="http://schemas.microsoft.com/office/drawing/2014/main" id="{B1547461-01DA-44D3-987E-D5B9BDFE0475}"/>
+              </a:ext>
+            </a:extLst>
+          </p:cNvPr>
+          <p:cNvSpPr>
+            <a:spLocks noGrp="1"/>
+          </p:cNvSpPr>
+          <p:nvPr>
+            <p:ph idx="1"/>
+          </p:nvPr>
+        </p:nvSpPr>
+        <p:spPr/>
+        <p:txBody>
+          <a:bodyPr/>
+          <a:lstStyle/>
+          <a:p>
+            <a:pPr marL="0" indent="0">
+              <a:buNone/>
+            </a:pPr>
+            <a:r>
+              <a:rPr lang="en-GB" sz="2400" dirty="0"/>
+              <a:t>Full support for Unicode:</a:t>
+            </a:r>
+          </a:p>
+          <a:p>
+            <a:endParaRPr lang="en-GB" dirty="0"/>
+          </a:p>
+        </p:txBody>
+      </p:sp>
+      <p:pic>
+        <p:nvPicPr>
+          <p:cNvPr id="9" name="Picture 8">
+            <a:extLst>
+              <a:ext uri="{FF2B5EF4-FFF2-40B4-BE49-F238E27FC236}">
+                <a16:creationId xmlns:a16="http://schemas.microsoft.com/office/drawing/2014/main" id="{8BB1774B-0AE0-4E2A-A937-9EC5B123FCBA}"/>
+              </a:ext>
+            </a:extLst>
+          </p:cNvPr>
+          <p:cNvPicPr>
+            <a:picLocks noChangeAspect="1"/>
+          </p:cNvPicPr>
+          <p:nvPr/>
+        </p:nvPicPr>
+        <p:blipFill>
+          <a:blip r:embed="rId2"/>
+          <a:stretch>
+            <a:fillRect/>
+          </a:stretch>
+        </p:blipFill>
         <p:spPr>
           <a:xfrm>
-            <a:off x="4006180" y="2780928"/>
-            <a:ext cx="3744416" cy="1165944"/>
+            <a:off x="1335702" y="2420888"/>
+            <a:ext cx="10126861" cy="3509308"/>
           </a:xfrm>
+          <a:prstGeom prst="rect">
+            <a:avLst/>
+          </a:prstGeom>
         </p:spPr>
-        <p:txBody>
-          <a:bodyPr>
-            <a:normAutofit/>
-          </a:bodyPr>
-          <a:lstStyle/>
-          <a:p>
-            <a:r>
-              <a:rPr lang="en-GB" sz="7200" dirty="0"/>
-              <a:t>So what?</a:t>
-            </a:r>
-          </a:p>
-        </p:txBody>
-      </p:sp>
+      </p:pic>
     </p:spTree>
     <p:extLst>
       <p:ext uri="{BB962C8B-B14F-4D97-AF65-F5344CB8AC3E}">
-        <p14:creationId xmlns:p14="http://schemas.microsoft.com/office/powerpoint/2010/main" val="1631259258"/>
+        <p14:creationId xmlns:p14="http://schemas.microsoft.com/office/powerpoint/2010/main" val="843324884"/>
       </p:ext>
     </p:extLst>
   </p:cSld>
@@ -5309,7 +5368,7 @@
           <p:cNvPr id="2" name="Title 1">
             <a:extLst>
               <a:ext uri="{FF2B5EF4-FFF2-40B4-BE49-F238E27FC236}">
-                <a16:creationId xmlns:a16="http://schemas.microsoft.com/office/drawing/2014/main" id="{92CB66BB-3142-4B2B-8807-CEE90F9CA206}"/>
+                <a16:creationId xmlns:a16="http://schemas.microsoft.com/office/drawing/2014/main" id="{9137CA74-7E3A-4855-96B6-F63E0A72FC8B}"/>
               </a:ext>
             </a:extLst>
           </p:cNvPr>
@@ -5327,7 +5386,7 @@
           <a:p>
             <a:r>
               <a:rPr lang="en-GB" dirty="0"/>
-              <a:t>Interesting reasons to try Julia</a:t>
+              <a:t>Interesting language features</a:t>
             </a:r>
           </a:p>
         </p:txBody>
@@ -5337,7 +5396,7 @@
           <p:cNvPr id="3" name="Content Placeholder 2">
             <a:extLst>
               <a:ext uri="{FF2B5EF4-FFF2-40B4-BE49-F238E27FC236}">
-                <a16:creationId xmlns:a16="http://schemas.microsoft.com/office/drawing/2014/main" id="{A737869E-645D-4FFB-9CD9-E032C297CC25}"/>
+                <a16:creationId xmlns:a16="http://schemas.microsoft.com/office/drawing/2014/main" id="{B1547461-01DA-44D3-987E-D5B9BDFE0475}"/>
               </a:ext>
             </a:extLst>
           </p:cNvPr>
@@ -5353,60 +5412,104 @@
           <a:bodyPr/>
           <a:lstStyle/>
           <a:p>
-            <a:r>
-              <a:rPr lang="en-GB" dirty="0"/>
-              <a:t>Has generic code that works across packages</a:t>
-            </a:r>
-          </a:p>
-          <a:p>
-            <a:r>
-              <a:rPr lang="en-GB" dirty="0"/>
-              <a:t>Designed from the ground up for numerical computing</a:t>
-            </a:r>
-          </a:p>
-          <a:p>
-            <a:r>
-              <a:rPr lang="en-GB" dirty="0"/>
-              <a:t>Linear-algebra is implemented natively.</a:t>
-            </a:r>
-          </a:p>
-          <a:p>
-            <a:r>
-              <a:rPr lang="en-GB" dirty="0"/>
-              <a:t>Full Unicode support – write your functions as native equations!</a:t>
-            </a:r>
-          </a:p>
-          <a:p>
-            <a:r>
-              <a:rPr lang="en-GB" dirty="0"/>
-              <a:t>Full support for metaprogramming – code that writes code.</a:t>
-            </a:r>
-          </a:p>
-          <a:p>
-            <a:r>
-              <a:rPr lang="en-GB" dirty="0"/>
-              <a:t>Packages are easy to use with a very helpful community.</a:t>
-            </a:r>
-          </a:p>
-        </p:txBody>
-      </p:sp>
+            <a:pPr marL="0" indent="0">
+              <a:buNone/>
+            </a:pPr>
+            <a:r>
+              <a:rPr lang="en-GB" sz="2400" dirty="0"/>
+              <a:t>Native support for linear algebra: (with choice of </a:t>
+            </a:r>
+            <a:r>
+              <a:rPr lang="en-GB" sz="2400" dirty="0" err="1"/>
+              <a:t>OpenBLAS</a:t>
+            </a:r>
+            <a:r>
+              <a:rPr lang="en-GB" sz="2400" dirty="0"/>
+              <a:t> or MKL)</a:t>
+            </a:r>
+          </a:p>
+          <a:p>
+            <a:endParaRPr lang="en-GB" dirty="0"/>
+          </a:p>
+        </p:txBody>
+      </p:sp>
+      <p:pic>
+        <p:nvPicPr>
+          <p:cNvPr id="11" name="Picture 10">
+            <a:extLst>
+              <a:ext uri="{FF2B5EF4-FFF2-40B4-BE49-F238E27FC236}">
+                <a16:creationId xmlns:a16="http://schemas.microsoft.com/office/drawing/2014/main" id="{FD5673B2-BAB3-4533-82FC-656877ACF91F}"/>
+              </a:ext>
+            </a:extLst>
+          </p:cNvPr>
+          <p:cNvPicPr>
+            <a:picLocks noChangeAspect="1"/>
+          </p:cNvPicPr>
+          <p:nvPr/>
+        </p:nvPicPr>
+        <p:blipFill>
+          <a:blip r:embed="rId2"/>
+          <a:stretch>
+            <a:fillRect/>
+          </a:stretch>
+        </p:blipFill>
+        <p:spPr>
+          <a:xfrm>
+            <a:off x="1413892" y="2505125"/>
+            <a:ext cx="3963681" cy="4078238"/>
+          </a:xfrm>
+          <a:prstGeom prst="rect">
+            <a:avLst/>
+          </a:prstGeom>
+        </p:spPr>
+      </p:pic>
+      <p:pic>
+        <p:nvPicPr>
+          <p:cNvPr id="13" name="Picture 12">
+            <a:extLst>
+              <a:ext uri="{FF2B5EF4-FFF2-40B4-BE49-F238E27FC236}">
+                <a16:creationId xmlns:a16="http://schemas.microsoft.com/office/drawing/2014/main" id="{C9310E33-E0D1-4CE1-B1CE-DEED7FAE9E2C}"/>
+              </a:ext>
+            </a:extLst>
+          </p:cNvPr>
+          <p:cNvPicPr>
+            <a:picLocks noChangeAspect="1"/>
+          </p:cNvPicPr>
+          <p:nvPr/>
+        </p:nvPicPr>
+        <p:blipFill>
+          <a:blip r:embed="rId3"/>
+          <a:stretch>
+            <a:fillRect/>
+          </a:stretch>
+        </p:blipFill>
+        <p:spPr>
+          <a:xfrm>
+            <a:off x="8182644" y="2143564"/>
+            <a:ext cx="3165759" cy="4462272"/>
+          </a:xfrm>
+          <a:prstGeom prst="rect">
+            <a:avLst/>
+          </a:prstGeom>
+        </p:spPr>
+      </p:pic>
     </p:spTree>
     <p:extLst>
       <p:ext uri="{BB962C8B-B14F-4D97-AF65-F5344CB8AC3E}">
-        <p14:creationId xmlns:p14="http://schemas.microsoft.com/office/powerpoint/2010/main" val="2355062851"/>
+        <p14:creationId xmlns:p14="http://schemas.microsoft.com/office/powerpoint/2010/main" val="4115416029"/>
       </p:ext>
     </p:extLst>
   </p:cSld>
   <p:clrMapOvr>
     <a:masterClrMapping/>
   </p:clrMapOvr>
-  <mc:AlternateContent xmlns:mc="http://schemas.openxmlformats.org/markup-compatibility/2006" xmlns:p14="http://schemas.microsoft.com/office/powerpoint/2010/main">
-    <mc:Choice Requires="p14">
+  <mc:AlternateContent xmlns:mc="http://schemas.openxmlformats.org/markup-compatibility/2006">
+    <mc:Choice xmlns:p14="http://schemas.microsoft.com/office/powerpoint/2010/main" Requires="p14">
       <p:transition spd="med" p14:dur="700">
         <p:fade/>
       </p:transition>
     </mc:Choice>
-    <mc:Fallback xmlns="">
+    <mc:Fallback>
       <p:transition spd="med">
         <p:fade/>
       </p:transition>
@@ -5437,7 +5540,7 @@
           <p:cNvPr id="2" name="Title 1">
             <a:extLst>
               <a:ext uri="{FF2B5EF4-FFF2-40B4-BE49-F238E27FC236}">
-                <a16:creationId xmlns:a16="http://schemas.microsoft.com/office/drawing/2014/main" id="{76757ED3-EE7B-4837-A3C2-9711F4AC398A}"/>
+                <a16:creationId xmlns:a16="http://schemas.microsoft.com/office/drawing/2014/main" id="{FA2041A0-9C8A-4E5F-84C7-3CF22E0D6A6B}"/>
               </a:ext>
             </a:extLst>
           </p:cNvPr>
@@ -5453,7 +5556,10 @@
           <a:bodyPr/>
           <a:lstStyle/>
           <a:p>
-            <a:endParaRPr lang="en-GB" dirty="0"/>
+            <a:r>
+              <a:rPr lang="en-GB" dirty="0"/>
+              <a:t>Interesting language features</a:t>
+            </a:r>
           </a:p>
         </p:txBody>
       </p:sp>
@@ -5462,7 +5568,7 @@
           <p:cNvPr id="3" name="Content Placeholder 2">
             <a:extLst>
               <a:ext uri="{FF2B5EF4-FFF2-40B4-BE49-F238E27FC236}">
-                <a16:creationId xmlns:a16="http://schemas.microsoft.com/office/drawing/2014/main" id="{747E9C13-D685-481A-B04D-C67D57417808}"/>
+                <a16:creationId xmlns:a16="http://schemas.microsoft.com/office/drawing/2014/main" id="{198FC1E6-F3BD-4557-B065-EC9E819B627E}"/>
               </a:ext>
             </a:extLst>
           </p:cNvPr>
@@ -5478,14 +5584,120 @@
           <a:bodyPr/>
           <a:lstStyle/>
           <a:p>
-            <a:endParaRPr lang="en-GB"/>
+            <a:r>
+              <a:rPr lang="en-GB" dirty="0"/>
+              <a:t>Metaprogramming macros – code that writes code</a:t>
+            </a:r>
+          </a:p>
+          <a:p>
+            <a:r>
+              <a:rPr lang="en-GB" dirty="0">
+                <a:solidFill>
+                  <a:srgbClr val="FFC000"/>
+                </a:solidFill>
+              </a:rPr>
+              <a:t>@simd </a:t>
+            </a:r>
+            <a:r>
+              <a:rPr lang="en-GB" dirty="0"/>
+              <a:t>macro on for loops tells the compiler to write out a for loop in a hardware vectorised format</a:t>
+            </a:r>
+          </a:p>
+          <a:p>
+            <a:r>
+              <a:rPr lang="en-GB" dirty="0" err="1">
+                <a:solidFill>
+                  <a:srgbClr val="FFC000"/>
+                </a:solidFill>
+              </a:rPr>
+              <a:t>Threads.@threads</a:t>
+            </a:r>
+            <a:r>
+              <a:rPr lang="en-GB" dirty="0">
+                <a:solidFill>
+                  <a:srgbClr val="FFC000"/>
+                </a:solidFill>
+              </a:rPr>
+              <a:t> </a:t>
+            </a:r>
+            <a:r>
+              <a:rPr lang="en-GB" dirty="0"/>
+              <a:t>will parallelise your code across multiple threads trivially</a:t>
+            </a:r>
+          </a:p>
+          <a:p>
+            <a:r>
+              <a:rPr lang="en-GB" dirty="0">
+                <a:solidFill>
+                  <a:srgbClr val="FFC000"/>
+                </a:solidFill>
+              </a:rPr>
+              <a:t>@btime </a:t>
+            </a:r>
+            <a:r>
+              <a:rPr lang="en-GB" dirty="0"/>
+              <a:t>(from </a:t>
+            </a:r>
+            <a:r>
+              <a:rPr lang="en-GB" dirty="0" err="1"/>
+              <a:t>BenchmarkTools.jl</a:t>
+            </a:r>
+            <a:r>
+              <a:rPr lang="en-GB" dirty="0"/>
+              <a:t>) allows you to easily benchmark code, without any boilerplate</a:t>
+            </a:r>
+          </a:p>
+          <a:p>
+            <a:r>
+              <a:rPr lang="en-GB" dirty="0"/>
+              <a:t>Many code introspection tools like </a:t>
+            </a:r>
+            <a:r>
+              <a:rPr lang="en-GB" dirty="0">
+                <a:solidFill>
+                  <a:srgbClr val="FFC000"/>
+                </a:solidFill>
+              </a:rPr>
+              <a:t>@code_warntype</a:t>
+            </a:r>
+            <a:r>
+              <a:rPr lang="en-GB" dirty="0"/>
+              <a:t>, </a:t>
+            </a:r>
+            <a:r>
+              <a:rPr lang="en-GB" dirty="0">
+                <a:solidFill>
+                  <a:srgbClr val="FFC000"/>
+                </a:solidFill>
+              </a:rPr>
+              <a:t>@code_llvm </a:t>
+            </a:r>
+            <a:r>
+              <a:rPr lang="en-GB" dirty="0"/>
+              <a:t>and </a:t>
+            </a:r>
+            <a:r>
+              <a:rPr lang="en-GB" dirty="0">
+                <a:solidFill>
+                  <a:srgbClr val="FFC000"/>
+                </a:solidFill>
+              </a:rPr>
+              <a:t>@code_native</a:t>
+            </a:r>
+            <a:r>
+              <a:rPr lang="en-GB" dirty="0"/>
+              <a:t> to help write performant code.</a:t>
+            </a:r>
+          </a:p>
+          <a:p>
+            <a:endParaRPr lang="en-GB" dirty="0"/>
           </a:p>
         </p:txBody>
       </p:sp>
     </p:spTree>
     <p:extLst>
       <p:ext uri="{BB962C8B-B14F-4D97-AF65-F5344CB8AC3E}">
-        <p14:creationId xmlns:p14="http://schemas.microsoft.com/office/powerpoint/2010/main" val="871419921"/>
+        <p14:creationId xmlns:p14="http://schemas.microsoft.com/office/powerpoint/2010/main" val="1437456443"/>
       </p:ext>
     </p:extLst>
   </p:cSld>
@@ -5526,6 +5738,180 @@
       </p:grpSpPr>
       <p:sp>
         <p:nvSpPr>
+          <p:cNvPr id="2" name="Title 1">
+            <a:extLst>
+              <a:ext uri="{FF2B5EF4-FFF2-40B4-BE49-F238E27FC236}">
+                <a16:creationId xmlns:a16="http://schemas.microsoft.com/office/drawing/2014/main" id="{FA2041A0-9C8A-4E5F-84C7-3CF22E0D6A6B}"/>
+              </a:ext>
+            </a:extLst>
+          </p:cNvPr>
+          <p:cNvSpPr>
+            <a:spLocks noGrp="1"/>
+          </p:cNvSpPr>
+          <p:nvPr>
+            <p:ph type="title"/>
+          </p:nvPr>
+        </p:nvSpPr>
+        <p:spPr/>
+        <p:txBody>
+          <a:bodyPr/>
+          <a:lstStyle/>
+          <a:p>
+            <a:r>
+              <a:rPr lang="en-GB" dirty="0"/>
+              <a:t>Interesting language features – LIVE DEMO</a:t>
+            </a:r>
+          </a:p>
+        </p:txBody>
+      </p:sp>
+      <p:sp>
+        <p:nvSpPr>
+          <p:cNvPr id="3" name="Content Placeholder 2">
+            <a:extLst>
+              <a:ext uri="{FF2B5EF4-FFF2-40B4-BE49-F238E27FC236}">
+                <a16:creationId xmlns:a16="http://schemas.microsoft.com/office/drawing/2014/main" id="{198FC1E6-F3BD-4557-B065-EC9E819B627E}"/>
+              </a:ext>
+            </a:extLst>
+          </p:cNvPr>
+          <p:cNvSpPr>
+            <a:spLocks noGrp="1"/>
+          </p:cNvSpPr>
+          <p:nvPr>
+            <p:ph idx="1"/>
+          </p:nvPr>
+        </p:nvSpPr>
+        <p:spPr/>
+        <p:txBody>
+          <a:bodyPr/>
+          <a:lstStyle/>
+          <a:p>
+            <a:r>
+              <a:rPr lang="en-GB" dirty="0"/>
+              <a:t>Great support for parallelising your code across multiple cores or an entire cluster</a:t>
+            </a:r>
+          </a:p>
+          <a:p>
+            <a:r>
+              <a:rPr lang="en-GB" dirty="0"/>
+              <a:t>Great support for using GPUs!</a:t>
+            </a:r>
+          </a:p>
+        </p:txBody>
+      </p:sp>
+    </p:spTree>
+    <p:extLst>
+      <p:ext uri="{BB962C8B-B14F-4D97-AF65-F5344CB8AC3E}">
+        <p14:creationId xmlns:p14="http://schemas.microsoft.com/office/powerpoint/2010/main" val="1344944065"/>
+      </p:ext>
+    </p:extLst>
+  </p:cSld>
+  <p:clrMapOvr>
+    <a:masterClrMapping/>
+  </p:clrMapOvr>
+  <mc:AlternateContent xmlns:mc="http://schemas.openxmlformats.org/markup-compatibility/2006">
+    <mc:Choice xmlns:p14="http://schemas.microsoft.com/office/powerpoint/2010/main" Requires="p14">
+      <p:transition spd="med" p14:dur="700">
+        <p:fade/>
+      </p:transition>
+    </mc:Choice>
+    <mc:Fallback>
+      <p:transition spd="med">
+        <p:fade/>
+      </p:transition>
+    </mc:Fallback>
+  </mc:AlternateContent>
+</p:sld>
+</file>
+
+<file path=ppt/slides/slide14.xml><?xml version="1.0" encoding="utf-8"?>
+<p:sld xmlns:a="http://schemas.openxmlformats.org/drawingml/2006/main" xmlns:r="http://schemas.openxmlformats.org/officeDocument/2006/relationships" xmlns:p="http://schemas.openxmlformats.org/presentationml/2006/main">
+  <p:cSld>
+    <p:spTree>
+      <p:nvGrpSpPr>
+        <p:cNvPr id="1" name=""/>
+        <p:cNvGrpSpPr/>
+        <p:nvPr/>
+      </p:nvGrpSpPr>
+      <p:grpSpPr>
+        <a:xfrm>
+          <a:off x="0" y="0"/>
+          <a:ext cx="0" cy="0"/>
+          <a:chOff x="0" y="0"/>
+          <a:chExt cx="0" cy="0"/>
+        </a:xfrm>
+      </p:grpSpPr>
+      <p:sp>
+        <p:nvSpPr>
+          <p:cNvPr id="2" name="Title 1">
+            <a:extLst>
+              <a:ext uri="{FF2B5EF4-FFF2-40B4-BE49-F238E27FC236}">
+                <a16:creationId xmlns:a16="http://schemas.microsoft.com/office/drawing/2014/main" id="{0F6D1EA9-B256-45D7-81B1-C3EAE2C14209}"/>
+              </a:ext>
+            </a:extLst>
+          </p:cNvPr>
+          <p:cNvSpPr>
+            <a:spLocks noGrp="1"/>
+          </p:cNvSpPr>
+          <p:nvPr>
+            <p:ph type="title"/>
+          </p:nvPr>
+        </p:nvSpPr>
+        <p:spPr/>
+        <p:txBody>
+          <a:bodyPr/>
+          <a:lstStyle/>
+          <a:p>
+            <a:r>
+              <a:rPr lang="en-GB" dirty="0"/>
+              <a:t>Questions?</a:t>
+            </a:r>
+          </a:p>
+        </p:txBody>
+      </p:sp>
+    </p:spTree>
+    <p:extLst>
+      <p:ext uri="{BB962C8B-B14F-4D97-AF65-F5344CB8AC3E}">
+        <p14:creationId xmlns:p14="http://schemas.microsoft.com/office/powerpoint/2010/main" val="1107992791"/>
+      </p:ext>
+    </p:extLst>
+  </p:cSld>
+  <p:clrMapOvr>
+    <a:masterClrMapping/>
+  </p:clrMapOvr>
+  <mc:AlternateContent xmlns:mc="http://schemas.openxmlformats.org/markup-compatibility/2006" xmlns:p14="http://schemas.microsoft.com/office/powerpoint/2010/main">
+    <mc:Choice Requires="p14">
+      <p:transition spd="med" p14:dur="700">
+        <p:fade/>
+      </p:transition>
+    </mc:Choice>
+    <mc:Fallback xmlns="">
+      <p:transition spd="med">
+        <p:fade/>
+      </p:transition>
+    </mc:Fallback>
+  </mc:AlternateContent>
+</p:sld>
+</file>
+
+<file path=ppt/slides/slide15.xml><?xml version="1.0" encoding="utf-8"?>
+<p:sld xmlns:a="http://schemas.openxmlformats.org/drawingml/2006/main" xmlns:r="http://schemas.openxmlformats.org/officeDocument/2006/relationships" xmlns:p="http://schemas.openxmlformats.org/presentationml/2006/main">
+  <p:cSld>
+    <p:spTree>
+      <p:nvGrpSpPr>
+        <p:cNvPr id="1" name=""/>
+        <p:cNvGrpSpPr/>
+        <p:nvPr/>
+      </p:nvGrpSpPr>
+      <p:grpSpPr>
+        <a:xfrm>
+          <a:off x="0" y="0"/>
+          <a:ext cx="0" cy="0"/>
+          <a:chOff x="0" y="0"/>
+          <a:chExt cx="0" cy="0"/>
+        </a:xfrm>
+      </p:grpSpPr>
+      <p:sp>
+        <p:nvSpPr>
           <p:cNvPr id="7" name="Title 6"/>
           <p:cNvSpPr>
             <a:spLocks noGrp="1"/>
@@ -5646,8 +6032,8 @@
           </a:p>
         </p:txBody>
       </p:sp>
-      <mc:AlternateContent xmlns:mc="http://schemas.openxmlformats.org/markup-compatibility/2006">
-        <mc:Choice xmlns:a14="http://schemas.microsoft.com/office/drawing/2010/main" Requires="a14">
+      <mc:AlternateContent xmlns:mc="http://schemas.openxmlformats.org/markup-compatibility/2006" xmlns:a14="http://schemas.microsoft.com/office/drawing/2010/main">
+        <mc:Choice Requires="a14">
           <p:sp>
             <p:nvSpPr>
               <p:cNvPr id="17" name="TextBox 16">
@@ -5761,7 +6147,7 @@
             </p:txBody>
           </p:sp>
         </mc:Choice>
-        <mc:Fallback>
+        <mc:Fallback xmlns="">
           <p:sp>
             <p:nvSpPr>
               <p:cNvPr id="17" name="TextBox 16">
@@ -5831,7 +6217,7 @@
 </p:sld>
 </file>
 
-<file path=ppt/slides/slide14.xml><?xml version="1.0" encoding="utf-8"?>
+<file path=ppt/slides/slide16.xml><?xml version="1.0" encoding="utf-8"?>
 <p:sld xmlns:a="http://schemas.openxmlformats.org/drawingml/2006/main" xmlns:r="http://schemas.openxmlformats.org/officeDocument/2006/relationships" xmlns:p="http://schemas.openxmlformats.org/presentationml/2006/main">
   <p:cSld>
     <p:spTree>
@@ -5940,8 +6326,8 @@
           </a:p>
         </p:txBody>
       </p:sp>
-      <mc:AlternateContent xmlns:mc="http://schemas.openxmlformats.org/markup-compatibility/2006">
-        <mc:Choice xmlns:a14="http://schemas.microsoft.com/office/drawing/2010/main" Requires="a14">
+      <mc:AlternateContent xmlns:mc="http://schemas.openxmlformats.org/markup-compatibility/2006" xmlns:a14="http://schemas.microsoft.com/office/drawing/2010/main">
+        <mc:Choice Requires="a14">
           <p:sp>
             <p:nvSpPr>
               <p:cNvPr id="17" name="TextBox 16">
@@ -6055,7 +6441,7 @@
             </p:txBody>
           </p:sp>
         </mc:Choice>
-        <mc:Fallback>
+        <mc:Fallback xmlns="">
           <p:sp>
             <p:nvSpPr>
               <p:cNvPr id="17" name="TextBox 16">
@@ -6190,7 +6576,7 @@
 </p:sld>
 </file>
 
-<file path=ppt/slides/slide15.xml><?xml version="1.0" encoding="utf-8"?>
+<file path=ppt/slides/slide17.xml><?xml version="1.0" encoding="utf-8"?>
 <p:sld xmlns:a="http://schemas.openxmlformats.org/drawingml/2006/main" xmlns:r="http://schemas.openxmlformats.org/officeDocument/2006/relationships" xmlns:p="http://schemas.openxmlformats.org/presentationml/2006/main">
   <p:cSld>
     <p:spTree>
@@ -6212,7 +6598,7 @@
           <p:cNvPr id="2" name="Title 1">
             <a:extLst>
               <a:ext uri="{FF2B5EF4-FFF2-40B4-BE49-F238E27FC236}">
-                <a16:creationId xmlns:a16="http://schemas.microsoft.com/office/drawing/2014/main" id="{4D79B714-F48C-45A7-A86B-CAD79375F808}"/>
+                <a16:creationId xmlns:a16="http://schemas.microsoft.com/office/drawing/2014/main" id="{4570A933-A396-4817-9EEE-DE7110E97621}"/>
               </a:ext>
             </a:extLst>
           </p:cNvPr>
@@ -6230,40 +6616,95 @@
           <a:p>
             <a:r>
               <a:rPr lang="en-GB" dirty="0"/>
-              <a:t>What makes Julia fast? – Type System</a:t>
-            </a:r>
-          </a:p>
-        </p:txBody>
-      </p:sp>
-      <p:sp>
-        <p:nvSpPr>
-          <p:cNvPr id="3" name="Content Placeholder 2">
+              <a:t>Performance in </a:t>
+            </a:r>
+            <a:r>
+              <a:rPr lang="en-GB" dirty="0" err="1"/>
+              <a:t>DifferentialEquations.jl</a:t>
+            </a:r>
+            <a:endParaRPr lang="en-GB" dirty="0"/>
+          </a:p>
+        </p:txBody>
+      </p:sp>
+      <p:pic>
+        <p:nvPicPr>
+          <p:cNvPr id="5" name="Content Placeholder 4">
             <a:extLst>
               <a:ext uri="{FF2B5EF4-FFF2-40B4-BE49-F238E27FC236}">
-                <a16:creationId xmlns:a16="http://schemas.microsoft.com/office/drawing/2014/main" id="{C6421EE7-023A-4C6E-9E77-56C6E79BF981}"/>
+                <a16:creationId xmlns:a16="http://schemas.microsoft.com/office/drawing/2014/main" id="{FB53F703-F9A0-49A6-8217-23F5D39FB3D4}"/>
               </a:ext>
             </a:extLst>
           </p:cNvPr>
-          <p:cNvSpPr>
-            <a:spLocks noGrp="1"/>
-          </p:cNvSpPr>
+          <p:cNvPicPr>
+            <a:picLocks noGrp="1" noChangeAspect="1"/>
+          </p:cNvPicPr>
           <p:nvPr>
             <p:ph idx="1"/>
           </p:nvPr>
-        </p:nvSpPr>
-        <p:spPr/>
-        <p:txBody>
-          <a:bodyPr/>
+        </p:nvPicPr>
+        <p:blipFill>
+          <a:blip r:embed="rId2"/>
+          <a:stretch>
+            <a:fillRect/>
+          </a:stretch>
+        </p:blipFill>
+        <p:spPr>
+          <a:xfrm>
+            <a:off x="2044948" y="1701800"/>
+            <a:ext cx="8708528" cy="4462463"/>
+          </a:xfrm>
+        </p:spPr>
+      </p:pic>
+      <p:sp>
+        <p:nvSpPr>
+          <p:cNvPr id="6" name="TextBox 5">
+            <a:extLst>
+              <a:ext uri="{FF2B5EF4-FFF2-40B4-BE49-F238E27FC236}">
+                <a16:creationId xmlns:a16="http://schemas.microsoft.com/office/drawing/2014/main" id="{AE2E0AA5-C815-482B-8767-24D872799229}"/>
+              </a:ext>
+            </a:extLst>
+          </p:cNvPr>
+          <p:cNvSpPr txBox="1"/>
+          <p:nvPr/>
+        </p:nvSpPr>
+        <p:spPr>
+          <a:xfrm>
+            <a:off x="6310436" y="6220193"/>
+            <a:ext cx="4752528" cy="338554"/>
+          </a:xfrm>
+          <a:prstGeom prst="rect">
+            <a:avLst/>
+          </a:prstGeom>
+          <a:noFill/>
+        </p:spPr>
+        <p:txBody>
+          <a:bodyPr wrap="square" rtlCol="0">
+            <a:spAutoFit/>
+          </a:bodyPr>
           <a:lstStyle/>
           <a:p>
-            <a:endParaRPr lang="en-GB" dirty="0"/>
+            <a:r>
+              <a:rPr lang="en-GB" sz="1600" dirty="0"/>
+              <a:t>Julia for Biologists: </a:t>
+            </a:r>
+            <a:r>
+              <a:rPr lang="en-GB" sz="1600" dirty="0">
+                <a:solidFill>
+                  <a:schemeClr val="accent1">
+                    <a:lumMod val="40000"/>
+                    <a:lumOff val="60000"/>
+                  </a:schemeClr>
+                </a:solidFill>
+              </a:rPr>
+              <a:t>https://arxiv.org/abs/2109.09973</a:t>
+            </a:r>
           </a:p>
         </p:txBody>
       </p:sp>
     </p:spTree>
     <p:extLst>
       <p:ext uri="{BB962C8B-B14F-4D97-AF65-F5344CB8AC3E}">
-        <p14:creationId xmlns:p14="http://schemas.microsoft.com/office/powerpoint/2010/main" val="295298297"/>
+        <p14:creationId xmlns:p14="http://schemas.microsoft.com/office/powerpoint/2010/main" val="3619081224"/>
       </p:ext>
     </p:extLst>
   </p:cSld>
@@ -6466,7 +6907,7 @@
           <a:p>
             <a:r>
               <a:rPr lang="en-GB" dirty="0"/>
-              <a:t>Julia is a fast programming language, designed from the ground for high performance.</a:t>
+              <a:t>Julia is a fast programming language, designed from the ground up for high performance.</a:t>
             </a:r>
           </a:p>
           <a:p>
@@ -6554,7 +6995,7 @@
           <a:p>
             <a:r>
               <a:rPr lang="en-GB" dirty="0"/>
-              <a:t>Why Julia?</a:t>
+              <a:t>Why Julia? – The Two Language Problem</a:t>
             </a:r>
           </a:p>
         </p:txBody>
@@ -6578,46 +7019,40 @@
         <p:spPr/>
         <p:txBody>
           <a:bodyPr>
-            <a:normAutofit lnSpcReduction="10000"/>
+            <a:normAutofit/>
           </a:bodyPr>
           <a:lstStyle/>
           <a:p>
             <a:r>
               <a:rPr lang="en-GB" dirty="0"/>
-              <a:t>High performance – approaches speeds similar to C or Fortran and is the only dynamic language which has broken the petaflop barrier (along with C/C++ </a:t>
-            </a:r>
-            <a:r>
-              <a:rPr lang="en-GB"/>
-              <a:t>and Fortran).</a:t>
-            </a:r>
-            <a:endParaRPr lang="en-GB" dirty="0"/>
+              <a:t>Develop code in an easy to use, dynamic language like Python or MATLAB</a:t>
+            </a:r>
           </a:p>
           <a:p>
             <a:r>
               <a:rPr lang="en-GB" dirty="0"/>
-              <a:t>Easy to learn – simple syntax similar to MATLAB and Python.</a:t>
+              <a:t>If code is performance sensitive, then rewrite your code in a faster language like C/C++ or Fortran.</a:t>
             </a:r>
           </a:p>
           <a:p>
             <a:r>
               <a:rPr lang="en-GB" dirty="0"/>
-              <a:t>Built with support for threading and distributed computing in mind. It is trivial to scale from your laptop to a high performance cluster.</a:t>
-            </a:r>
-          </a:p>
-          <a:p>
+              <a:t>Attempts have been made to make this easier, such as porting code like Linear Algebra to C and then calling from the slower language. (</a:t>
+            </a:r>
+            <a:r>
+              <a:rPr lang="en-GB" dirty="0" err="1"/>
+              <a:t>numpy</a:t>
+            </a:r>
             <a:r>
               <a:rPr lang="en-GB" dirty="0"/>
-              <a:t>Fast growing language – becoming increasingly popular in numerical computing</a:t>
+              <a:t> for python)</a:t>
             </a:r>
           </a:p>
           <a:p>
             <a:r>
               <a:rPr lang="en-GB" dirty="0"/>
-              <a:t>Large ecosystem of packages, particularly for numerical computing, with support for linear algebra built into the language.</a:t>
-            </a:r>
-          </a:p>
-          <a:p>
-            <a:endParaRPr lang="en-GB" dirty="0"/>
+              <a:t>Limited to what has already been ported over, what if that code doesn’t exist?</a:t>
+            </a:r>
           </a:p>
         </p:txBody>
       </p:sp>
@@ -6647,156 +7082,6 @@
 </file>
 
 <file path=ppt/slides/slide5.xml><?xml version="1.0" encoding="utf-8"?>
-<p:sld xmlns:a="http://schemas.openxmlformats.org/drawingml/2006/main" xmlns:r="http://schemas.openxmlformats.org/officeDocument/2006/relationships" xmlns:p="http://schemas.openxmlformats.org/presentationml/2006/main">
-  <p:cSld>
-    <p:spTree>
-      <p:nvGrpSpPr>
-        <p:cNvPr id="1" name=""/>
-        <p:cNvGrpSpPr/>
-        <p:nvPr/>
-      </p:nvGrpSpPr>
-      <p:grpSpPr>
-        <a:xfrm>
-          <a:off x="0" y="0"/>
-          <a:ext cx="0" cy="0"/>
-          <a:chOff x="0" y="0"/>
-          <a:chExt cx="0" cy="0"/>
-        </a:xfrm>
-      </p:grpSpPr>
-      <p:sp>
-        <p:nvSpPr>
-          <p:cNvPr id="2" name="Title 1">
-            <a:extLst>
-              <a:ext uri="{FF2B5EF4-FFF2-40B4-BE49-F238E27FC236}">
-                <a16:creationId xmlns:a16="http://schemas.microsoft.com/office/drawing/2014/main" id="{4570A933-A396-4817-9EEE-DE7110E97621}"/>
-              </a:ext>
-            </a:extLst>
-          </p:cNvPr>
-          <p:cNvSpPr>
-            <a:spLocks noGrp="1"/>
-          </p:cNvSpPr>
-          <p:nvPr>
-            <p:ph type="title"/>
-          </p:nvPr>
-        </p:nvSpPr>
-        <p:spPr/>
-        <p:txBody>
-          <a:bodyPr/>
-          <a:lstStyle/>
-          <a:p>
-            <a:r>
-              <a:rPr lang="en-GB" dirty="0"/>
-              <a:t>Performance in </a:t>
-            </a:r>
-            <a:r>
-              <a:rPr lang="en-GB" dirty="0" err="1"/>
-              <a:t>DifferentialEquations.jl</a:t>
-            </a:r>
-            <a:endParaRPr lang="en-GB" dirty="0"/>
-          </a:p>
-        </p:txBody>
-      </p:sp>
-      <p:pic>
-        <p:nvPicPr>
-          <p:cNvPr id="5" name="Content Placeholder 4">
-            <a:extLst>
-              <a:ext uri="{FF2B5EF4-FFF2-40B4-BE49-F238E27FC236}">
-                <a16:creationId xmlns:a16="http://schemas.microsoft.com/office/drawing/2014/main" id="{FB53F703-F9A0-49A6-8217-23F5D39FB3D4}"/>
-              </a:ext>
-            </a:extLst>
-          </p:cNvPr>
-          <p:cNvPicPr>
-            <a:picLocks noGrp="1" noChangeAspect="1"/>
-          </p:cNvPicPr>
-          <p:nvPr>
-            <p:ph idx="1"/>
-          </p:nvPr>
-        </p:nvPicPr>
-        <p:blipFill>
-          <a:blip r:embed="rId2"/>
-          <a:stretch>
-            <a:fillRect/>
-          </a:stretch>
-        </p:blipFill>
-        <p:spPr>
-          <a:xfrm>
-            <a:off x="2044948" y="1701800"/>
-            <a:ext cx="8708528" cy="4462463"/>
-          </a:xfrm>
-        </p:spPr>
-      </p:pic>
-      <p:sp>
-        <p:nvSpPr>
-          <p:cNvPr id="6" name="TextBox 5">
-            <a:extLst>
-              <a:ext uri="{FF2B5EF4-FFF2-40B4-BE49-F238E27FC236}">
-                <a16:creationId xmlns:a16="http://schemas.microsoft.com/office/drawing/2014/main" id="{AE2E0AA5-C815-482B-8767-24D872799229}"/>
-              </a:ext>
-            </a:extLst>
-          </p:cNvPr>
-          <p:cNvSpPr txBox="1"/>
-          <p:nvPr/>
-        </p:nvSpPr>
-        <p:spPr>
-          <a:xfrm>
-            <a:off x="6310436" y="6220193"/>
-            <a:ext cx="4752528" cy="338554"/>
-          </a:xfrm>
-          <a:prstGeom prst="rect">
-            <a:avLst/>
-          </a:prstGeom>
-          <a:noFill/>
-        </p:spPr>
-        <p:txBody>
-          <a:bodyPr wrap="square" rtlCol="0">
-            <a:spAutoFit/>
-          </a:bodyPr>
-          <a:lstStyle/>
-          <a:p>
-            <a:r>
-              <a:rPr lang="en-GB" sz="1600" dirty="0"/>
-              <a:t>Julia for Biologists: </a:t>
-            </a:r>
-            <a:r>
-              <a:rPr lang="en-GB" sz="1600" dirty="0">
-                <a:solidFill>
-                  <a:schemeClr val="accent1">
-                    <a:lumMod val="40000"/>
-                    <a:lumOff val="60000"/>
-                  </a:schemeClr>
-                </a:solidFill>
-              </a:rPr>
-              <a:t>https://arxiv.org/abs/2109.09973</a:t>
-            </a:r>
-          </a:p>
-        </p:txBody>
-      </p:sp>
-    </p:spTree>
-    <p:extLst>
-      <p:ext uri="{BB962C8B-B14F-4D97-AF65-F5344CB8AC3E}">
-        <p14:creationId xmlns:p14="http://schemas.microsoft.com/office/powerpoint/2010/main" val="3619081224"/>
-      </p:ext>
-    </p:extLst>
-  </p:cSld>
-  <p:clrMapOvr>
-    <a:masterClrMapping/>
-  </p:clrMapOvr>
-  <mc:AlternateContent xmlns:mc="http://schemas.openxmlformats.org/markup-compatibility/2006" xmlns:p14="http://schemas.microsoft.com/office/powerpoint/2010/main">
-    <mc:Choice Requires="p14">
-      <p:transition spd="med" p14:dur="700">
-        <p:fade/>
-      </p:transition>
-    </mc:Choice>
-    <mc:Fallback xmlns="">
-      <p:transition spd="med">
-        <p:fade/>
-      </p:transition>
-    </mc:Fallback>
-  </mc:AlternateContent>
-</p:sld>
-</file>
-
-<file path=ppt/slides/slide6.xml><?xml version="1.0" encoding="utf-8"?>
 <p:sld xmlns:a="http://schemas.openxmlformats.org/drawingml/2006/main" xmlns:r="http://schemas.openxmlformats.org/officeDocument/2006/relationships" xmlns:p="http://schemas.openxmlformats.org/presentationml/2006/main">
   <p:cSld>
     <p:spTree>
@@ -7154,7 +7439,23 @@
           <a:p>
             <a:r>
               <a:rPr lang="el-GR" sz="2400" dirty="0"/>
-              <a:t>351.900 μ</a:t>
+              <a:t>3</a:t>
+            </a:r>
+            <a:r>
+              <a:rPr lang="en-GB" sz="2400" dirty="0"/>
+              <a:t>13</a:t>
+            </a:r>
+            <a:r>
+              <a:rPr lang="el-GR" sz="2400" dirty="0"/>
+              <a:t>.</a:t>
+            </a:r>
+            <a:r>
+              <a:rPr lang="en-GB" sz="2400" dirty="0"/>
+              <a:t>5</a:t>
+            </a:r>
+            <a:r>
+              <a:rPr lang="el-GR" sz="2400" dirty="0"/>
+              <a:t> μ</a:t>
             </a:r>
             <a:r>
               <a:rPr lang="en-GB" sz="2400" dirty="0"/>
@@ -7192,14 +7493,13 @@
           <a:lstStyle/>
           <a:p>
             <a:r>
-              <a:rPr lang="en-GB" b="0" dirty="0">
+              <a:rPr lang="en-GB" sz="2400" dirty="0">
                 <a:solidFill>
                   <a:srgbClr val="D4D4D4"/>
                 </a:solidFill>
-                <a:effectLst/>
                 <a:latin typeface="+mj-lt"/>
               </a:rPr>
-              <a:t>10355.7</a:t>
+              <a:t>8509.3</a:t>
             </a:r>
             <a:r>
               <a:rPr lang="el-GR" sz="2400" dirty="0">
@@ -7251,10 +7551,663 @@
           </a:p>
         </p:txBody>
       </p:sp>
+      <mc:AlternateContent xmlns:mc="http://schemas.openxmlformats.org/markup-compatibility/2006" xmlns:a14="http://schemas.microsoft.com/office/drawing/2010/main">
+        <mc:Choice Requires="a14">
+          <p:sp>
+            <p:nvSpPr>
+              <p:cNvPr id="13" name="TextBox 12">
+                <a:extLst>
+                  <a:ext uri="{FF2B5EF4-FFF2-40B4-BE49-F238E27FC236}">
+                    <a16:creationId xmlns:a16="http://schemas.microsoft.com/office/drawing/2014/main" id="{C35967D0-FE5A-4C7F-A0AA-D68BA3D24A5A}"/>
+                  </a:ext>
+                </a:extLst>
+              </p:cNvPr>
+              <p:cNvSpPr txBox="1"/>
+              <p:nvPr/>
+            </p:nvSpPr>
+            <p:spPr>
+              <a:xfrm>
+                <a:off x="10368542" y="235884"/>
+                <a:ext cx="1800200" cy="830997"/>
+              </a:xfrm>
+              <a:prstGeom prst="rect">
+                <a:avLst/>
+              </a:prstGeom>
+              <a:noFill/>
+            </p:spPr>
+            <p:txBody>
+              <a:bodyPr wrap="square" rtlCol="0">
+                <a:spAutoFit/>
+              </a:bodyPr>
+              <a:lstStyle/>
+              <a:p>
+                <a:pPr/>
+                <a14:m>
+                  <m:oMathPara xmlns:m="http://schemas.openxmlformats.org/officeDocument/2006/math">
+                    <m:oMathParaPr>
+                      <m:jc m:val="centerGroup"/>
+                    </m:oMathParaPr>
+                    <m:oMath xmlns:m="http://schemas.openxmlformats.org/officeDocument/2006/math">
+                      <m:r>
+                        <a:rPr lang="en-GB" b="0" i="1" smtClean="0">
+                          <a:latin typeface="Cambria Math" panose="02040503050406030204" pitchFamily="18" charset="0"/>
+                        </a:rPr>
+                        <m:t>𝑁</m:t>
+                      </m:r>
+                      <m:r>
+                        <a:rPr lang="en-GB" b="0" i="1" smtClean="0">
+                          <a:latin typeface="Cambria Math" panose="02040503050406030204" pitchFamily="18" charset="0"/>
+                        </a:rPr>
+                        <m:t>=</m:t>
+                      </m:r>
+                      <m:sSup>
+                        <m:sSupPr>
+                          <m:ctrlPr>
+                            <a:rPr lang="en-GB" b="0" i="1" smtClean="0">
+                              <a:latin typeface="Cambria Math" panose="02040503050406030204" pitchFamily="18" charset="0"/>
+                            </a:rPr>
+                          </m:ctrlPr>
+                        </m:sSupPr>
+                        <m:e>
+                          <m:r>
+                            <a:rPr lang="en-GB" b="0" i="1" smtClean="0">
+                              <a:latin typeface="Cambria Math" panose="02040503050406030204" pitchFamily="18" charset="0"/>
+                            </a:rPr>
+                            <m:t>2</m:t>
+                          </m:r>
+                        </m:e>
+                        <m:sup>
+                          <m:r>
+                            <a:rPr lang="en-GB" b="0" i="1" smtClean="0">
+                              <a:latin typeface="Cambria Math" panose="02040503050406030204" pitchFamily="18" charset="0"/>
+                            </a:rPr>
+                            <m:t>10</m:t>
+                          </m:r>
+                        </m:sup>
+                      </m:sSup>
+                    </m:oMath>
+                  </m:oMathPara>
+                </a14:m>
+                <a:endParaRPr lang="en-GB" b="0" i="1" dirty="0">
+                  <a:latin typeface="Cambria Math" panose="02040503050406030204" pitchFamily="18" charset="0"/>
+                </a:endParaRPr>
+              </a:p>
+              <a:p>
+                <a:pPr/>
+                <a14:m>
+                  <m:oMathPara xmlns:m="http://schemas.openxmlformats.org/officeDocument/2006/math">
+                    <m:oMathParaPr>
+                      <m:jc m:val="centerGroup"/>
+                    </m:oMathParaPr>
+                    <m:oMath xmlns:m="http://schemas.openxmlformats.org/officeDocument/2006/math">
+                      <m:r>
+                        <a:rPr lang="en-GB" b="0" i="1" smtClean="0">
+                          <a:latin typeface="Cambria Math" panose="02040503050406030204" pitchFamily="18" charset="0"/>
+                        </a:rPr>
+                        <m:t> </m:t>
+                      </m:r>
+                      <m:r>
+                        <a:rPr lang="en-GB" b="0" i="1" smtClean="0">
+                          <a:latin typeface="Cambria Math" panose="02040503050406030204" pitchFamily="18" charset="0"/>
+                        </a:rPr>
+                        <m:t>𝑇</m:t>
+                      </m:r>
+                      <m:r>
+                        <a:rPr lang="en-GB" b="0" i="1" smtClean="0">
+                          <a:latin typeface="Cambria Math" panose="02040503050406030204" pitchFamily="18" charset="0"/>
+                        </a:rPr>
+                        <m:t>=100</m:t>
+                      </m:r>
+                    </m:oMath>
+                  </m:oMathPara>
+                </a14:m>
+                <a:endParaRPr lang="en-GB" dirty="0"/>
+              </a:p>
+            </p:txBody>
+          </p:sp>
+        </mc:Choice>
+        <mc:Fallback xmlns="">
+          <p:sp>
+            <p:nvSpPr>
+              <p:cNvPr id="13" name="TextBox 12">
+                <a:extLst>
+                  <a:ext uri="{FF2B5EF4-FFF2-40B4-BE49-F238E27FC236}">
+                    <a16:creationId xmlns:a16="http://schemas.microsoft.com/office/drawing/2014/main" id="{C35967D0-FE5A-4C7F-A0AA-D68BA3D24A5A}"/>
+                  </a:ext>
+                </a:extLst>
+              </p:cNvPr>
+              <p:cNvSpPr txBox="1">
+                <a:spLocks noRot="1" noChangeAspect="1" noMove="1" noResize="1" noEditPoints="1" noAdjustHandles="1" noChangeArrowheads="1" noChangeShapeType="1" noTextEdit="1"/>
+              </p:cNvSpPr>
+              <p:nvPr/>
+            </p:nvSpPr>
+            <p:spPr>
+              <a:xfrm>
+                <a:off x="10368542" y="235884"/>
+                <a:ext cx="1800200" cy="830997"/>
+              </a:xfrm>
+              <a:prstGeom prst="rect">
+                <a:avLst/>
+              </a:prstGeom>
+              <a:blipFill>
+                <a:blip r:embed="rId5"/>
+                <a:stretch>
+                  <a:fillRect/>
+                </a:stretch>
+              </a:blipFill>
+            </p:spPr>
+            <p:txBody>
+              <a:bodyPr/>
+              <a:lstStyle/>
+              <a:p>
+                <a:r>
+                  <a:rPr lang="en-GB">
+                    <a:noFill/>
+                  </a:rPr>
+                  <a:t> </a:t>
+                </a:r>
+              </a:p>
+            </p:txBody>
+          </p:sp>
+        </mc:Fallback>
+      </mc:AlternateContent>
     </p:spTree>
     <p:extLst>
       <p:ext uri="{BB962C8B-B14F-4D97-AF65-F5344CB8AC3E}">
         <p14:creationId xmlns:p14="http://schemas.microsoft.com/office/powerpoint/2010/main" val="1484811712"/>
+      </p:ext>
+    </p:extLst>
+  </p:cSld>
+  <p:clrMapOvr>
+    <a:masterClrMapping/>
+  </p:clrMapOvr>
+  <mc:AlternateContent xmlns:mc="http://schemas.openxmlformats.org/markup-compatibility/2006" xmlns:p14="http://schemas.microsoft.com/office/powerpoint/2010/main">
+    <mc:Choice Requires="p14">
+      <p:transition spd="med" p14:dur="700">
+        <p:fade/>
+      </p:transition>
+    </mc:Choice>
+    <mc:Fallback xmlns="">
+      <p:transition spd="med">
+        <p:fade/>
+      </p:transition>
+    </mc:Fallback>
+  </mc:AlternateContent>
+</p:sld>
+</file>
+
+<file path=ppt/slides/slide6.xml><?xml version="1.0" encoding="utf-8"?>
+<p:sld xmlns:a="http://schemas.openxmlformats.org/drawingml/2006/main" xmlns:r="http://schemas.openxmlformats.org/officeDocument/2006/relationships" xmlns:p="http://schemas.openxmlformats.org/presentationml/2006/main">
+  <p:cSld>
+    <p:spTree>
+      <p:nvGrpSpPr>
+        <p:cNvPr id="1" name=""/>
+        <p:cNvGrpSpPr/>
+        <p:nvPr/>
+      </p:nvGrpSpPr>
+      <p:grpSpPr>
+        <a:xfrm>
+          <a:off x="0" y="0"/>
+          <a:ext cx="0" cy="0"/>
+          <a:chOff x="0" y="0"/>
+          <a:chExt cx="0" cy="0"/>
+        </a:xfrm>
+      </p:grpSpPr>
+      <p:sp>
+        <p:nvSpPr>
+          <p:cNvPr id="7" name="Title 6"/>
+          <p:cNvSpPr>
+            <a:spLocks noGrp="1"/>
+          </p:cNvSpPr>
+          <p:nvPr>
+            <p:ph type="title"/>
+          </p:nvPr>
+        </p:nvSpPr>
+        <p:spPr/>
+        <p:txBody>
+          <a:bodyPr/>
+          <a:lstStyle/>
+          <a:p>
+            <a:r>
+              <a:rPr lang="en-US" dirty="0"/>
+              <a:t>Python vs Julia – Random Walk w/ Arrays</a:t>
+            </a:r>
+          </a:p>
+        </p:txBody>
+      </p:sp>
+      <p:sp>
+        <p:nvSpPr>
+          <p:cNvPr id="10" name="TextBox 9">
+            <a:extLst>
+              <a:ext uri="{FF2B5EF4-FFF2-40B4-BE49-F238E27FC236}">
+                <a16:creationId xmlns:a16="http://schemas.microsoft.com/office/drawing/2014/main" id="{5CBE6747-4021-4BF2-995D-268C07408E57}"/>
+              </a:ext>
+            </a:extLst>
+          </p:cNvPr>
+          <p:cNvSpPr txBox="1"/>
+          <p:nvPr/>
+        </p:nvSpPr>
+        <p:spPr>
+          <a:xfrm>
+            <a:off x="837828" y="2492896"/>
+            <a:ext cx="1008112" cy="523220"/>
+          </a:xfrm>
+          <a:prstGeom prst="rect">
+            <a:avLst/>
+          </a:prstGeom>
+          <a:noFill/>
+        </p:spPr>
+        <p:txBody>
+          <a:bodyPr wrap="square" rtlCol="0">
+            <a:spAutoFit/>
+          </a:bodyPr>
+          <a:lstStyle/>
+          <a:p>
+            <a:r>
+              <a:rPr lang="en-GB" sz="2800" dirty="0"/>
+              <a:t>Julia:</a:t>
+            </a:r>
+          </a:p>
+        </p:txBody>
+      </p:sp>
+      <p:sp>
+        <p:nvSpPr>
+          <p:cNvPr id="11" name="TextBox 10">
+            <a:extLst>
+              <a:ext uri="{FF2B5EF4-FFF2-40B4-BE49-F238E27FC236}">
+                <a16:creationId xmlns:a16="http://schemas.microsoft.com/office/drawing/2014/main" id="{ADC2E00F-86C3-4205-B51C-9396F8DE7727}"/>
+              </a:ext>
+            </a:extLst>
+          </p:cNvPr>
+          <p:cNvSpPr txBox="1"/>
+          <p:nvPr/>
+        </p:nvSpPr>
+        <p:spPr>
+          <a:xfrm>
+            <a:off x="507147" y="4400040"/>
+            <a:ext cx="1423471" cy="523220"/>
+          </a:xfrm>
+          <a:prstGeom prst="rect">
+            <a:avLst/>
+          </a:prstGeom>
+          <a:noFill/>
+        </p:spPr>
+        <p:txBody>
+          <a:bodyPr wrap="square" rtlCol="0">
+            <a:spAutoFit/>
+          </a:bodyPr>
+          <a:lstStyle/>
+          <a:p>
+            <a:r>
+              <a:rPr lang="en-GB" sz="2800" dirty="0"/>
+              <a:t>Python:</a:t>
+            </a:r>
+          </a:p>
+        </p:txBody>
+      </p:sp>
+      <p:sp>
+        <p:nvSpPr>
+          <p:cNvPr id="14" name="TextBox 13">
+            <a:extLst>
+              <a:ext uri="{FF2B5EF4-FFF2-40B4-BE49-F238E27FC236}">
+                <a16:creationId xmlns:a16="http://schemas.microsoft.com/office/drawing/2014/main" id="{2AD6DDD0-7208-4DCD-B580-E606DB0FDA76}"/>
+              </a:ext>
+            </a:extLst>
+          </p:cNvPr>
+          <p:cNvSpPr txBox="1"/>
+          <p:nvPr/>
+        </p:nvSpPr>
+        <p:spPr>
+          <a:xfrm>
+            <a:off x="6310436" y="1941184"/>
+            <a:ext cx="1558445" cy="461665"/>
+          </a:xfrm>
+          <a:prstGeom prst="rect">
+            <a:avLst/>
+          </a:prstGeom>
+          <a:noFill/>
+        </p:spPr>
+        <p:txBody>
+          <a:bodyPr wrap="square">
+            <a:spAutoFit/>
+          </a:bodyPr>
+          <a:lstStyle/>
+          <a:p>
+            <a:r>
+              <a:rPr lang="en-GB" dirty="0"/>
+              <a:t>378.7 </a:t>
+            </a:r>
+            <a:r>
+              <a:rPr lang="el-GR" sz="2400" dirty="0"/>
+              <a:t>μ</a:t>
+            </a:r>
+            <a:r>
+              <a:rPr lang="en-GB" sz="2400" dirty="0"/>
+              <a:t>s</a:t>
+            </a:r>
+          </a:p>
+        </p:txBody>
+      </p:sp>
+      <p:sp>
+        <p:nvSpPr>
+          <p:cNvPr id="15" name="TextBox 14">
+            <a:extLst>
+              <a:ext uri="{FF2B5EF4-FFF2-40B4-BE49-F238E27FC236}">
+                <a16:creationId xmlns:a16="http://schemas.microsoft.com/office/drawing/2014/main" id="{A5577604-75DE-48F5-8F6C-543AD75984CC}"/>
+              </a:ext>
+            </a:extLst>
+          </p:cNvPr>
+          <p:cNvSpPr txBox="1"/>
+          <p:nvPr/>
+        </p:nvSpPr>
+        <p:spPr>
+          <a:xfrm>
+            <a:off x="9594852" y="3870217"/>
+            <a:ext cx="2071339" cy="461665"/>
+          </a:xfrm>
+          <a:prstGeom prst="rect">
+            <a:avLst/>
+          </a:prstGeom>
+          <a:noFill/>
+        </p:spPr>
+        <p:txBody>
+          <a:bodyPr wrap="square">
+            <a:spAutoFit/>
+          </a:bodyPr>
+          <a:lstStyle/>
+          <a:p>
+            <a:r>
+              <a:rPr lang="en-GB" b="0" dirty="0">
+                <a:solidFill>
+                  <a:srgbClr val="D4D4D4"/>
+                </a:solidFill>
+                <a:effectLst/>
+                <a:latin typeface="+mj-lt"/>
+              </a:rPr>
+              <a:t>1415.8</a:t>
+            </a:r>
+            <a:r>
+              <a:rPr lang="el-GR" sz="2400" dirty="0">
+                <a:latin typeface="+mj-lt"/>
+              </a:rPr>
+              <a:t> μ</a:t>
+            </a:r>
+            <a:r>
+              <a:rPr lang="en-GB" sz="2400" dirty="0">
+                <a:latin typeface="+mj-lt"/>
+              </a:rPr>
+              <a:t>s</a:t>
+            </a:r>
+          </a:p>
+        </p:txBody>
+      </p:sp>
+      <p:sp>
+        <p:nvSpPr>
+          <p:cNvPr id="16" name="TextBox 15">
+            <a:extLst>
+              <a:ext uri="{FF2B5EF4-FFF2-40B4-BE49-F238E27FC236}">
+                <a16:creationId xmlns:a16="http://schemas.microsoft.com/office/drawing/2014/main" id="{B90FFED5-42C2-4AF9-BC05-69D2E6AA9876}"/>
+              </a:ext>
+            </a:extLst>
+          </p:cNvPr>
+          <p:cNvSpPr txBox="1"/>
+          <p:nvPr/>
+        </p:nvSpPr>
+        <p:spPr>
+          <a:xfrm>
+            <a:off x="2133972" y="5649861"/>
+            <a:ext cx="6768752" cy="954107"/>
+          </a:xfrm>
+          <a:prstGeom prst="rect">
+            <a:avLst/>
+          </a:prstGeom>
+          <a:noFill/>
+        </p:spPr>
+        <p:txBody>
+          <a:bodyPr wrap="square" rtlCol="0">
+            <a:spAutoFit/>
+          </a:bodyPr>
+          <a:lstStyle/>
+          <a:p>
+            <a:r>
+              <a:rPr lang="en-GB" sz="2800" dirty="0"/>
+              <a:t>Julia is only around 4x faster here, but </a:t>
+            </a:r>
+            <a:r>
+              <a:rPr lang="en-GB" sz="2800" i="1" dirty="0" err="1"/>
+              <a:t>numpy</a:t>
+            </a:r>
+            <a:r>
+              <a:rPr lang="en-GB" sz="2800" dirty="0"/>
+              <a:t> implementation could be better</a:t>
+            </a:r>
+          </a:p>
+        </p:txBody>
+      </p:sp>
+      <p:pic>
+        <p:nvPicPr>
+          <p:cNvPr id="13" name="Picture 12">
+            <a:extLst>
+              <a:ext uri="{FF2B5EF4-FFF2-40B4-BE49-F238E27FC236}">
+                <a16:creationId xmlns:a16="http://schemas.microsoft.com/office/drawing/2014/main" id="{32EE83F9-6E39-4DED-B358-5E6C58DAEDEB}"/>
+              </a:ext>
+            </a:extLst>
+          </p:cNvPr>
+          <p:cNvPicPr>
+            <a:picLocks noChangeAspect="1"/>
+          </p:cNvPicPr>
+          <p:nvPr/>
+        </p:nvPicPr>
+        <p:blipFill>
+          <a:blip r:embed="rId2"/>
+          <a:stretch>
+            <a:fillRect/>
+          </a:stretch>
+        </p:blipFill>
+        <p:spPr>
+          <a:xfrm>
+            <a:off x="1803537" y="1950954"/>
+            <a:ext cx="4416911" cy="1738758"/>
+          </a:xfrm>
+          <a:prstGeom prst="rect">
+            <a:avLst/>
+          </a:prstGeom>
+        </p:spPr>
+      </p:pic>
+      <p:pic>
+        <p:nvPicPr>
+          <p:cNvPr id="18" name="Picture 17">
+            <a:extLst>
+              <a:ext uri="{FF2B5EF4-FFF2-40B4-BE49-F238E27FC236}">
+                <a16:creationId xmlns:a16="http://schemas.microsoft.com/office/drawing/2014/main" id="{28F28C2E-C906-4214-AE6C-850E70614F2B}"/>
+              </a:ext>
+            </a:extLst>
+          </p:cNvPr>
+          <p:cNvPicPr>
+            <a:picLocks noChangeAspect="1"/>
+          </p:cNvPicPr>
+          <p:nvPr/>
+        </p:nvPicPr>
+        <p:blipFill>
+          <a:blip r:embed="rId3"/>
+          <a:stretch>
+            <a:fillRect/>
+          </a:stretch>
+        </p:blipFill>
+        <p:spPr>
+          <a:xfrm>
+            <a:off x="1773932" y="3870217"/>
+            <a:ext cx="7820920" cy="1582867"/>
+          </a:xfrm>
+          <a:prstGeom prst="rect">
+            <a:avLst/>
+          </a:prstGeom>
+        </p:spPr>
+      </p:pic>
+      <mc:AlternateContent xmlns:mc="http://schemas.openxmlformats.org/markup-compatibility/2006" xmlns:a14="http://schemas.microsoft.com/office/drawing/2010/main">
+        <mc:Choice Requires="a14">
+          <p:sp>
+            <p:nvSpPr>
+              <p:cNvPr id="17" name="TextBox 16">
+                <a:extLst>
+                  <a:ext uri="{FF2B5EF4-FFF2-40B4-BE49-F238E27FC236}">
+                    <a16:creationId xmlns:a16="http://schemas.microsoft.com/office/drawing/2014/main" id="{BDFD4261-2018-435B-9123-2E1AEF14B894}"/>
+                  </a:ext>
+                </a:extLst>
+              </p:cNvPr>
+              <p:cNvSpPr txBox="1"/>
+              <p:nvPr/>
+            </p:nvSpPr>
+            <p:spPr>
+              <a:xfrm>
+                <a:off x="10368542" y="235884"/>
+                <a:ext cx="1800200" cy="830997"/>
+              </a:xfrm>
+              <a:prstGeom prst="rect">
+                <a:avLst/>
+              </a:prstGeom>
+              <a:noFill/>
+            </p:spPr>
+            <p:txBody>
+              <a:bodyPr wrap="square" rtlCol="0">
+                <a:spAutoFit/>
+              </a:bodyPr>
+              <a:lstStyle/>
+              <a:p>
+                <a:pPr/>
+                <a14:m>
+                  <m:oMathPara xmlns:m="http://schemas.openxmlformats.org/officeDocument/2006/math">
+                    <m:oMathParaPr>
+                      <m:jc m:val="centerGroup"/>
+                    </m:oMathParaPr>
+                    <m:oMath xmlns:m="http://schemas.openxmlformats.org/officeDocument/2006/math">
+                      <m:r>
+                        <a:rPr lang="en-GB" b="0" i="1" smtClean="0">
+                          <a:latin typeface="Cambria Math" panose="02040503050406030204" pitchFamily="18" charset="0"/>
+                        </a:rPr>
+                        <m:t>𝑁</m:t>
+                      </m:r>
+                      <m:r>
+                        <a:rPr lang="en-GB" b="0" i="1" smtClean="0">
+                          <a:latin typeface="Cambria Math" panose="02040503050406030204" pitchFamily="18" charset="0"/>
+                        </a:rPr>
+                        <m:t>=</m:t>
+                      </m:r>
+                      <m:sSup>
+                        <m:sSupPr>
+                          <m:ctrlPr>
+                            <a:rPr lang="en-GB" b="0" i="1" smtClean="0">
+                              <a:latin typeface="Cambria Math" panose="02040503050406030204" pitchFamily="18" charset="0"/>
+                            </a:rPr>
+                          </m:ctrlPr>
+                        </m:sSupPr>
+                        <m:e>
+                          <m:r>
+                            <a:rPr lang="en-GB" b="0" i="1" smtClean="0">
+                              <a:latin typeface="Cambria Math" panose="02040503050406030204" pitchFamily="18" charset="0"/>
+                            </a:rPr>
+                            <m:t>2</m:t>
+                          </m:r>
+                        </m:e>
+                        <m:sup>
+                          <m:r>
+                            <a:rPr lang="en-GB" b="0" i="1" smtClean="0">
+                              <a:latin typeface="Cambria Math" panose="02040503050406030204" pitchFamily="18" charset="0"/>
+                            </a:rPr>
+                            <m:t>10</m:t>
+                          </m:r>
+                        </m:sup>
+                      </m:sSup>
+                    </m:oMath>
+                  </m:oMathPara>
+                </a14:m>
+                <a:endParaRPr lang="en-GB" b="0" i="1" dirty="0">
+                  <a:latin typeface="Cambria Math" panose="02040503050406030204" pitchFamily="18" charset="0"/>
+                </a:endParaRPr>
+              </a:p>
+              <a:p>
+                <a:pPr/>
+                <a14:m>
+                  <m:oMathPara xmlns:m="http://schemas.openxmlformats.org/officeDocument/2006/math">
+                    <m:oMathParaPr>
+                      <m:jc m:val="centerGroup"/>
+                    </m:oMathParaPr>
+                    <m:oMath xmlns:m="http://schemas.openxmlformats.org/officeDocument/2006/math">
+                      <m:r>
+                        <a:rPr lang="en-GB" b="0" i="1" smtClean="0">
+                          <a:latin typeface="Cambria Math" panose="02040503050406030204" pitchFamily="18" charset="0"/>
+                        </a:rPr>
+                        <m:t> </m:t>
+                      </m:r>
+                      <m:r>
+                        <a:rPr lang="en-GB" b="0" i="1" smtClean="0">
+                          <a:latin typeface="Cambria Math" panose="02040503050406030204" pitchFamily="18" charset="0"/>
+                        </a:rPr>
+                        <m:t>𝑇</m:t>
+                      </m:r>
+                      <m:r>
+                        <a:rPr lang="en-GB" b="0" i="1" smtClean="0">
+                          <a:latin typeface="Cambria Math" panose="02040503050406030204" pitchFamily="18" charset="0"/>
+                        </a:rPr>
+                        <m:t>=100</m:t>
+                      </m:r>
+                    </m:oMath>
+                  </m:oMathPara>
+                </a14:m>
+                <a:endParaRPr lang="en-GB" dirty="0"/>
+              </a:p>
+            </p:txBody>
+          </p:sp>
+        </mc:Choice>
+        <mc:Fallback xmlns="">
+          <p:sp>
+            <p:nvSpPr>
+              <p:cNvPr id="17" name="TextBox 16">
+                <a:extLst>
+                  <a:ext uri="{FF2B5EF4-FFF2-40B4-BE49-F238E27FC236}">
+                    <a16:creationId xmlns:a16="http://schemas.microsoft.com/office/drawing/2014/main" id="{BDFD4261-2018-435B-9123-2E1AEF14B894}"/>
+                  </a:ext>
+                </a:extLst>
+              </p:cNvPr>
+              <p:cNvSpPr txBox="1">
+                <a:spLocks noRot="1" noChangeAspect="1" noMove="1" noResize="1" noEditPoints="1" noAdjustHandles="1" noChangeArrowheads="1" noChangeShapeType="1" noTextEdit="1"/>
+              </p:cNvSpPr>
+              <p:nvPr/>
+            </p:nvSpPr>
+            <p:spPr>
+              <a:xfrm>
+                <a:off x="10368542" y="235884"/>
+                <a:ext cx="1800200" cy="830997"/>
+              </a:xfrm>
+              <a:prstGeom prst="rect">
+                <a:avLst/>
+              </a:prstGeom>
+              <a:blipFill>
+                <a:blip r:embed="rId4"/>
+                <a:stretch>
+                  <a:fillRect/>
+                </a:stretch>
+              </a:blipFill>
+            </p:spPr>
+            <p:txBody>
+              <a:bodyPr/>
+              <a:lstStyle/>
+              <a:p>
+                <a:r>
+                  <a:rPr lang="en-GB">
+                    <a:noFill/>
+                  </a:rPr>
+                  <a:t> </a:t>
+                </a:r>
+              </a:p>
+            </p:txBody>
+          </p:sp>
+        </mc:Fallback>
+      </mc:AlternateContent>
+    </p:spTree>
+    <p:extLst>
+      <p:ext uri="{BB962C8B-B14F-4D97-AF65-F5344CB8AC3E}">
+        <p14:creationId xmlns:p14="http://schemas.microsoft.com/office/powerpoint/2010/main" val="3140267031"/>
       </p:ext>
     </p:extLst>
   </p:cSld>
@@ -7310,11 +8263,40 @@
           <a:p>
             <a:r>
               <a:rPr lang="en-US" dirty="0"/>
-              <a:t>Python vs Julia – Random Walk w/ Arrays</a:t>
-            </a:r>
-          </a:p>
-        </p:txBody>
-      </p:sp>
+              <a:t>C++ vs Julia – Random Walk benchmark</a:t>
+            </a:r>
+          </a:p>
+        </p:txBody>
+      </p:sp>
+      <p:pic>
+        <p:nvPicPr>
+          <p:cNvPr id="5" name="Picture 4">
+            <a:extLst>
+              <a:ext uri="{FF2B5EF4-FFF2-40B4-BE49-F238E27FC236}">
+                <a16:creationId xmlns:a16="http://schemas.microsoft.com/office/drawing/2014/main" id="{634AE3F2-F67E-4CBE-8AAC-2A8572CA8810}"/>
+              </a:ext>
+            </a:extLst>
+          </p:cNvPr>
+          <p:cNvPicPr>
+            <a:picLocks noChangeAspect="1"/>
+          </p:cNvPicPr>
+          <p:nvPr/>
+        </p:nvPicPr>
+        <p:blipFill rotWithShape="1">
+          <a:blip r:embed="rId2"/>
+          <a:srcRect r="5523"/>
+          <a:stretch/>
+        </p:blipFill>
+        <p:spPr>
+          <a:xfrm>
+            <a:off x="981845" y="1916833"/>
+            <a:ext cx="3672407" cy="3456384"/>
+          </a:xfrm>
+          <a:prstGeom prst="rect">
+            <a:avLst/>
+          </a:prstGeom>
+        </p:spPr>
+      </p:pic>
       <p:sp>
         <p:nvSpPr>
           <p:cNvPr id="10" name="TextBox 9">
@@ -7329,7 +8311,7 @@
         </p:nvSpPr>
         <p:spPr>
           <a:xfrm>
-            <a:off x="837828" y="2492896"/>
+            <a:off x="837828" y="1446106"/>
             <a:ext cx="1008112" cy="523220"/>
           </a:xfrm>
           <a:prstGeom prst="rect">
@@ -7364,7 +8346,7 @@
         </p:nvSpPr>
         <p:spPr>
           <a:xfrm>
-            <a:off x="507147" y="4400040"/>
+            <a:off x="5895076" y="1427734"/>
             <a:ext cx="1423471" cy="523220"/>
           </a:xfrm>
           <a:prstGeom prst="rect">
@@ -7380,7 +8362,7 @@
           <a:p>
             <a:r>
               <a:rPr lang="en-GB" sz="2800" dirty="0"/>
-              <a:t>Python:</a:t>
+              <a:t>C/C++:</a:t>
             </a:r>
           </a:p>
         </p:txBody>
@@ -7401,7 +8383,7 @@
             </p:nvSpPr>
             <p:spPr>
               <a:xfrm>
-                <a:off x="45740" y="5711415"/>
+                <a:off x="4402224" y="2951946"/>
                 <a:ext cx="1800200" cy="830997"/>
               </a:xfrm>
               <a:prstGeom prst="rect">
@@ -7517,14 +8499,14 @@
             </p:nvSpPr>
             <p:spPr>
               <a:xfrm>
-                <a:off x="45740" y="5711415"/>
+                <a:off x="4402224" y="2951946"/>
                 <a:ext cx="1800200" cy="830997"/>
               </a:xfrm>
               <a:prstGeom prst="rect">
                 <a:avLst/>
               </a:prstGeom>
               <a:blipFill>
-                <a:blip r:embed="rId2"/>
+                <a:blip r:embed="rId3"/>
                 <a:stretch>
                   <a:fillRect/>
                 </a:stretch>
@@ -7559,7 +8541,7 @@
         </p:nvSpPr>
         <p:spPr>
           <a:xfrm>
-            <a:off x="6310436" y="1941184"/>
+            <a:off x="909836" y="5480106"/>
             <a:ext cx="1558445" cy="461665"/>
           </a:xfrm>
           <a:prstGeom prst="rect">
@@ -7574,12 +8556,24 @@
           <a:lstStyle/>
           <a:p>
             <a:r>
-              <a:rPr lang="en-GB" dirty="0"/>
-              <a:t>521</a:t>
-            </a:r>
-            <a:r>
               <a:rPr lang="el-GR" sz="2400" dirty="0"/>
-              <a:t>.900 μ</a:t>
+              <a:t>3</a:t>
+            </a:r>
+            <a:r>
+              <a:rPr lang="en-GB" sz="2400" dirty="0"/>
+              <a:t>13</a:t>
+            </a:r>
+            <a:r>
+              <a:rPr lang="el-GR" sz="2400" dirty="0"/>
+              <a:t>.</a:t>
+            </a:r>
+            <a:r>
+              <a:rPr lang="en-GB" sz="2400" dirty="0"/>
+              <a:t>5</a:t>
+            </a:r>
+            <a:r>
+              <a:rPr lang="el-GR" sz="2400" dirty="0"/>
+              <a:t> μ</a:t>
             </a:r>
             <a:r>
               <a:rPr lang="en-GB" sz="2400" dirty="0"/>
@@ -7602,8 +8596,8 @@
         </p:nvSpPr>
         <p:spPr>
           <a:xfrm>
-            <a:off x="9594852" y="3870217"/>
-            <a:ext cx="2071339" cy="461665"/>
+            <a:off x="9409720" y="5127575"/>
+            <a:ext cx="1855315" cy="461665"/>
           </a:xfrm>
           <a:prstGeom prst="rect">
             <a:avLst/>
@@ -7624,7 +8618,7 @@
                 <a:effectLst/>
                 <a:latin typeface="+mj-lt"/>
               </a:rPr>
-              <a:t>2127.4</a:t>
+              <a:t>509</a:t>
             </a:r>
             <a:r>
               <a:rPr lang="el-GR" sz="2400" dirty="0">
@@ -7655,8 +8649,8 @@
         </p:nvSpPr>
         <p:spPr>
           <a:xfrm>
-            <a:off x="2133972" y="5649861"/>
-            <a:ext cx="6768752" cy="954107"/>
+            <a:off x="4078188" y="5589240"/>
+            <a:ext cx="3024336" cy="954107"/>
           </a:xfrm>
           <a:prstGeom prst="rect">
             <a:avLst/>
@@ -7671,55 +8665,17 @@
           <a:p>
             <a:r>
               <a:rPr lang="en-GB" sz="2800" dirty="0"/>
-              <a:t>Julia is only around 4x faster here, but </a:t>
-            </a:r>
-            <a:r>
-              <a:rPr lang="en-GB" sz="2800" i="1" dirty="0" err="1"/>
-              <a:t>numpy</a:t>
-            </a:r>
-            <a:r>
-              <a:rPr lang="en-GB" sz="2800" dirty="0"/>
-              <a:t> implementation could be better</a:t>
+              <a:t>Julia is around 1.6 times faster here</a:t>
             </a:r>
           </a:p>
         </p:txBody>
       </p:sp>
       <p:pic>
         <p:nvPicPr>
-          <p:cNvPr id="13" name="Picture 12">
+          <p:cNvPr id="3" name="Picture 2">
             <a:extLst>
               <a:ext uri="{FF2B5EF4-FFF2-40B4-BE49-F238E27FC236}">
-                <a16:creationId xmlns:a16="http://schemas.microsoft.com/office/drawing/2014/main" id="{32EE83F9-6E39-4DED-B358-5E6C58DAEDEB}"/>
-              </a:ext>
-            </a:extLst>
-          </p:cNvPr>
-          <p:cNvPicPr>
-            <a:picLocks noChangeAspect="1"/>
-          </p:cNvPicPr>
-          <p:nvPr/>
-        </p:nvPicPr>
-        <p:blipFill>
-          <a:blip r:embed="rId3"/>
-          <a:stretch>
-            <a:fillRect/>
-          </a:stretch>
-        </p:blipFill>
-        <p:spPr>
-          <a:xfrm>
-            <a:off x="1803537" y="1950954"/>
-            <a:ext cx="4416911" cy="1738758"/>
-          </a:xfrm>
-          <a:prstGeom prst="rect">
-            <a:avLst/>
-          </a:prstGeom>
-        </p:spPr>
-      </p:pic>
-      <p:pic>
-        <p:nvPicPr>
-          <p:cNvPr id="18" name="Picture 17">
-            <a:extLst>
-              <a:ext uri="{FF2B5EF4-FFF2-40B4-BE49-F238E27FC236}">
-                <a16:creationId xmlns:a16="http://schemas.microsoft.com/office/drawing/2014/main" id="{28F28C2E-C906-4214-AE6C-850E70614F2B}"/>
+                <a16:creationId xmlns:a16="http://schemas.microsoft.com/office/drawing/2014/main" id="{AE82C52C-860E-4DCC-A7D9-2FD644511145}"/>
               </a:ext>
             </a:extLst>
           </p:cNvPr>
@@ -7736,185 +8692,22 @@
         </p:blipFill>
         <p:spPr>
           <a:xfrm>
-            <a:off x="1773932" y="3870217"/>
-            <a:ext cx="7820920" cy="1582867"/>
+            <a:off x="6035801" y="1916833"/>
+            <a:ext cx="4594083" cy="3134242"/>
           </a:xfrm>
           <a:prstGeom prst="rect">
             <a:avLst/>
           </a:prstGeom>
         </p:spPr>
       </p:pic>
-    </p:spTree>
-    <p:extLst>
-      <p:ext uri="{BB962C8B-B14F-4D97-AF65-F5344CB8AC3E}">
-        <p14:creationId xmlns:p14="http://schemas.microsoft.com/office/powerpoint/2010/main" val="3140267031"/>
-      </p:ext>
-    </p:extLst>
-  </p:cSld>
-  <p:clrMapOvr>
-    <a:masterClrMapping/>
-  </p:clrMapOvr>
-  <mc:AlternateContent xmlns:mc="http://schemas.openxmlformats.org/markup-compatibility/2006" xmlns:p14="http://schemas.microsoft.com/office/powerpoint/2010/main">
-    <mc:Choice Requires="p14">
-      <p:transition spd="med" p14:dur="700">
-        <p:fade/>
-      </p:transition>
-    </mc:Choice>
-    <mc:Fallback xmlns="">
-      <p:transition spd="med">
-        <p:fade/>
-      </p:transition>
-    </mc:Fallback>
-  </mc:AlternateContent>
-</p:sld>
-</file>
-
-<file path=ppt/slides/slide8.xml><?xml version="1.0" encoding="utf-8"?>
-<p:sld xmlns:a="http://schemas.openxmlformats.org/drawingml/2006/main" xmlns:r="http://schemas.openxmlformats.org/officeDocument/2006/relationships" xmlns:p="http://schemas.openxmlformats.org/presentationml/2006/main">
-  <p:cSld>
-    <p:spTree>
-      <p:nvGrpSpPr>
-        <p:cNvPr id="1" name=""/>
-        <p:cNvGrpSpPr/>
-        <p:nvPr/>
-      </p:nvGrpSpPr>
-      <p:grpSpPr>
-        <a:xfrm>
-          <a:off x="0" y="0"/>
-          <a:ext cx="0" cy="0"/>
-          <a:chOff x="0" y="0"/>
-          <a:chExt cx="0" cy="0"/>
-        </a:xfrm>
-      </p:grpSpPr>
-      <p:sp>
-        <p:nvSpPr>
-          <p:cNvPr id="7" name="Title 6"/>
-          <p:cNvSpPr>
-            <a:spLocks noGrp="1"/>
-          </p:cNvSpPr>
-          <p:nvPr>
-            <p:ph type="title"/>
-          </p:nvPr>
-        </p:nvSpPr>
-        <p:spPr/>
-        <p:txBody>
-          <a:bodyPr/>
-          <a:lstStyle/>
-          <a:p>
-            <a:r>
-              <a:rPr lang="en-US" dirty="0"/>
-              <a:t>C++ vs Julia – Random Walk benchmark</a:t>
-            </a:r>
-          </a:p>
-        </p:txBody>
-      </p:sp>
-      <p:pic>
-        <p:nvPicPr>
-          <p:cNvPr id="5" name="Picture 4">
-            <a:extLst>
-              <a:ext uri="{FF2B5EF4-FFF2-40B4-BE49-F238E27FC236}">
-                <a16:creationId xmlns:a16="http://schemas.microsoft.com/office/drawing/2014/main" id="{634AE3F2-F67E-4CBE-8AAC-2A8572CA8810}"/>
-              </a:ext>
-            </a:extLst>
-          </p:cNvPr>
-          <p:cNvPicPr>
-            <a:picLocks noChangeAspect="1"/>
-          </p:cNvPicPr>
-          <p:nvPr/>
-        </p:nvPicPr>
-        <p:blipFill rotWithShape="1">
-          <a:blip r:embed="rId2"/>
-          <a:srcRect r="5523"/>
-          <a:stretch/>
-        </p:blipFill>
-        <p:spPr>
-          <a:xfrm>
-            <a:off x="981845" y="1916833"/>
-            <a:ext cx="3672407" cy="3456384"/>
-          </a:xfrm>
-          <a:prstGeom prst="rect">
-            <a:avLst/>
-          </a:prstGeom>
-        </p:spPr>
-      </p:pic>
-      <p:sp>
-        <p:nvSpPr>
-          <p:cNvPr id="10" name="TextBox 9">
-            <a:extLst>
-              <a:ext uri="{FF2B5EF4-FFF2-40B4-BE49-F238E27FC236}">
-                <a16:creationId xmlns:a16="http://schemas.microsoft.com/office/drawing/2014/main" id="{5CBE6747-4021-4BF2-995D-268C07408E57}"/>
-              </a:ext>
-            </a:extLst>
-          </p:cNvPr>
-          <p:cNvSpPr txBox="1"/>
-          <p:nvPr/>
-        </p:nvSpPr>
-        <p:spPr>
-          <a:xfrm>
-            <a:off x="837828" y="1446106"/>
-            <a:ext cx="1008112" cy="523220"/>
-          </a:xfrm>
-          <a:prstGeom prst="rect">
-            <a:avLst/>
-          </a:prstGeom>
-          <a:noFill/>
-        </p:spPr>
-        <p:txBody>
-          <a:bodyPr wrap="square" rtlCol="0">
-            <a:spAutoFit/>
-          </a:bodyPr>
-          <a:lstStyle/>
-          <a:p>
-            <a:r>
-              <a:rPr lang="en-GB" sz="2800" dirty="0"/>
-              <a:t>Julia:</a:t>
-            </a:r>
-          </a:p>
-        </p:txBody>
-      </p:sp>
-      <p:sp>
-        <p:nvSpPr>
-          <p:cNvPr id="11" name="TextBox 10">
-            <a:extLst>
-              <a:ext uri="{FF2B5EF4-FFF2-40B4-BE49-F238E27FC236}">
-                <a16:creationId xmlns:a16="http://schemas.microsoft.com/office/drawing/2014/main" id="{ADC2E00F-86C3-4205-B51C-9396F8DE7727}"/>
-              </a:ext>
-            </a:extLst>
-          </p:cNvPr>
-          <p:cNvSpPr txBox="1"/>
-          <p:nvPr/>
-        </p:nvSpPr>
-        <p:spPr>
-          <a:xfrm>
-            <a:off x="5895076" y="1427734"/>
-            <a:ext cx="1423471" cy="523220"/>
-          </a:xfrm>
-          <a:prstGeom prst="rect">
-            <a:avLst/>
-          </a:prstGeom>
-          <a:noFill/>
-        </p:spPr>
-        <p:txBody>
-          <a:bodyPr wrap="square" rtlCol="0">
-            <a:spAutoFit/>
-          </a:bodyPr>
-          <a:lstStyle/>
-          <a:p>
-            <a:r>
-              <a:rPr lang="en-GB" sz="2800" dirty="0"/>
-              <a:t>C/C++:</a:t>
-            </a:r>
-          </a:p>
-        </p:txBody>
-      </p:sp>
-      <mc:AlternateContent xmlns:mc="http://schemas.openxmlformats.org/markup-compatibility/2006">
-        <mc:Choice xmlns:a14="http://schemas.microsoft.com/office/drawing/2010/main" Requires="a14">
+      <mc:AlternateContent xmlns:mc="http://schemas.openxmlformats.org/markup-compatibility/2006" xmlns:a14="http://schemas.microsoft.com/office/drawing/2010/main">
+        <mc:Choice Requires="a14">
           <p:sp>
             <p:nvSpPr>
-              <p:cNvPr id="12" name="TextBox 11">
+              <p:cNvPr id="17" name="TextBox 16">
                 <a:extLst>
                   <a:ext uri="{FF2B5EF4-FFF2-40B4-BE49-F238E27FC236}">
-                    <a16:creationId xmlns:a16="http://schemas.microsoft.com/office/drawing/2014/main" id="{559FF724-36FB-4145-8398-97A00EE1109E}"/>
+                    <a16:creationId xmlns:a16="http://schemas.microsoft.com/office/drawing/2014/main" id="{860DB3A6-D2BC-4D73-8E6E-77137C3BCBCC}"/>
                   </a:ext>
                 </a:extLst>
               </p:cNvPr>
@@ -7923,7 +8716,7 @@
             </p:nvSpPr>
             <p:spPr>
               <a:xfrm>
-                <a:off x="4402224" y="2951946"/>
+                <a:off x="10368542" y="235884"/>
                 <a:ext cx="1800200" cy="830997"/>
               </a:xfrm>
               <a:prstGeom prst="rect">
@@ -8022,13 +8815,13 @@
             </p:txBody>
           </p:sp>
         </mc:Choice>
-        <mc:Fallback>
+        <mc:Fallback xmlns="">
           <p:sp>
             <p:nvSpPr>
-              <p:cNvPr id="12" name="TextBox 11">
+              <p:cNvPr id="17" name="TextBox 16">
                 <a:extLst>
                   <a:ext uri="{FF2B5EF4-FFF2-40B4-BE49-F238E27FC236}">
-                    <a16:creationId xmlns:a16="http://schemas.microsoft.com/office/drawing/2014/main" id="{559FF724-36FB-4145-8398-97A00EE1109E}"/>
+                    <a16:creationId xmlns:a16="http://schemas.microsoft.com/office/drawing/2014/main" id="{860DB3A6-D2BC-4D73-8E6E-77137C3BCBCC}"/>
                   </a:ext>
                 </a:extLst>
               </p:cNvPr>
@@ -8039,14 +8832,14 @@
             </p:nvSpPr>
             <p:spPr>
               <a:xfrm>
-                <a:off x="4402224" y="2951946"/>
+                <a:off x="10368542" y="235884"/>
                 <a:ext cx="1800200" cy="830997"/>
               </a:xfrm>
               <a:prstGeom prst="rect">
                 <a:avLst/>
               </a:prstGeom>
               <a:blipFill>
-                <a:blip r:embed="rId3"/>
+                <a:blip r:embed="rId5"/>
                 <a:stretch>
                   <a:fillRect/>
                 </a:stretch>
@@ -8067,163 +8860,6 @@
           </p:sp>
         </mc:Fallback>
       </mc:AlternateContent>
-      <p:sp>
-        <p:nvSpPr>
-          <p:cNvPr id="14" name="TextBox 13">
-            <a:extLst>
-              <a:ext uri="{FF2B5EF4-FFF2-40B4-BE49-F238E27FC236}">
-                <a16:creationId xmlns:a16="http://schemas.microsoft.com/office/drawing/2014/main" id="{2AD6DDD0-7208-4DCD-B580-E606DB0FDA76}"/>
-              </a:ext>
-            </a:extLst>
-          </p:cNvPr>
-          <p:cNvSpPr txBox="1"/>
-          <p:nvPr/>
-        </p:nvSpPr>
-        <p:spPr>
-          <a:xfrm>
-            <a:off x="909836" y="5480106"/>
-            <a:ext cx="1558445" cy="461665"/>
-          </a:xfrm>
-          <a:prstGeom prst="rect">
-            <a:avLst/>
-          </a:prstGeom>
-          <a:noFill/>
-        </p:spPr>
-        <p:txBody>
-          <a:bodyPr wrap="square">
-            <a:spAutoFit/>
-          </a:bodyPr>
-          <a:lstStyle/>
-          <a:p>
-            <a:r>
-              <a:rPr lang="el-GR" sz="2400" dirty="0"/>
-              <a:t>351.900 μ</a:t>
-            </a:r>
-            <a:r>
-              <a:rPr lang="en-GB" sz="2400" dirty="0"/>
-              <a:t>s</a:t>
-            </a:r>
-          </a:p>
-        </p:txBody>
-      </p:sp>
-      <p:sp>
-        <p:nvSpPr>
-          <p:cNvPr id="15" name="TextBox 14">
-            <a:extLst>
-              <a:ext uri="{FF2B5EF4-FFF2-40B4-BE49-F238E27FC236}">
-                <a16:creationId xmlns:a16="http://schemas.microsoft.com/office/drawing/2014/main" id="{A5577604-75DE-48F5-8F6C-543AD75984CC}"/>
-              </a:ext>
-            </a:extLst>
-          </p:cNvPr>
-          <p:cNvSpPr txBox="1"/>
-          <p:nvPr/>
-        </p:nvSpPr>
-        <p:spPr>
-          <a:xfrm>
-            <a:off x="9409720" y="5127575"/>
-            <a:ext cx="1855315" cy="461665"/>
-          </a:xfrm>
-          <a:prstGeom prst="rect">
-            <a:avLst/>
-          </a:prstGeom>
-          <a:noFill/>
-        </p:spPr>
-        <p:txBody>
-          <a:bodyPr wrap="square">
-            <a:spAutoFit/>
-          </a:bodyPr>
-          <a:lstStyle/>
-          <a:p>
-            <a:r>
-              <a:rPr lang="en-GB" b="0" dirty="0">
-                <a:solidFill>
-                  <a:srgbClr val="D4D4D4"/>
-                </a:solidFill>
-                <a:effectLst/>
-                <a:latin typeface="+mj-lt"/>
-              </a:rPr>
-              <a:t>996</a:t>
-            </a:r>
-            <a:r>
-              <a:rPr lang="el-GR" sz="2400" dirty="0">
-                <a:latin typeface="+mj-lt"/>
-              </a:rPr>
-              <a:t> μ</a:t>
-            </a:r>
-            <a:r>
-              <a:rPr lang="en-GB" sz="2400" dirty="0">
-                <a:latin typeface="+mj-lt"/>
-              </a:rPr>
-              <a:t>s</a:t>
-            </a:r>
-          </a:p>
-        </p:txBody>
-      </p:sp>
-      <p:sp>
-        <p:nvSpPr>
-          <p:cNvPr id="16" name="TextBox 15">
-            <a:extLst>
-              <a:ext uri="{FF2B5EF4-FFF2-40B4-BE49-F238E27FC236}">
-                <a16:creationId xmlns:a16="http://schemas.microsoft.com/office/drawing/2014/main" id="{B90FFED5-42C2-4AF9-BC05-69D2E6AA9876}"/>
-              </a:ext>
-            </a:extLst>
-          </p:cNvPr>
-          <p:cNvSpPr txBox="1"/>
-          <p:nvPr/>
-        </p:nvSpPr>
-        <p:spPr>
-          <a:xfrm>
-            <a:off x="4078188" y="5589240"/>
-            <a:ext cx="3024336" cy="954107"/>
-          </a:xfrm>
-          <a:prstGeom prst="rect">
-            <a:avLst/>
-          </a:prstGeom>
-          <a:noFill/>
-        </p:spPr>
-        <p:txBody>
-          <a:bodyPr wrap="square" rtlCol="0">
-            <a:spAutoFit/>
-          </a:bodyPr>
-          <a:lstStyle/>
-          <a:p>
-            <a:r>
-              <a:rPr lang="en-GB" sz="2800" dirty="0"/>
-              <a:t>Julia is around 2.8 times faster here</a:t>
-            </a:r>
-          </a:p>
-        </p:txBody>
-      </p:sp>
-      <p:pic>
-        <p:nvPicPr>
-          <p:cNvPr id="3" name="Picture 2">
-            <a:extLst>
-              <a:ext uri="{FF2B5EF4-FFF2-40B4-BE49-F238E27FC236}">
-                <a16:creationId xmlns:a16="http://schemas.microsoft.com/office/drawing/2014/main" id="{AE82C52C-860E-4DCC-A7D9-2FD644511145}"/>
-              </a:ext>
-            </a:extLst>
-          </p:cNvPr>
-          <p:cNvPicPr>
-            <a:picLocks noChangeAspect="1"/>
-          </p:cNvPicPr>
-          <p:nvPr/>
-        </p:nvPicPr>
-        <p:blipFill>
-          <a:blip r:embed="rId4"/>
-          <a:stretch>
-            <a:fillRect/>
-          </a:stretch>
-        </p:blipFill>
-        <p:spPr>
-          <a:xfrm>
-            <a:off x="6035801" y="1916833"/>
-            <a:ext cx="4594083" cy="3134242"/>
-          </a:xfrm>
-          <a:prstGeom prst="rect">
-            <a:avLst/>
-          </a:prstGeom>
-        </p:spPr>
-      </p:pic>
     </p:spTree>
     <p:extLst>
       <p:ext uri="{BB962C8B-B14F-4D97-AF65-F5344CB8AC3E}">
@@ -8234,13 +8870,126 @@
   <p:clrMapOvr>
     <a:masterClrMapping/>
   </p:clrMapOvr>
-  <mc:AlternateContent xmlns:mc="http://schemas.openxmlformats.org/markup-compatibility/2006">
-    <mc:Choice xmlns:p14="http://schemas.microsoft.com/office/powerpoint/2010/main" Requires="p14">
+  <mc:AlternateContent xmlns:mc="http://schemas.openxmlformats.org/markup-compatibility/2006" xmlns:p14="http://schemas.microsoft.com/office/powerpoint/2010/main">
+    <mc:Choice Requires="p14">
       <p:transition spd="med" p14:dur="700">
         <p:fade/>
       </p:transition>
     </mc:Choice>
-    <mc:Fallback>
+    <mc:Fallback xmlns="">
+      <p:transition spd="med">
+        <p:fade/>
+      </p:transition>
+    </mc:Fallback>
+  </mc:AlternateContent>
+</p:sld>
+</file>
+
+<file path=ppt/slides/slide8.xml><?xml version="1.0" encoding="utf-8"?>
+<p:sld xmlns:a="http://schemas.openxmlformats.org/drawingml/2006/main" xmlns:r="http://schemas.openxmlformats.org/officeDocument/2006/relationships" xmlns:p="http://schemas.openxmlformats.org/presentationml/2006/main">
+  <p:cSld>
+    <p:spTree>
+      <p:nvGrpSpPr>
+        <p:cNvPr id="1" name=""/>
+        <p:cNvGrpSpPr/>
+        <p:nvPr/>
+      </p:nvGrpSpPr>
+      <p:grpSpPr>
+        <a:xfrm>
+          <a:off x="0" y="0"/>
+          <a:ext cx="0" cy="0"/>
+          <a:chOff x="0" y="0"/>
+          <a:chExt cx="0" cy="0"/>
+        </a:xfrm>
+      </p:grpSpPr>
+      <p:sp>
+        <p:nvSpPr>
+          <p:cNvPr id="2" name="Title 1">
+            <a:extLst>
+              <a:ext uri="{FF2B5EF4-FFF2-40B4-BE49-F238E27FC236}">
+                <a16:creationId xmlns:a16="http://schemas.microsoft.com/office/drawing/2014/main" id="{ECAA9B76-FD9F-44EF-8DB7-3FDEB584DA62}"/>
+              </a:ext>
+            </a:extLst>
+          </p:cNvPr>
+          <p:cNvSpPr>
+            <a:spLocks noGrp="1"/>
+          </p:cNvSpPr>
+          <p:nvPr>
+            <p:ph type="title"/>
+          </p:nvPr>
+        </p:nvSpPr>
+        <p:spPr/>
+        <p:txBody>
+          <a:bodyPr/>
+          <a:lstStyle/>
+          <a:p>
+            <a:r>
+              <a:rPr lang="en-GB" dirty="0"/>
+              <a:t>Why is Julia fast?</a:t>
+            </a:r>
+          </a:p>
+        </p:txBody>
+      </p:sp>
+      <p:sp>
+        <p:nvSpPr>
+          <p:cNvPr id="3" name="Content Placeholder 2">
+            <a:extLst>
+              <a:ext uri="{FF2B5EF4-FFF2-40B4-BE49-F238E27FC236}">
+                <a16:creationId xmlns:a16="http://schemas.microsoft.com/office/drawing/2014/main" id="{F5F5B70C-1C24-427D-82A7-02585375B068}"/>
+              </a:ext>
+            </a:extLst>
+          </p:cNvPr>
+          <p:cNvSpPr>
+            <a:spLocks noGrp="1"/>
+          </p:cNvSpPr>
+          <p:nvPr>
+            <p:ph idx="1"/>
+          </p:nvPr>
+        </p:nvSpPr>
+        <p:spPr/>
+        <p:txBody>
+          <a:bodyPr/>
+          <a:lstStyle/>
+          <a:p>
+            <a:r>
+              <a:rPr lang="en-GB" dirty="0"/>
+              <a:t>Just-in-Time compiled, which specialises on the types of the variables.</a:t>
+            </a:r>
+          </a:p>
+          <a:p>
+            <a:r>
+              <a:rPr lang="en-GB" dirty="0"/>
+              <a:t>Compiler tries to perform many optimisations, such as Single Instruction Multiple Data (SIMD) commands which most modern CPUs support.</a:t>
+            </a:r>
+          </a:p>
+          <a:p>
+            <a:r>
+              <a:rPr lang="en-GB" dirty="0"/>
+              <a:t>Only fast if type stable!</a:t>
+            </a:r>
+          </a:p>
+          <a:p>
+            <a:endParaRPr lang="en-GB" dirty="0"/>
+          </a:p>
+        </p:txBody>
+      </p:sp>
+    </p:spTree>
+    <p:extLst>
+      <p:ext uri="{BB962C8B-B14F-4D97-AF65-F5344CB8AC3E}">
+        <p14:creationId xmlns:p14="http://schemas.microsoft.com/office/powerpoint/2010/main" val="339341134"/>
+      </p:ext>
+    </p:extLst>
+  </p:cSld>
+  <p:clrMapOvr>
+    <a:masterClrMapping/>
+  </p:clrMapOvr>
+  <mc:AlternateContent xmlns:mc="http://schemas.openxmlformats.org/markup-compatibility/2006" xmlns:p14="http://schemas.microsoft.com/office/powerpoint/2010/main">
+    <mc:Choice Requires="p14">
+      <p:transition spd="med" p14:dur="700">
+        <p:fade/>
+      </p:transition>
+    </mc:Choice>
+    <mc:Fallback xmlns="">
       <p:transition spd="med">
         <p:fade/>
       </p:transition>
@@ -8271,7 +9020,7 @@
           <p:cNvPr id="2" name="Title 1">
             <a:extLst>
               <a:ext uri="{FF2B5EF4-FFF2-40B4-BE49-F238E27FC236}">
-                <a16:creationId xmlns:a16="http://schemas.microsoft.com/office/drawing/2014/main" id="{ECAA9B76-FD9F-44EF-8DB7-3FDEB584DA62}"/>
+                <a16:creationId xmlns:a16="http://schemas.microsoft.com/office/drawing/2014/main" id="{FB63C181-98E7-4318-849D-41C99B0D9267}"/>
               </a:ext>
             </a:extLst>
           </p:cNvPr>
@@ -8282,65 +9031,29 @@
             <p:ph type="title"/>
           </p:nvPr>
         </p:nvSpPr>
-        <p:spPr/>
-        <p:txBody>
-          <a:bodyPr/>
+        <p:spPr>
+          <a:xfrm>
+            <a:off x="4006180" y="2780928"/>
+            <a:ext cx="3744416" cy="1165944"/>
+          </a:xfrm>
+        </p:spPr>
+        <p:txBody>
+          <a:bodyPr>
+            <a:normAutofit/>
+          </a:bodyPr>
           <a:lstStyle/>
           <a:p>
             <a:r>
-              <a:rPr lang="en-GB" dirty="0"/>
-              <a:t>Why is Julia fast?</a:t>
-            </a:r>
-          </a:p>
-        </p:txBody>
-      </p:sp>
-      <p:sp>
-        <p:nvSpPr>
-          <p:cNvPr id="3" name="Content Placeholder 2">
-            <a:extLst>
-              <a:ext uri="{FF2B5EF4-FFF2-40B4-BE49-F238E27FC236}">
-                <a16:creationId xmlns:a16="http://schemas.microsoft.com/office/drawing/2014/main" id="{F5F5B70C-1C24-427D-82A7-02585375B068}"/>
-              </a:ext>
-            </a:extLst>
-          </p:cNvPr>
-          <p:cNvSpPr>
-            <a:spLocks noGrp="1"/>
-          </p:cNvSpPr>
-          <p:nvPr>
-            <p:ph idx="1"/>
-          </p:nvPr>
-        </p:nvSpPr>
-        <p:spPr/>
-        <p:txBody>
-          <a:bodyPr/>
-          <a:lstStyle/>
-          <a:p>
-            <a:r>
-              <a:rPr lang="en-GB" dirty="0"/>
-              <a:t>Just-in-Time compiled, which specialises on the types of the variables.</a:t>
-            </a:r>
-          </a:p>
-          <a:p>
-            <a:r>
-              <a:rPr lang="en-GB" dirty="0"/>
-              <a:t>Compiler tries to perform many optimisations, such as Single Instruction Multiple Data (SIMD) commands which most modern CPUs support.</a:t>
-            </a:r>
-          </a:p>
-          <a:p>
-            <a:r>
-              <a:rPr lang="en-GB" dirty="0"/>
-              <a:t>Only fast if type stable!</a:t>
-            </a:r>
-          </a:p>
-          <a:p>
-            <a:endParaRPr lang="en-GB" dirty="0"/>
+              <a:rPr lang="en-GB" sz="7200" dirty="0"/>
+              <a:t>So what?</a:t>
+            </a:r>
           </a:p>
         </p:txBody>
       </p:sp>
     </p:spTree>
     <p:extLst>
       <p:ext uri="{BB962C8B-B14F-4D97-AF65-F5344CB8AC3E}">
-        <p14:creationId xmlns:p14="http://schemas.microsoft.com/office/powerpoint/2010/main" val="339341134"/>
+        <p14:creationId xmlns:p14="http://schemas.microsoft.com/office/powerpoint/2010/main" val="1631259258"/>
       </p:ext>
     </p:extLst>
   </p:cSld>
@@ -9313,6 +10026,142 @@
 </file>
 
 <file path=customXml/item1.xml><?xml version="1.0" encoding="utf-8"?>
+<p:properties xmlns:p="http://schemas.microsoft.com/office/2006/metadata/properties" xmlns:xsi="http://www.w3.org/2001/XMLSchema-instance" xmlns:pc="http://schemas.microsoft.com/office/infopath/2007/PartnerControls">
+  <documentManagement>
+    <LocPublishedLinkedAssetsLookup xmlns="4873beb7-5857-4685-be1f-d57550cc96cc" xsi:nil="true"/>
+    <ApprovalStatus xmlns="4873beb7-5857-4685-be1f-d57550cc96cc">InProgress</ApprovalStatus>
+    <MarketSpecific xmlns="4873beb7-5857-4685-be1f-d57550cc96cc">false</MarketSpecific>
+    <LocComments xmlns="4873beb7-5857-4685-be1f-d57550cc96cc" xsi:nil="true"/>
+    <LocLastLocAttemptVersionTypeLookup xmlns="4873beb7-5857-4685-be1f-d57550cc96cc" xsi:nil="true"/>
+    <DirectSourceMarket xmlns="4873beb7-5857-4685-be1f-d57550cc96cc" xsi:nil="true"/>
+    <ThumbnailAssetId xmlns="4873beb7-5857-4685-be1f-d57550cc96cc" xsi:nil="true"/>
+    <PrimaryImageGen xmlns="4873beb7-5857-4685-be1f-d57550cc96cc">false</PrimaryImageGen>
+    <LocNewPublishedVersionLookup xmlns="4873beb7-5857-4685-be1f-d57550cc96cc" xsi:nil="true"/>
+    <LegacyData xmlns="4873beb7-5857-4685-be1f-d57550cc96cc" xsi:nil="true"/>
+    <LocRecommendedHandoff xmlns="4873beb7-5857-4685-be1f-d57550cc96cc" xsi:nil="true"/>
+    <BusinessGroup xmlns="4873beb7-5857-4685-be1f-d57550cc96cc" xsi:nil="true"/>
+    <BlockPublish xmlns="4873beb7-5857-4685-be1f-d57550cc96cc">false</BlockPublish>
+    <TPFriendlyName xmlns="4873beb7-5857-4685-be1f-d57550cc96cc" xsi:nil="true"/>
+    <LocOverallPublishStatusLookup xmlns="4873beb7-5857-4685-be1f-d57550cc96cc" xsi:nil="true"/>
+    <NumericId xmlns="4873beb7-5857-4685-be1f-d57550cc96cc" xsi:nil="true"/>
+    <APEditor xmlns="4873beb7-5857-4685-be1f-d57550cc96cc">
+      <UserInfo>
+        <DisplayName/>
+        <AccountId xsi:nil="true"/>
+        <AccountType/>
+      </UserInfo>
+    </APEditor>
+    <SourceTitle xmlns="4873beb7-5857-4685-be1f-d57550cc96cc" xsi:nil="true"/>
+    <OpenTemplate xmlns="4873beb7-5857-4685-be1f-d57550cc96cc">true</OpenTemplate>
+    <LocOverallLocStatusLookup xmlns="4873beb7-5857-4685-be1f-d57550cc96cc" xsi:nil="true"/>
+    <UALocComments xmlns="4873beb7-5857-4685-be1f-d57550cc96cc" xsi:nil="true"/>
+    <ParentAssetId xmlns="4873beb7-5857-4685-be1f-d57550cc96cc" xsi:nil="true"/>
+    <IntlLangReviewDate xmlns="4873beb7-5857-4685-be1f-d57550cc96cc" xsi:nil="true"/>
+    <FeatureTagsTaxHTField0 xmlns="4873beb7-5857-4685-be1f-d57550cc96cc">
+      <Terms xmlns="http://schemas.microsoft.com/office/infopath/2007/PartnerControls"/>
+    </FeatureTagsTaxHTField0>
+    <PublishStatusLookup xmlns="4873beb7-5857-4685-be1f-d57550cc96cc">
+      <Value>1345093</Value>
+    </PublishStatusLookup>
+    <Providers xmlns="4873beb7-5857-4685-be1f-d57550cc96cc" xsi:nil="true"/>
+    <MachineTranslated xmlns="4873beb7-5857-4685-be1f-d57550cc96cc">false</MachineTranslated>
+    <OriginalSourceMarket xmlns="4873beb7-5857-4685-be1f-d57550cc96cc" xsi:nil="true"/>
+    <APDescription xmlns="4873beb7-5857-4685-be1f-d57550cc96cc">This simple template design works for technology and  businesses, but it's versatile enough to use in other contexts.  It features multiple slide layouts designed for widescreen (16x9 resolution) and includes a sample SmartArt list and chart that are easily editable.</APDescription>
+    <ClipArtFilename xmlns="4873beb7-5857-4685-be1f-d57550cc96cc" xsi:nil="true"/>
+    <ContentItem xmlns="4873beb7-5857-4685-be1f-d57550cc96cc" xsi:nil="true"/>
+    <TPInstallLocation xmlns="4873beb7-5857-4685-be1f-d57550cc96cc" xsi:nil="true"/>
+    <PublishTargets xmlns="4873beb7-5857-4685-be1f-d57550cc96cc">OfficeOnlineVNext</PublishTargets>
+    <TimesCloned xmlns="4873beb7-5857-4685-be1f-d57550cc96cc" xsi:nil="true"/>
+    <AssetStart xmlns="4873beb7-5857-4685-be1f-d57550cc96cc">2011-11-26T00:30:00+00:00</AssetStart>
+    <Provider xmlns="4873beb7-5857-4685-be1f-d57550cc96cc" xsi:nil="true"/>
+    <AcquiredFrom xmlns="4873beb7-5857-4685-be1f-d57550cc96cc">Internal MS</AcquiredFrom>
+    <FriendlyTitle xmlns="4873beb7-5857-4685-be1f-d57550cc96cc" xsi:nil="true"/>
+    <LastHandOff xmlns="4873beb7-5857-4685-be1f-d57550cc96cc" xsi:nil="true"/>
+    <TPClientViewer xmlns="4873beb7-5857-4685-be1f-d57550cc96cc" xsi:nil="true"/>
+    <TemplateStatus xmlns="4873beb7-5857-4685-be1f-d57550cc96cc">Complete</TemplateStatus>
+    <Downloads xmlns="4873beb7-5857-4685-be1f-d57550cc96cc">0</Downloads>
+    <OOCacheId xmlns="4873beb7-5857-4685-be1f-d57550cc96cc" xsi:nil="true"/>
+    <IsDeleted xmlns="4873beb7-5857-4685-be1f-d57550cc96cc">false</IsDeleted>
+    <LocPublishedDependentAssetsLookup xmlns="4873beb7-5857-4685-be1f-d57550cc96cc" xsi:nil="true"/>
+    <TPExecutable xmlns="4873beb7-5857-4685-be1f-d57550cc96cc" xsi:nil="true"/>
+    <EditorialTags xmlns="4873beb7-5857-4685-be1f-d57550cc96cc" xsi:nil="true"/>
+    <SubmitterId xmlns="4873beb7-5857-4685-be1f-d57550cc96cc" xsi:nil="true"/>
+    <ApprovalLog xmlns="4873beb7-5857-4685-be1f-d57550cc96cc" xsi:nil="true"/>
+    <AssetType xmlns="4873beb7-5857-4685-be1f-d57550cc96cc">TP</AssetType>
+    <BugNumber xmlns="4873beb7-5857-4685-be1f-d57550cc96cc" xsi:nil="true"/>
+    <CSXSubmissionDate xmlns="4873beb7-5857-4685-be1f-d57550cc96cc" xsi:nil="true"/>
+    <CSXUpdate xmlns="4873beb7-5857-4685-be1f-d57550cc96cc">false</CSXUpdate>
+    <Milestone xmlns="4873beb7-5857-4685-be1f-d57550cc96cc" xsi:nil="true"/>
+    <RecommendationsModifier xmlns="4873beb7-5857-4685-be1f-d57550cc96cc" xsi:nil="true"/>
+    <OriginAsset xmlns="4873beb7-5857-4685-be1f-d57550cc96cc" xsi:nil="true"/>
+    <TPComponent xmlns="4873beb7-5857-4685-be1f-d57550cc96cc" xsi:nil="true"/>
+    <AssetId xmlns="4873beb7-5857-4685-be1f-d57550cc96cc">TP102787989</AssetId>
+    <IntlLocPriority xmlns="4873beb7-5857-4685-be1f-d57550cc96cc" xsi:nil="true"/>
+    <PolicheckWords xmlns="4873beb7-5857-4685-be1f-d57550cc96cc" xsi:nil="true"/>
+    <TPLaunchHelpLink xmlns="4873beb7-5857-4685-be1f-d57550cc96cc" xsi:nil="true"/>
+    <TPApplication xmlns="4873beb7-5857-4685-be1f-d57550cc96cc" xsi:nil="true"/>
+    <CrawlForDependencies xmlns="4873beb7-5857-4685-be1f-d57550cc96cc">false</CrawlForDependencies>
+    <HandoffToMSDN xmlns="4873beb7-5857-4685-be1f-d57550cc96cc" xsi:nil="true"/>
+    <PlannedPubDate xmlns="4873beb7-5857-4685-be1f-d57550cc96cc" xsi:nil="true"/>
+    <IntlLangReviewer xmlns="4873beb7-5857-4685-be1f-d57550cc96cc" xsi:nil="true"/>
+    <TrustLevel xmlns="4873beb7-5857-4685-be1f-d57550cc96cc">1 Microsoft Managed Content</TrustLevel>
+    <LocLastLocAttemptVersionLookup xmlns="4873beb7-5857-4685-be1f-d57550cc96cc">694266</LocLastLocAttemptVersionLookup>
+    <LocProcessedForHandoffsLookup xmlns="4873beb7-5857-4685-be1f-d57550cc96cc" xsi:nil="true"/>
+    <IsSearchable xmlns="4873beb7-5857-4685-be1f-d57550cc96cc">true</IsSearchable>
+    <TemplateTemplateType xmlns="4873beb7-5857-4685-be1f-d57550cc96cc">PowerPoint Presentation Template</TemplateTemplateType>
+    <CampaignTagsTaxHTField0 xmlns="4873beb7-5857-4685-be1f-d57550cc96cc">
+      <Terms xmlns="http://schemas.microsoft.com/office/infopath/2007/PartnerControls"/>
+    </CampaignTagsTaxHTField0>
+    <TPNamespace xmlns="4873beb7-5857-4685-be1f-d57550cc96cc" xsi:nil="true"/>
+    <LocOverallPreviewStatusLookup xmlns="4873beb7-5857-4685-be1f-d57550cc96cc" xsi:nil="true"/>
+    <TaxCatchAll xmlns="4873beb7-5857-4685-be1f-d57550cc96cc"/>
+    <Markets xmlns="4873beb7-5857-4685-be1f-d57550cc96cc"/>
+    <UAProjectedTotalWords xmlns="4873beb7-5857-4685-be1f-d57550cc96cc" xsi:nil="true"/>
+    <IntlLangReview xmlns="4873beb7-5857-4685-be1f-d57550cc96cc" xsi:nil="true"/>
+    <OutputCachingOn xmlns="4873beb7-5857-4685-be1f-d57550cc96cc">false</OutputCachingOn>
+    <AverageRating xmlns="4873beb7-5857-4685-be1f-d57550cc96cc" xsi:nil="true"/>
+    <APAuthor xmlns="4873beb7-5857-4685-be1f-d57550cc96cc">
+      <UserInfo>
+        <DisplayName>REDMOND\kristaa</DisplayName>
+        <AccountId>136</AccountId>
+        <AccountType/>
+      </UserInfo>
+    </APAuthor>
+    <LocManualTestRequired xmlns="4873beb7-5857-4685-be1f-d57550cc96cc">false</LocManualTestRequired>
+    <TPCommandLine xmlns="4873beb7-5857-4685-be1f-d57550cc96cc" xsi:nil="true"/>
+    <TPAppVersion xmlns="4873beb7-5857-4685-be1f-d57550cc96cc" xsi:nil="true"/>
+    <EditorialStatus xmlns="4873beb7-5857-4685-be1f-d57550cc96cc">Complete</EditorialStatus>
+    <LastModifiedDateTime xmlns="4873beb7-5857-4685-be1f-d57550cc96cc" xsi:nil="true"/>
+    <ScenarioTagsTaxHTField0 xmlns="4873beb7-5857-4685-be1f-d57550cc96cc">
+      <Terms xmlns="http://schemas.microsoft.com/office/infopath/2007/PartnerControls"/>
+    </ScenarioTagsTaxHTField0>
+    <LocProcessedForMarketsLookup xmlns="4873beb7-5857-4685-be1f-d57550cc96cc" xsi:nil="true"/>
+    <TPLaunchHelpLinkType xmlns="4873beb7-5857-4685-be1f-d57550cc96cc">Template</TPLaunchHelpLinkType>
+    <OriginalRelease xmlns="4873beb7-5857-4685-be1f-d57550cc96cc">15</OriginalRelease>
+    <LocalizationTagsTaxHTField0 xmlns="4873beb7-5857-4685-be1f-d57550cc96cc">
+      <Terms xmlns="http://schemas.microsoft.com/office/infopath/2007/PartnerControls"/>
+    </LocalizationTagsTaxHTField0>
+    <UACurrentWords xmlns="4873beb7-5857-4685-be1f-d57550cc96cc" xsi:nil="true"/>
+    <ArtSampleDocs xmlns="4873beb7-5857-4685-be1f-d57550cc96cc" xsi:nil="true"/>
+    <UALocRecommendation xmlns="4873beb7-5857-4685-be1f-d57550cc96cc">Localize</UALocRecommendation>
+    <Manager xmlns="4873beb7-5857-4685-be1f-d57550cc96cc" xsi:nil="true"/>
+    <LocOverallHandbackStatusLookup xmlns="4873beb7-5857-4685-be1f-d57550cc96cc" xsi:nil="true"/>
+    <ShowIn xmlns="4873beb7-5857-4685-be1f-d57550cc96cc">Show everywhere</ShowIn>
+    <UANotes xmlns="4873beb7-5857-4685-be1f-d57550cc96cc" xsi:nil="true"/>
+    <InternalTagsTaxHTField0 xmlns="4873beb7-5857-4685-be1f-d57550cc96cc">
+      <Terms xmlns="http://schemas.microsoft.com/office/infopath/2007/PartnerControls"/>
+    </InternalTagsTaxHTField0>
+    <CSXHash xmlns="4873beb7-5857-4685-be1f-d57550cc96cc" xsi:nil="true"/>
+    <VoteCount xmlns="4873beb7-5857-4685-be1f-d57550cc96cc" xsi:nil="true"/>
+    <AssetExpire xmlns="4873beb7-5857-4685-be1f-d57550cc96cc">2029-05-12T07:00:00+00:00</AssetExpire>
+    <DSATActionTaken xmlns="4873beb7-5857-4685-be1f-d57550cc96cc" xsi:nil="true"/>
+    <CSXSubmissionMarket xmlns="4873beb7-5857-4685-be1f-d57550cc96cc" xsi:nil="true"/>
+    <LocMarketGroupTiers2 xmlns="4873beb7-5857-4685-be1f-d57550cc96cc" xsi:nil="true"/>
+  </documentManagement>
+</p:properties>
+</file>
+
+<file path=customXml/item2.xml><?xml version="1.0" encoding="utf-8"?>
 <ct:contentTypeSchema xmlns:ct="http://schemas.microsoft.com/office/2006/metadata/contentType" xmlns:ma="http://schemas.microsoft.com/office/2006/metadata/properties/metaAttributes" ct:_="" ma:_="" ma:contentTypeName="TemplateFile" ma:contentTypeID="0x0101006EDDDB5EE6D98C44930B742096920B300400F5B6D36B3EF94B4E9A635CDF2A18F5B8" ma:contentTypeVersion="72" ma:contentTypeDescription="Create a new document." ma:contentTypeScope="" ma:versionID="a23e56308344d904b51738559c3d67c9">
   <xsd:schema xmlns:xsd="http://www.w3.org/2001/XMLSchema" xmlns:xs="http://www.w3.org/2001/XMLSchema" xmlns:p="http://schemas.microsoft.com/office/2006/metadata/properties" xmlns:ns2="4873beb7-5857-4685-be1f-d57550cc96cc" targetNamespace="http://schemas.microsoft.com/office/2006/metadata/properties" ma:root="true" ma:fieldsID="cd0908cc4600e77bf5da051303e00c8d" ns2:_="">
     <xsd:import namespace="4873beb7-5857-4685-be1f-d57550cc96cc"/>
@@ -10352,142 +11201,6 @@
 </ct:contentTypeSchema>
 </file>
 
-<file path=customXml/item2.xml><?xml version="1.0" encoding="utf-8"?>
-<p:properties xmlns:p="http://schemas.microsoft.com/office/2006/metadata/properties" xmlns:xsi="http://www.w3.org/2001/XMLSchema-instance" xmlns:pc="http://schemas.microsoft.com/office/infopath/2007/PartnerControls">
-  <documentManagement>
-    <LocPublishedLinkedAssetsLookup xmlns="4873beb7-5857-4685-be1f-d57550cc96cc" xsi:nil="true"/>
-    <ApprovalStatus xmlns="4873beb7-5857-4685-be1f-d57550cc96cc">InProgress</ApprovalStatus>
-    <MarketSpecific xmlns="4873beb7-5857-4685-be1f-d57550cc96cc">false</MarketSpecific>
-    <LocComments xmlns="4873beb7-5857-4685-be1f-d57550cc96cc" xsi:nil="true"/>
-    <LocLastLocAttemptVersionTypeLookup xmlns="4873beb7-5857-4685-be1f-d57550cc96cc" xsi:nil="true"/>
-    <DirectSourceMarket xmlns="4873beb7-5857-4685-be1f-d57550cc96cc" xsi:nil="true"/>
-    <ThumbnailAssetId xmlns="4873beb7-5857-4685-be1f-d57550cc96cc" xsi:nil="true"/>
-    <PrimaryImageGen xmlns="4873beb7-5857-4685-be1f-d57550cc96cc">false</PrimaryImageGen>
-    <LocNewPublishedVersionLookup xmlns="4873beb7-5857-4685-be1f-d57550cc96cc" xsi:nil="true"/>
-    <LegacyData xmlns="4873beb7-5857-4685-be1f-d57550cc96cc" xsi:nil="true"/>
-    <LocRecommendedHandoff xmlns="4873beb7-5857-4685-be1f-d57550cc96cc" xsi:nil="true"/>
-    <BusinessGroup xmlns="4873beb7-5857-4685-be1f-d57550cc96cc" xsi:nil="true"/>
-    <BlockPublish xmlns="4873beb7-5857-4685-be1f-d57550cc96cc">false</BlockPublish>
-    <TPFriendlyName xmlns="4873beb7-5857-4685-be1f-d57550cc96cc" xsi:nil="true"/>
-    <LocOverallPublishStatusLookup xmlns="4873beb7-5857-4685-be1f-d57550cc96cc" xsi:nil="true"/>
-    <NumericId xmlns="4873beb7-5857-4685-be1f-d57550cc96cc" xsi:nil="true"/>
-    <APEditor xmlns="4873beb7-5857-4685-be1f-d57550cc96cc">
-      <UserInfo>
-        <DisplayName/>
-        <AccountId xsi:nil="true"/>
-        <AccountType/>
-      </UserInfo>
-    </APEditor>
-    <SourceTitle xmlns="4873beb7-5857-4685-be1f-d57550cc96cc" xsi:nil="true"/>
-    <OpenTemplate xmlns="4873beb7-5857-4685-be1f-d57550cc96cc">true</OpenTemplate>
-    <LocOverallLocStatusLookup xmlns="4873beb7-5857-4685-be1f-d57550cc96cc" xsi:nil="true"/>
-    <UALocComments xmlns="4873beb7-5857-4685-be1f-d57550cc96cc" xsi:nil="true"/>
-    <ParentAssetId xmlns="4873beb7-5857-4685-be1f-d57550cc96cc" xsi:nil="true"/>
-    <IntlLangReviewDate xmlns="4873beb7-5857-4685-be1f-d57550cc96cc" xsi:nil="true"/>
-    <FeatureTagsTaxHTField0 xmlns="4873beb7-5857-4685-be1f-d57550cc96cc">
-      <Terms xmlns="http://schemas.microsoft.com/office/infopath/2007/PartnerControls"/>
-    </FeatureTagsTaxHTField0>
-    <PublishStatusLookup xmlns="4873beb7-5857-4685-be1f-d57550cc96cc">
-      <Value>1345093</Value>
-    </PublishStatusLookup>
-    <Providers xmlns="4873beb7-5857-4685-be1f-d57550cc96cc" xsi:nil="true"/>
-    <MachineTranslated xmlns="4873beb7-5857-4685-be1f-d57550cc96cc">false</MachineTranslated>
-    <OriginalSourceMarket xmlns="4873beb7-5857-4685-be1f-d57550cc96cc" xsi:nil="true"/>
-    <APDescription xmlns="4873beb7-5857-4685-be1f-d57550cc96cc">This simple template design works for technology and  businesses, but it's versatile enough to use in other contexts.  It features multiple slide layouts designed for widescreen (16x9 resolution) and includes a sample SmartArt list and chart that are easily editable.</APDescription>
-    <ClipArtFilename xmlns="4873beb7-5857-4685-be1f-d57550cc96cc" xsi:nil="true"/>
-    <ContentItem xmlns="4873beb7-5857-4685-be1f-d57550cc96cc" xsi:nil="true"/>
-    <TPInstallLocation xmlns="4873beb7-5857-4685-be1f-d57550cc96cc" xsi:nil="true"/>
-    <PublishTargets xmlns="4873beb7-5857-4685-be1f-d57550cc96cc">OfficeOnlineVNext</PublishTargets>
-    <TimesCloned xmlns="4873beb7-5857-4685-be1f-d57550cc96cc" xsi:nil="true"/>
-    <AssetStart xmlns="4873beb7-5857-4685-be1f-d57550cc96cc">2011-11-26T00:30:00+00:00</AssetStart>
-    <Provider xmlns="4873beb7-5857-4685-be1f-d57550cc96cc" xsi:nil="true"/>
-    <AcquiredFrom xmlns="4873beb7-5857-4685-be1f-d57550cc96cc">Internal MS</AcquiredFrom>
-    <FriendlyTitle xmlns="4873beb7-5857-4685-be1f-d57550cc96cc" xsi:nil="true"/>
-    <LastHandOff xmlns="4873beb7-5857-4685-be1f-d57550cc96cc" xsi:nil="true"/>
-    <TPClientViewer xmlns="4873beb7-5857-4685-be1f-d57550cc96cc" xsi:nil="true"/>
-    <TemplateStatus xmlns="4873beb7-5857-4685-be1f-d57550cc96cc">Complete</TemplateStatus>
-    <Downloads xmlns="4873beb7-5857-4685-be1f-d57550cc96cc">0</Downloads>
-    <OOCacheId xmlns="4873beb7-5857-4685-be1f-d57550cc96cc" xsi:nil="true"/>
-    <IsDeleted xmlns="4873beb7-5857-4685-be1f-d57550cc96cc">false</IsDeleted>
-    <LocPublishedDependentAssetsLookup xmlns="4873beb7-5857-4685-be1f-d57550cc96cc" xsi:nil="true"/>
-    <TPExecutable xmlns="4873beb7-5857-4685-be1f-d57550cc96cc" xsi:nil="true"/>
-    <EditorialTags xmlns="4873beb7-5857-4685-be1f-d57550cc96cc" xsi:nil="true"/>
-    <SubmitterId xmlns="4873beb7-5857-4685-be1f-d57550cc96cc" xsi:nil="true"/>
-    <ApprovalLog xmlns="4873beb7-5857-4685-be1f-d57550cc96cc" xsi:nil="true"/>
-    <AssetType xmlns="4873beb7-5857-4685-be1f-d57550cc96cc">TP</AssetType>
-    <BugNumber xmlns="4873beb7-5857-4685-be1f-d57550cc96cc" xsi:nil="true"/>
-    <CSXSubmissionDate xmlns="4873beb7-5857-4685-be1f-d57550cc96cc" xsi:nil="true"/>
-    <CSXUpdate xmlns="4873beb7-5857-4685-be1f-d57550cc96cc">false</CSXUpdate>
-    <Milestone xmlns="4873beb7-5857-4685-be1f-d57550cc96cc" xsi:nil="true"/>
-    <RecommendationsModifier xmlns="4873beb7-5857-4685-be1f-d57550cc96cc" xsi:nil="true"/>
-    <OriginAsset xmlns="4873beb7-5857-4685-be1f-d57550cc96cc" xsi:nil="true"/>
-    <TPComponent xmlns="4873beb7-5857-4685-be1f-d57550cc96cc" xsi:nil="true"/>
-    <AssetId xmlns="4873beb7-5857-4685-be1f-d57550cc96cc">TP102787989</AssetId>
-    <IntlLocPriority xmlns="4873beb7-5857-4685-be1f-d57550cc96cc" xsi:nil="true"/>
-    <PolicheckWords xmlns="4873beb7-5857-4685-be1f-d57550cc96cc" xsi:nil="true"/>
-    <TPLaunchHelpLink xmlns="4873beb7-5857-4685-be1f-d57550cc96cc" xsi:nil="true"/>
-    <TPApplication xmlns="4873beb7-5857-4685-be1f-d57550cc96cc" xsi:nil="true"/>
-    <CrawlForDependencies xmlns="4873beb7-5857-4685-be1f-d57550cc96cc">false</CrawlForDependencies>
-    <HandoffToMSDN xmlns="4873beb7-5857-4685-be1f-d57550cc96cc" xsi:nil="true"/>
-    <PlannedPubDate xmlns="4873beb7-5857-4685-be1f-d57550cc96cc" xsi:nil="true"/>
-    <IntlLangReviewer xmlns="4873beb7-5857-4685-be1f-d57550cc96cc" xsi:nil="true"/>
-    <TrustLevel xmlns="4873beb7-5857-4685-be1f-d57550cc96cc">1 Microsoft Managed Content</TrustLevel>
-    <LocLastLocAttemptVersionLookup xmlns="4873beb7-5857-4685-be1f-d57550cc96cc">694266</LocLastLocAttemptVersionLookup>
-    <LocProcessedForHandoffsLookup xmlns="4873beb7-5857-4685-be1f-d57550cc96cc" xsi:nil="true"/>
-    <IsSearchable xmlns="4873beb7-5857-4685-be1f-d57550cc96cc">true</IsSearchable>
-    <TemplateTemplateType xmlns="4873beb7-5857-4685-be1f-d57550cc96cc">PowerPoint Presentation Template</TemplateTemplateType>
-    <CampaignTagsTaxHTField0 xmlns="4873beb7-5857-4685-be1f-d57550cc96cc">
-      <Terms xmlns="http://schemas.microsoft.com/office/infopath/2007/PartnerControls"/>
-    </CampaignTagsTaxHTField0>
-    <TPNamespace xmlns="4873beb7-5857-4685-be1f-d57550cc96cc" xsi:nil="true"/>
-    <LocOverallPreviewStatusLookup xmlns="4873beb7-5857-4685-be1f-d57550cc96cc" xsi:nil="true"/>
-    <TaxCatchAll xmlns="4873beb7-5857-4685-be1f-d57550cc96cc"/>
-    <Markets xmlns="4873beb7-5857-4685-be1f-d57550cc96cc"/>
-    <UAProjectedTotalWords xmlns="4873beb7-5857-4685-be1f-d57550cc96cc" xsi:nil="true"/>
-    <IntlLangReview xmlns="4873beb7-5857-4685-be1f-d57550cc96cc" xsi:nil="true"/>
-    <OutputCachingOn xmlns="4873beb7-5857-4685-be1f-d57550cc96cc">false</OutputCachingOn>
-    <AverageRating xmlns="4873beb7-5857-4685-be1f-d57550cc96cc" xsi:nil="true"/>
-    <APAuthor xmlns="4873beb7-5857-4685-be1f-d57550cc96cc">
-      <UserInfo>
-        <DisplayName>REDMOND\kristaa</DisplayName>
-        <AccountId>136</AccountId>
-        <AccountType/>
-      </UserInfo>
-    </APAuthor>
-    <LocManualTestRequired xmlns="4873beb7-5857-4685-be1f-d57550cc96cc">false</LocManualTestRequired>
-    <TPCommandLine xmlns="4873beb7-5857-4685-be1f-d57550cc96cc" xsi:nil="true"/>
-    <TPAppVersion xmlns="4873beb7-5857-4685-be1f-d57550cc96cc" xsi:nil="true"/>
-    <EditorialStatus xmlns="4873beb7-5857-4685-be1f-d57550cc96cc">Complete</EditorialStatus>
-    <LastModifiedDateTime xmlns="4873beb7-5857-4685-be1f-d57550cc96cc" xsi:nil="true"/>
-    <ScenarioTagsTaxHTField0 xmlns="4873beb7-5857-4685-be1f-d57550cc96cc">
-      <Terms xmlns="http://schemas.microsoft.com/office/infopath/2007/PartnerControls"/>
-    </ScenarioTagsTaxHTField0>
-    <LocProcessedForMarketsLookup xmlns="4873beb7-5857-4685-be1f-d57550cc96cc" xsi:nil="true"/>
-    <TPLaunchHelpLinkType xmlns="4873beb7-5857-4685-be1f-d57550cc96cc">Template</TPLaunchHelpLinkType>
-    <OriginalRelease xmlns="4873beb7-5857-4685-be1f-d57550cc96cc">15</OriginalRelease>
-    <LocalizationTagsTaxHTField0 xmlns="4873beb7-5857-4685-be1f-d57550cc96cc">
-      <Terms xmlns="http://schemas.microsoft.com/office/infopath/2007/PartnerControls"/>
-    </LocalizationTagsTaxHTField0>
-    <UACurrentWords xmlns="4873beb7-5857-4685-be1f-d57550cc96cc" xsi:nil="true"/>
-    <ArtSampleDocs xmlns="4873beb7-5857-4685-be1f-d57550cc96cc" xsi:nil="true"/>
-    <UALocRecommendation xmlns="4873beb7-5857-4685-be1f-d57550cc96cc">Localize</UALocRecommendation>
-    <Manager xmlns="4873beb7-5857-4685-be1f-d57550cc96cc" xsi:nil="true"/>
-    <LocOverallHandbackStatusLookup xmlns="4873beb7-5857-4685-be1f-d57550cc96cc" xsi:nil="true"/>
-    <ShowIn xmlns="4873beb7-5857-4685-be1f-d57550cc96cc">Show everywhere</ShowIn>
-    <UANotes xmlns="4873beb7-5857-4685-be1f-d57550cc96cc" xsi:nil="true"/>
-    <InternalTagsTaxHTField0 xmlns="4873beb7-5857-4685-be1f-d57550cc96cc">
-      <Terms xmlns="http://schemas.microsoft.com/office/infopath/2007/PartnerControls"/>
-    </InternalTagsTaxHTField0>
-    <CSXHash xmlns="4873beb7-5857-4685-be1f-d57550cc96cc" xsi:nil="true"/>
-    <VoteCount xmlns="4873beb7-5857-4685-be1f-d57550cc96cc" xsi:nil="true"/>
-    <AssetExpire xmlns="4873beb7-5857-4685-be1f-d57550cc96cc">2029-05-12T07:00:00+00:00</AssetExpire>
-    <DSATActionTaken xmlns="4873beb7-5857-4685-be1f-d57550cc96cc" xsi:nil="true"/>
-    <CSXSubmissionMarket xmlns="4873beb7-5857-4685-be1f-d57550cc96cc" xsi:nil="true"/>
-    <LocMarketGroupTiers2 xmlns="4873beb7-5857-4685-be1f-d57550cc96cc" xsi:nil="true"/>
-  </documentManagement>
-</p:properties>
-</file>
-
 <file path=customXml/item3.xml><?xml version="1.0" encoding="utf-8"?>
 <?mso-contentType ?>
 <FormTemplates xmlns="http://schemas.microsoft.com/sharepoint/v3/contenttype/forms">
@@ -10498,6 +11211,22 @@
 </file>
 
 <file path=customXml/itemProps1.xml><?xml version="1.0" encoding="utf-8"?>
+<ds:datastoreItem xmlns:ds="http://schemas.openxmlformats.org/officeDocument/2006/customXml" ds:itemID="{60C67BEE-D13F-4BD2-98A5-34D8A0977F68}">
+  <ds:schemaRefs>
+    <ds:schemaRef ds:uri="4873beb7-5857-4685-be1f-d57550cc96cc"/>
+    <ds:schemaRef ds:uri="http://schemas.openxmlformats.org/package/2006/metadata/core-properties"/>
+    <ds:schemaRef ds:uri="http://purl.org/dc/terms/"/>
+    <ds:schemaRef ds:uri="http://schemas.microsoft.com/office/2006/documentManagement/types"/>
+    <ds:schemaRef ds:uri="http://purl.org/dc/elements/1.1/"/>
+    <ds:schemaRef ds:uri="http://schemas.microsoft.com/office/2006/metadata/properties"/>
+    <ds:schemaRef ds:uri="http://schemas.microsoft.com/office/infopath/2007/PartnerControls"/>
+    <ds:schemaRef ds:uri="http://www.w3.org/XML/1998/namespace"/>
+    <ds:schemaRef ds:uri="http://purl.org/dc/dcmitype/"/>
+  </ds:schemaRefs>
+</ds:datastoreItem>
+</file>
+
+<file path=customXml/itemProps2.xml><?xml version="1.0" encoding="utf-8"?>
 <ds:datastoreItem xmlns:ds="http://schemas.openxmlformats.org/officeDocument/2006/customXml" ds:itemID="{A09BF4D4-EF60-4196-BFC3-9462D607978C}">
   <ds:schemaRefs>
     <ds:schemaRef ds:uri="http://schemas.microsoft.com/office/2006/metadata/contentType"/>
@@ -10515,22 +11244,6 @@
 </ds:datastoreItem>
 </file>
 
-<file path=customXml/itemProps2.xml><?xml version="1.0" encoding="utf-8"?>
-<ds:datastoreItem xmlns:ds="http://schemas.openxmlformats.org/officeDocument/2006/customXml" ds:itemID="{60C67BEE-D13F-4BD2-98A5-34D8A0977F68}">
-  <ds:schemaRefs>
-    <ds:schemaRef ds:uri="4873beb7-5857-4685-be1f-d57550cc96cc"/>
-    <ds:schemaRef ds:uri="http://schemas.openxmlformats.org/package/2006/metadata/core-properties"/>
-    <ds:schemaRef ds:uri="http://purl.org/dc/terms/"/>
-    <ds:schemaRef ds:uri="http://schemas.microsoft.com/office/2006/documentManagement/types"/>
-    <ds:schemaRef ds:uri="http://purl.org/dc/elements/1.1/"/>
-    <ds:schemaRef ds:uri="http://schemas.microsoft.com/office/2006/metadata/properties"/>
-    <ds:schemaRef ds:uri="http://schemas.microsoft.com/office/infopath/2007/PartnerControls"/>
-    <ds:schemaRef ds:uri="http://www.w3.org/XML/1998/namespace"/>
-    <ds:schemaRef ds:uri="http://purl.org/dc/dcmitype/"/>
-  </ds:schemaRefs>
-</ds:datastoreItem>
-</file>
-
 <file path=customXml/itemProps3.xml><?xml version="1.0" encoding="utf-8"?>
 <ds:datastoreItem xmlns:ds="http://schemas.openxmlformats.org/officeDocument/2006/customXml" ds:itemID="{3836F65B-1B07-41EE-A0E8-BC6EF3855225}">
   <ds:schemaRefs>

</xml_diff>

<commit_message>
Modified code example and slides
</commit_message>
<xml_diff>
--- a/Introduction to Julia.pptx
+++ b/Introduction to Julia.pptx
@@ -5,10 +5,10 @@
     <p:sldMasterId id="2147483660" r:id="rId4"/>
   </p:sldMasterIdLst>
   <p:notesMasterIdLst>
-    <p:notesMasterId r:id="rId29"/>
+    <p:notesMasterId r:id="rId31"/>
   </p:notesMasterIdLst>
   <p:handoutMasterIdLst>
-    <p:handoutMasterId r:id="rId30"/>
+    <p:handoutMasterId r:id="rId32"/>
   </p:handoutMasterIdLst>
   <p:sldIdLst>
     <p:sldId id="257" r:id="rId5"/>
@@ -25,16 +25,18 @@
     <p:sldId id="287" r:id="rId16"/>
     <p:sldId id="293" r:id="rId17"/>
     <p:sldId id="294" r:id="rId18"/>
-    <p:sldId id="288" r:id="rId19"/>
-    <p:sldId id="291" r:id="rId20"/>
-    <p:sldId id="292" r:id="rId21"/>
-    <p:sldId id="290" r:id="rId22"/>
-    <p:sldId id="295" r:id="rId23"/>
-    <p:sldId id="296" r:id="rId24"/>
-    <p:sldId id="289" r:id="rId25"/>
-    <p:sldId id="275" r:id="rId26"/>
-    <p:sldId id="276" r:id="rId27"/>
-    <p:sldId id="284" r:id="rId28"/>
+    <p:sldId id="297" r:id="rId19"/>
+    <p:sldId id="298" r:id="rId20"/>
+    <p:sldId id="288" r:id="rId21"/>
+    <p:sldId id="291" r:id="rId22"/>
+    <p:sldId id="292" r:id="rId23"/>
+    <p:sldId id="290" r:id="rId24"/>
+    <p:sldId id="295" r:id="rId25"/>
+    <p:sldId id="296" r:id="rId26"/>
+    <p:sldId id="289" r:id="rId27"/>
+    <p:sldId id="275" r:id="rId28"/>
+    <p:sldId id="276" r:id="rId29"/>
+    <p:sldId id="284" r:id="rId30"/>
   </p:sldIdLst>
   <p:sldSz cx="12188825" cy="6858000"/>
   <p:notesSz cx="6858000" cy="9144000"/>
@@ -6057,6 +6059,256 @@
           <p:cNvPr id="2" name="Title 1">
             <a:extLst>
               <a:ext uri="{FF2B5EF4-FFF2-40B4-BE49-F238E27FC236}">
+                <a16:creationId xmlns:a16="http://schemas.microsoft.com/office/drawing/2014/main" id="{0701B2FA-785A-493F-A979-F7D37DE8BF6B}"/>
+              </a:ext>
+            </a:extLst>
+          </p:cNvPr>
+          <p:cNvSpPr>
+            <a:spLocks noGrp="1"/>
+          </p:cNvSpPr>
+          <p:nvPr>
+            <p:ph type="title"/>
+          </p:nvPr>
+        </p:nvSpPr>
+        <p:spPr/>
+        <p:txBody>
+          <a:bodyPr/>
+          <a:lstStyle/>
+          <a:p>
+            <a:r>
+              <a:rPr lang="en-GB" dirty="0"/>
+              <a:t>Different Type of Parallelism</a:t>
+            </a:r>
+          </a:p>
+        </p:txBody>
+      </p:sp>
+      <p:sp>
+        <p:nvSpPr>
+          <p:cNvPr id="3" name="Content Placeholder 2">
+            <a:extLst>
+              <a:ext uri="{FF2B5EF4-FFF2-40B4-BE49-F238E27FC236}">
+                <a16:creationId xmlns:a16="http://schemas.microsoft.com/office/drawing/2014/main" id="{1487808D-297D-4E3B-B009-8B6EF400DD02}"/>
+              </a:ext>
+            </a:extLst>
+          </p:cNvPr>
+          <p:cNvSpPr>
+            <a:spLocks noGrp="1"/>
+          </p:cNvSpPr>
+          <p:nvPr>
+            <p:ph idx="1"/>
+          </p:nvPr>
+        </p:nvSpPr>
+        <p:spPr/>
+        <p:txBody>
+          <a:bodyPr>
+            <a:normAutofit lnSpcReduction="10000"/>
+          </a:bodyPr>
+          <a:lstStyle/>
+          <a:p>
+            <a:r>
+              <a:rPr lang="en-GB" b="1" dirty="0"/>
+              <a:t>Multithreading</a:t>
+            </a:r>
+            <a:r>
+              <a:rPr lang="en-GB" dirty="0"/>
+              <a:t> – single program shares memory has different threads (workers) that can execute tasks. Requires locking to make sure same thread doesn’t read and write to same memory at the same time.</a:t>
+            </a:r>
+          </a:p>
+          <a:p>
+            <a:r>
+              <a:rPr lang="en-GB" b="1" dirty="0"/>
+              <a:t>Multiprocessing </a:t>
+            </a:r>
+            <a:r>
+              <a:rPr lang="en-GB" dirty="0"/>
+              <a:t>– what MATLAB and Python use. Spin up a copy of the program in a new process and communicate over sockets – high latency and poor performance if lots of communication needed.</a:t>
+            </a:r>
+          </a:p>
+          <a:p>
+            <a:r>
+              <a:rPr lang="en-GB" b="1" dirty="0"/>
+              <a:t>Hardware Parallelism </a:t>
+            </a:r>
+            <a:r>
+              <a:rPr lang="en-GB" dirty="0"/>
+              <a:t>– SIMD instructions built into CPU.</a:t>
+            </a:r>
+          </a:p>
+          <a:p>
+            <a:r>
+              <a:rPr lang="en-GB" b="1" dirty="0"/>
+              <a:t>GPU parallelism </a:t>
+            </a:r>
+            <a:r>
+              <a:rPr lang="en-GB" dirty="0"/>
+              <a:t>– a different discrete chip in a computer designed for massively parallel workloads.</a:t>
+            </a:r>
+          </a:p>
+        </p:txBody>
+      </p:sp>
+    </p:spTree>
+    <p:extLst>
+      <p:ext uri="{BB962C8B-B14F-4D97-AF65-F5344CB8AC3E}">
+        <p14:creationId xmlns:p14="http://schemas.microsoft.com/office/powerpoint/2010/main" val="3758377915"/>
+      </p:ext>
+    </p:extLst>
+  </p:cSld>
+  <p:clrMapOvr>
+    <a:masterClrMapping/>
+  </p:clrMapOvr>
+  <mc:AlternateContent xmlns:mc="http://schemas.openxmlformats.org/markup-compatibility/2006" xmlns:p14="http://schemas.microsoft.com/office/powerpoint/2010/main">
+    <mc:Choice Requires="p14">
+      <p:transition spd="med" p14:dur="700">
+        <p:fade/>
+      </p:transition>
+    </mc:Choice>
+    <mc:Fallback xmlns="">
+      <p:transition spd="med">
+        <p:fade/>
+      </p:transition>
+    </mc:Fallback>
+  </mc:AlternateContent>
+</p:sld>
+</file>
+
+<file path=ppt/slides/slide16.xml><?xml version="1.0" encoding="utf-8"?>
+<p:sld xmlns:a="http://schemas.openxmlformats.org/drawingml/2006/main" xmlns:r="http://schemas.openxmlformats.org/officeDocument/2006/relationships" xmlns:p="http://schemas.openxmlformats.org/presentationml/2006/main">
+  <p:cSld>
+    <p:spTree>
+      <p:nvGrpSpPr>
+        <p:cNvPr id="1" name=""/>
+        <p:cNvGrpSpPr/>
+        <p:nvPr/>
+      </p:nvGrpSpPr>
+      <p:grpSpPr>
+        <a:xfrm>
+          <a:off x="0" y="0"/>
+          <a:ext cx="0" cy="0"/>
+          <a:chOff x="0" y="0"/>
+          <a:chExt cx="0" cy="0"/>
+        </a:xfrm>
+      </p:grpSpPr>
+      <p:sp>
+        <p:nvSpPr>
+          <p:cNvPr id="2" name="Title 1">
+            <a:extLst>
+              <a:ext uri="{FF2B5EF4-FFF2-40B4-BE49-F238E27FC236}">
+                <a16:creationId xmlns:a16="http://schemas.microsoft.com/office/drawing/2014/main" id="{30CF2306-3EEE-418A-9A40-A3BBA48A3BFD}"/>
+              </a:ext>
+            </a:extLst>
+          </p:cNvPr>
+          <p:cNvSpPr>
+            <a:spLocks noGrp="1"/>
+          </p:cNvSpPr>
+          <p:nvPr>
+            <p:ph type="title"/>
+          </p:nvPr>
+        </p:nvSpPr>
+        <p:spPr/>
+        <p:txBody>
+          <a:bodyPr/>
+          <a:lstStyle/>
+          <a:p>
+            <a:r>
+              <a:rPr lang="en-GB" dirty="0"/>
+              <a:t>GPU – Graphics Processing Unit</a:t>
+            </a:r>
+          </a:p>
+        </p:txBody>
+      </p:sp>
+      <p:sp>
+        <p:nvSpPr>
+          <p:cNvPr id="3" name="Content Placeholder 2">
+            <a:extLst>
+              <a:ext uri="{FF2B5EF4-FFF2-40B4-BE49-F238E27FC236}">
+                <a16:creationId xmlns:a16="http://schemas.microsoft.com/office/drawing/2014/main" id="{E8A21468-7C38-4C5C-8F9C-3C59131E9765}"/>
+              </a:ext>
+            </a:extLst>
+          </p:cNvPr>
+          <p:cNvSpPr>
+            <a:spLocks noGrp="1"/>
+          </p:cNvSpPr>
+          <p:nvPr>
+            <p:ph idx="1"/>
+          </p:nvPr>
+        </p:nvSpPr>
+        <p:spPr/>
+        <p:txBody>
+          <a:bodyPr/>
+          <a:lstStyle/>
+          <a:p>
+            <a:r>
+              <a:rPr lang="en-GB" dirty="0"/>
+              <a:t>Designed for accelerating 3D graphics to allow real-time rendering. </a:t>
+            </a:r>
+          </a:p>
+          <a:p>
+            <a:r>
+              <a:rPr lang="en-GB" dirty="0"/>
+              <a:t>Early workflows included mapping millions of vertices from 3D world coordinates to a camera perspective. This is just linear algebra!</a:t>
+            </a:r>
+          </a:p>
+          <a:p>
+            <a:r>
+              <a:rPr lang="en-GB" dirty="0"/>
+              <a:t>Modern GPUs have 10s of thousands of cores compared to CPUs with usually 10s of cores. These cores are slower and less general.</a:t>
+            </a:r>
+          </a:p>
+          <a:p>
+            <a:r>
+              <a:rPr lang="en-GB" dirty="0"/>
+              <a:t>GPUs workloads are usually memory intensive, and so they have their own memory (VRAM), separate from the main DRAM memory.</a:t>
+            </a:r>
+          </a:p>
+        </p:txBody>
+      </p:sp>
+    </p:spTree>
+    <p:extLst>
+      <p:ext uri="{BB962C8B-B14F-4D97-AF65-F5344CB8AC3E}">
+        <p14:creationId xmlns:p14="http://schemas.microsoft.com/office/powerpoint/2010/main" val="1382443909"/>
+      </p:ext>
+    </p:extLst>
+  </p:cSld>
+  <p:clrMapOvr>
+    <a:masterClrMapping/>
+  </p:clrMapOvr>
+  <mc:AlternateContent xmlns:mc="http://schemas.openxmlformats.org/markup-compatibility/2006" xmlns:p14="http://schemas.microsoft.com/office/powerpoint/2010/main">
+    <mc:Choice Requires="p14">
+      <p:transition spd="med" p14:dur="700">
+        <p:fade/>
+      </p:transition>
+    </mc:Choice>
+    <mc:Fallback xmlns="">
+      <p:transition spd="med">
+        <p:fade/>
+      </p:transition>
+    </mc:Fallback>
+  </mc:AlternateContent>
+</p:sld>
+</file>
+
+<file path=ppt/slides/slide17.xml><?xml version="1.0" encoding="utf-8"?>
+<p:sld xmlns:a="http://schemas.openxmlformats.org/drawingml/2006/main" xmlns:r="http://schemas.openxmlformats.org/officeDocument/2006/relationships" xmlns:p="http://schemas.openxmlformats.org/presentationml/2006/main">
+  <p:cSld>
+    <p:spTree>
+      <p:nvGrpSpPr>
+        <p:cNvPr id="1" name=""/>
+        <p:cNvGrpSpPr/>
+        <p:nvPr/>
+      </p:nvGrpSpPr>
+      <p:grpSpPr>
+        <a:xfrm>
+          <a:off x="0" y="0"/>
+          <a:ext cx="0" cy="0"/>
+          <a:chOff x="0" y="0"/>
+          <a:chExt cx="0" cy="0"/>
+        </a:xfrm>
+      </p:grpSpPr>
+      <p:sp>
+        <p:nvSpPr>
+          <p:cNvPr id="2" name="Title 1">
+            <a:extLst>
+              <a:ext uri="{FF2B5EF4-FFF2-40B4-BE49-F238E27FC236}">
                 <a16:creationId xmlns:a16="http://schemas.microsoft.com/office/drawing/2014/main" id="{FA2041A0-9C8A-4E5F-84C7-3CF22E0D6A6B}"/>
               </a:ext>
             </a:extLst>
@@ -6139,7 +6391,7 @@
 </p:sld>
 </file>
 
-<file path=ppt/slides/slide16.xml><?xml version="1.0" encoding="utf-8"?>
+<file path=ppt/slides/slide18.xml><?xml version="1.0" encoding="utf-8"?>
 <p:sld xmlns:a="http://schemas.openxmlformats.org/drawingml/2006/main" xmlns:r="http://schemas.openxmlformats.org/officeDocument/2006/relationships" xmlns:p="http://schemas.openxmlformats.org/presentationml/2006/main">
   <p:cSld>
     <p:spTree>
@@ -6238,7 +6490,7 @@
 </p:sld>
 </file>
 
-<file path=ppt/slides/slide17.xml><?xml version="1.0" encoding="utf-8"?>
+<file path=ppt/slides/slide19.xml><?xml version="1.0" encoding="utf-8"?>
 <p:sld xmlns:a="http://schemas.openxmlformats.org/drawingml/2006/main" xmlns:r="http://schemas.openxmlformats.org/officeDocument/2006/relationships" xmlns:p="http://schemas.openxmlformats.org/presentationml/2006/main">
   <p:cSld>
     <p:spTree>
@@ -6337,7 +6589,126 @@
 </p:sld>
 </file>
 
-<file path=ppt/slides/slide18.xml><?xml version="1.0" encoding="utf-8"?>
+<file path=ppt/slides/slide2.xml><?xml version="1.0" encoding="utf-8"?>
+<p:sld xmlns:a="http://schemas.openxmlformats.org/drawingml/2006/main" xmlns:r="http://schemas.openxmlformats.org/officeDocument/2006/relationships" xmlns:p="http://schemas.openxmlformats.org/presentationml/2006/main">
+  <p:cSld>
+    <p:spTree>
+      <p:nvGrpSpPr>
+        <p:cNvPr id="1" name=""/>
+        <p:cNvGrpSpPr/>
+        <p:nvPr/>
+      </p:nvGrpSpPr>
+      <p:grpSpPr>
+        <a:xfrm>
+          <a:off x="0" y="0"/>
+          <a:ext cx="0" cy="0"/>
+          <a:chOff x="0" y="0"/>
+          <a:chExt cx="0" cy="0"/>
+        </a:xfrm>
+      </p:grpSpPr>
+      <p:sp>
+        <p:nvSpPr>
+          <p:cNvPr id="13" name="Title 12"/>
+          <p:cNvSpPr>
+            <a:spLocks noGrp="1"/>
+          </p:cNvSpPr>
+          <p:nvPr>
+            <p:ph type="title"/>
+          </p:nvPr>
+        </p:nvSpPr>
+        <p:spPr/>
+        <p:txBody>
+          <a:bodyPr/>
+          <a:lstStyle/>
+          <a:p>
+            <a:r>
+              <a:rPr lang="en-US" dirty="0"/>
+              <a:t>Content</a:t>
+            </a:r>
+          </a:p>
+        </p:txBody>
+      </p:sp>
+      <p:sp>
+        <p:nvSpPr>
+          <p:cNvPr id="14" name="Content Placeholder 13"/>
+          <p:cNvSpPr>
+            <a:spLocks noGrp="1"/>
+          </p:cNvSpPr>
+          <p:nvPr>
+            <p:ph idx="1"/>
+          </p:nvPr>
+        </p:nvSpPr>
+        <p:spPr/>
+        <p:txBody>
+          <a:bodyPr/>
+          <a:lstStyle/>
+          <a:p>
+            <a:r>
+              <a:rPr lang="en-US" dirty="0"/>
+              <a:t>What is Julia?</a:t>
+            </a:r>
+          </a:p>
+          <a:p>
+            <a:r>
+              <a:rPr lang="en-US" dirty="0"/>
+              <a:t>Why Julia?</a:t>
+            </a:r>
+          </a:p>
+          <a:p>
+            <a:r>
+              <a:rPr lang="en-US" dirty="0"/>
+              <a:t>Benchmark Examples</a:t>
+            </a:r>
+          </a:p>
+          <a:p>
+            <a:r>
+              <a:rPr lang="en-US" dirty="0"/>
+              <a:t>Interesting language features</a:t>
+            </a:r>
+          </a:p>
+          <a:p>
+            <a:r>
+              <a:rPr lang="en-US" dirty="0"/>
+              <a:t>Live demo</a:t>
+            </a:r>
+          </a:p>
+          <a:p>
+            <a:r>
+              <a:rPr lang="en-US" dirty="0"/>
+              <a:t>Questions</a:t>
+            </a:r>
+          </a:p>
+          <a:p>
+            <a:endParaRPr lang="en-US" dirty="0"/>
+          </a:p>
+        </p:txBody>
+      </p:sp>
+    </p:spTree>
+    <p:extLst>
+      <p:ext uri="{BB962C8B-B14F-4D97-AF65-F5344CB8AC3E}">
+        <p14:creationId xmlns:p14="http://schemas.microsoft.com/office/powerpoint/2010/main" val="3529114326"/>
+      </p:ext>
+    </p:extLst>
+  </p:cSld>
+  <p:clrMapOvr>
+    <a:masterClrMapping/>
+  </p:clrMapOvr>
+  <mc:AlternateContent xmlns:mc="http://schemas.openxmlformats.org/markup-compatibility/2006" xmlns:p14="http://schemas.microsoft.com/office/powerpoint/2010/main">
+    <mc:Choice Requires="p14">
+      <p:transition spd="med" p14:dur="700">
+        <p:fade/>
+      </p:transition>
+    </mc:Choice>
+    <mc:Fallback xmlns="">
+      <p:transition spd="med">
+        <p:fade/>
+      </p:transition>
+    </mc:Fallback>
+  </mc:AlternateContent>
+</p:sld>
+</file>
+
+<file path=ppt/slides/slide20.xml><?xml version="1.0" encoding="utf-8"?>
 <p:sld xmlns:a="http://schemas.openxmlformats.org/drawingml/2006/main" xmlns:r="http://schemas.openxmlformats.org/officeDocument/2006/relationships" xmlns:p="http://schemas.openxmlformats.org/presentationml/2006/main">
   <p:cSld>
     <p:spTree>
@@ -6442,7 +6813,7 @@
 </p:sld>
 </file>
 
-<file path=ppt/slides/slide19.xml><?xml version="1.0" encoding="utf-8"?>
+<file path=ppt/slides/slide21.xml><?xml version="1.0" encoding="utf-8"?>
 <p:sld xmlns:a="http://schemas.openxmlformats.org/drawingml/2006/main" xmlns:r="http://schemas.openxmlformats.org/officeDocument/2006/relationships" xmlns:p="http://schemas.openxmlformats.org/presentationml/2006/main">
   <p:cSld>
     <p:spTree>
@@ -6573,126 +6944,7 @@
 </p:sld>
 </file>
 
-<file path=ppt/slides/slide2.xml><?xml version="1.0" encoding="utf-8"?>
-<p:sld xmlns:a="http://schemas.openxmlformats.org/drawingml/2006/main" xmlns:r="http://schemas.openxmlformats.org/officeDocument/2006/relationships" xmlns:p="http://schemas.openxmlformats.org/presentationml/2006/main">
-  <p:cSld>
-    <p:spTree>
-      <p:nvGrpSpPr>
-        <p:cNvPr id="1" name=""/>
-        <p:cNvGrpSpPr/>
-        <p:nvPr/>
-      </p:nvGrpSpPr>
-      <p:grpSpPr>
-        <a:xfrm>
-          <a:off x="0" y="0"/>
-          <a:ext cx="0" cy="0"/>
-          <a:chOff x="0" y="0"/>
-          <a:chExt cx="0" cy="0"/>
-        </a:xfrm>
-      </p:grpSpPr>
-      <p:sp>
-        <p:nvSpPr>
-          <p:cNvPr id="13" name="Title 12"/>
-          <p:cNvSpPr>
-            <a:spLocks noGrp="1"/>
-          </p:cNvSpPr>
-          <p:nvPr>
-            <p:ph type="title"/>
-          </p:nvPr>
-        </p:nvSpPr>
-        <p:spPr/>
-        <p:txBody>
-          <a:bodyPr/>
-          <a:lstStyle/>
-          <a:p>
-            <a:r>
-              <a:rPr lang="en-US" dirty="0"/>
-              <a:t>Content</a:t>
-            </a:r>
-          </a:p>
-        </p:txBody>
-      </p:sp>
-      <p:sp>
-        <p:nvSpPr>
-          <p:cNvPr id="14" name="Content Placeholder 13"/>
-          <p:cNvSpPr>
-            <a:spLocks noGrp="1"/>
-          </p:cNvSpPr>
-          <p:nvPr>
-            <p:ph idx="1"/>
-          </p:nvPr>
-        </p:nvSpPr>
-        <p:spPr/>
-        <p:txBody>
-          <a:bodyPr/>
-          <a:lstStyle/>
-          <a:p>
-            <a:r>
-              <a:rPr lang="en-US" dirty="0"/>
-              <a:t>What is Julia?</a:t>
-            </a:r>
-          </a:p>
-          <a:p>
-            <a:r>
-              <a:rPr lang="en-US" dirty="0"/>
-              <a:t>Why Julia?</a:t>
-            </a:r>
-          </a:p>
-          <a:p>
-            <a:r>
-              <a:rPr lang="en-US" dirty="0"/>
-              <a:t>Benchmark Examples</a:t>
-            </a:r>
-          </a:p>
-          <a:p>
-            <a:r>
-              <a:rPr lang="en-US" dirty="0"/>
-              <a:t>Interesting language features</a:t>
-            </a:r>
-          </a:p>
-          <a:p>
-            <a:r>
-              <a:rPr lang="en-US" dirty="0"/>
-              <a:t>Live demo</a:t>
-            </a:r>
-          </a:p>
-          <a:p>
-            <a:r>
-              <a:rPr lang="en-US" dirty="0"/>
-              <a:t>Questions</a:t>
-            </a:r>
-          </a:p>
-          <a:p>
-            <a:endParaRPr lang="en-US" dirty="0"/>
-          </a:p>
-        </p:txBody>
-      </p:sp>
-    </p:spTree>
-    <p:extLst>
-      <p:ext uri="{BB962C8B-B14F-4D97-AF65-F5344CB8AC3E}">
-        <p14:creationId xmlns:p14="http://schemas.microsoft.com/office/powerpoint/2010/main" val="3529114326"/>
-      </p:ext>
-    </p:extLst>
-  </p:cSld>
-  <p:clrMapOvr>
-    <a:masterClrMapping/>
-  </p:clrMapOvr>
-  <mc:AlternateContent xmlns:mc="http://schemas.openxmlformats.org/markup-compatibility/2006" xmlns:p14="http://schemas.microsoft.com/office/powerpoint/2010/main">
-    <mc:Choice Requires="p14">
-      <p:transition spd="med" p14:dur="700">
-        <p:fade/>
-      </p:transition>
-    </mc:Choice>
-    <mc:Fallback xmlns="">
-      <p:transition spd="med">
-        <p:fade/>
-      </p:transition>
-    </mc:Fallback>
-  </mc:AlternateContent>
-</p:sld>
-</file>
-
-<file path=ppt/slides/slide20.xml><?xml version="1.0" encoding="utf-8"?>
+<file path=ppt/slides/slide22.xml><?xml version="1.0" encoding="utf-8"?>
 <p:sld xmlns:a="http://schemas.openxmlformats.org/drawingml/2006/main" xmlns:r="http://schemas.openxmlformats.org/officeDocument/2006/relationships" xmlns:p="http://schemas.openxmlformats.org/presentationml/2006/main">
   <p:cSld>
     <p:spTree>
@@ -6850,7 +7102,7 @@
 </p:sld>
 </file>
 
-<file path=ppt/slides/slide21.xml><?xml version="1.0" encoding="utf-8"?>
+<file path=ppt/slides/slide23.xml><?xml version="1.0" encoding="utf-8"?>
 <p:sld xmlns:a="http://schemas.openxmlformats.org/drawingml/2006/main" xmlns:r="http://schemas.openxmlformats.org/officeDocument/2006/relationships" xmlns:p="http://schemas.openxmlformats.org/presentationml/2006/main">
   <p:cSld>
     <p:spTree>
@@ -6920,7 +7172,7 @@
 </p:sld>
 </file>
 
-<file path=ppt/slides/slide22.xml><?xml version="1.0" encoding="utf-8"?>
+<file path=ppt/slides/slide24.xml><?xml version="1.0" encoding="utf-8"?>
 <p:sld xmlns:a="http://schemas.openxmlformats.org/drawingml/2006/main" xmlns:r="http://schemas.openxmlformats.org/officeDocument/2006/relationships" xmlns:p="http://schemas.openxmlformats.org/presentationml/2006/main">
   <p:cSld>
     <p:spTree>
@@ -7244,7 +7496,7 @@
 </p:sld>
 </file>
 
-<file path=ppt/slides/slide23.xml><?xml version="1.0" encoding="utf-8"?>
+<file path=ppt/slides/slide25.xml><?xml version="1.0" encoding="utf-8"?>
 <p:sld xmlns:a="http://schemas.openxmlformats.org/drawingml/2006/main" xmlns:r="http://schemas.openxmlformats.org/officeDocument/2006/relationships" xmlns:p="http://schemas.openxmlformats.org/presentationml/2006/main">
   <p:cSld>
     <p:spTree>
@@ -7603,7 +7855,7 @@
 </p:sld>
 </file>
 
-<file path=ppt/slides/slide24.xml><?xml version="1.0" encoding="utf-8"?>
+<file path=ppt/slides/slide26.xml><?xml version="1.0" encoding="utf-8"?>
 <p:sld xmlns:a="http://schemas.openxmlformats.org/drawingml/2006/main" xmlns:r="http://schemas.openxmlformats.org/officeDocument/2006/relationships" xmlns:p="http://schemas.openxmlformats.org/presentationml/2006/main">
   <p:cSld>
     <p:spTree>

</xml_diff>

<commit_message>
Changed slides and parallel code
</commit_message>
<xml_diff>
--- a/Introduction to Julia.pptx
+++ b/Introduction to Julia.pptx
@@ -6537,10 +6537,10 @@
       </p:sp>
       <p:pic>
         <p:nvPicPr>
-          <p:cNvPr id="13" name="Content Placeholder 12">
+          <p:cNvPr id="8" name="Content Placeholder 7">
             <a:extLst>
               <a:ext uri="{FF2B5EF4-FFF2-40B4-BE49-F238E27FC236}">
-                <a16:creationId xmlns:a16="http://schemas.microsoft.com/office/drawing/2014/main" id="{4306B4B5-BDC2-4CEA-9897-3342A3437AAA}"/>
+                <a16:creationId xmlns:a16="http://schemas.microsoft.com/office/drawing/2014/main" id="{9D18CDC6-E4E2-480A-ADBF-F2AC12778829}"/>
               </a:ext>
             </a:extLst>
           </p:cNvPr>
@@ -6559,8 +6559,8 @@
         </p:blipFill>
         <p:spPr>
           <a:xfrm>
-            <a:off x="1219200" y="1742419"/>
-            <a:ext cx="10360025" cy="4381225"/>
+            <a:off x="1219200" y="1941659"/>
+            <a:ext cx="10360025" cy="3982745"/>
           </a:xfrm>
         </p:spPr>
       </p:pic>
@@ -11201,6 +11201,142 @@
 </file>
 
 <file path=customXml/item1.xml><?xml version="1.0" encoding="utf-8"?>
+<p:properties xmlns:p="http://schemas.microsoft.com/office/2006/metadata/properties" xmlns:xsi="http://www.w3.org/2001/XMLSchema-instance" xmlns:pc="http://schemas.microsoft.com/office/infopath/2007/PartnerControls">
+  <documentManagement>
+    <LocPublishedLinkedAssetsLookup xmlns="4873beb7-5857-4685-be1f-d57550cc96cc" xsi:nil="true"/>
+    <ApprovalStatus xmlns="4873beb7-5857-4685-be1f-d57550cc96cc">InProgress</ApprovalStatus>
+    <MarketSpecific xmlns="4873beb7-5857-4685-be1f-d57550cc96cc">false</MarketSpecific>
+    <LocComments xmlns="4873beb7-5857-4685-be1f-d57550cc96cc" xsi:nil="true"/>
+    <LocLastLocAttemptVersionTypeLookup xmlns="4873beb7-5857-4685-be1f-d57550cc96cc" xsi:nil="true"/>
+    <DirectSourceMarket xmlns="4873beb7-5857-4685-be1f-d57550cc96cc" xsi:nil="true"/>
+    <ThumbnailAssetId xmlns="4873beb7-5857-4685-be1f-d57550cc96cc" xsi:nil="true"/>
+    <PrimaryImageGen xmlns="4873beb7-5857-4685-be1f-d57550cc96cc">false</PrimaryImageGen>
+    <LocNewPublishedVersionLookup xmlns="4873beb7-5857-4685-be1f-d57550cc96cc" xsi:nil="true"/>
+    <LegacyData xmlns="4873beb7-5857-4685-be1f-d57550cc96cc" xsi:nil="true"/>
+    <LocRecommendedHandoff xmlns="4873beb7-5857-4685-be1f-d57550cc96cc" xsi:nil="true"/>
+    <BusinessGroup xmlns="4873beb7-5857-4685-be1f-d57550cc96cc" xsi:nil="true"/>
+    <BlockPublish xmlns="4873beb7-5857-4685-be1f-d57550cc96cc">false</BlockPublish>
+    <TPFriendlyName xmlns="4873beb7-5857-4685-be1f-d57550cc96cc" xsi:nil="true"/>
+    <LocOverallPublishStatusLookup xmlns="4873beb7-5857-4685-be1f-d57550cc96cc" xsi:nil="true"/>
+    <NumericId xmlns="4873beb7-5857-4685-be1f-d57550cc96cc" xsi:nil="true"/>
+    <APEditor xmlns="4873beb7-5857-4685-be1f-d57550cc96cc">
+      <UserInfo>
+        <DisplayName/>
+        <AccountId xsi:nil="true"/>
+        <AccountType/>
+      </UserInfo>
+    </APEditor>
+    <SourceTitle xmlns="4873beb7-5857-4685-be1f-d57550cc96cc" xsi:nil="true"/>
+    <OpenTemplate xmlns="4873beb7-5857-4685-be1f-d57550cc96cc">true</OpenTemplate>
+    <LocOverallLocStatusLookup xmlns="4873beb7-5857-4685-be1f-d57550cc96cc" xsi:nil="true"/>
+    <UALocComments xmlns="4873beb7-5857-4685-be1f-d57550cc96cc" xsi:nil="true"/>
+    <ParentAssetId xmlns="4873beb7-5857-4685-be1f-d57550cc96cc" xsi:nil="true"/>
+    <IntlLangReviewDate xmlns="4873beb7-5857-4685-be1f-d57550cc96cc" xsi:nil="true"/>
+    <FeatureTagsTaxHTField0 xmlns="4873beb7-5857-4685-be1f-d57550cc96cc">
+      <Terms xmlns="http://schemas.microsoft.com/office/infopath/2007/PartnerControls"/>
+    </FeatureTagsTaxHTField0>
+    <PublishStatusLookup xmlns="4873beb7-5857-4685-be1f-d57550cc96cc">
+      <Value>1345093</Value>
+    </PublishStatusLookup>
+    <Providers xmlns="4873beb7-5857-4685-be1f-d57550cc96cc" xsi:nil="true"/>
+    <MachineTranslated xmlns="4873beb7-5857-4685-be1f-d57550cc96cc">false</MachineTranslated>
+    <OriginalSourceMarket xmlns="4873beb7-5857-4685-be1f-d57550cc96cc" xsi:nil="true"/>
+    <APDescription xmlns="4873beb7-5857-4685-be1f-d57550cc96cc">This simple template design works for technology and  businesses, but it's versatile enough to use in other contexts.  It features multiple slide layouts designed for widescreen (16x9 resolution) and includes a sample SmartArt list and chart that are easily editable.</APDescription>
+    <ClipArtFilename xmlns="4873beb7-5857-4685-be1f-d57550cc96cc" xsi:nil="true"/>
+    <ContentItem xmlns="4873beb7-5857-4685-be1f-d57550cc96cc" xsi:nil="true"/>
+    <TPInstallLocation xmlns="4873beb7-5857-4685-be1f-d57550cc96cc" xsi:nil="true"/>
+    <PublishTargets xmlns="4873beb7-5857-4685-be1f-d57550cc96cc">OfficeOnlineVNext</PublishTargets>
+    <TimesCloned xmlns="4873beb7-5857-4685-be1f-d57550cc96cc" xsi:nil="true"/>
+    <AssetStart xmlns="4873beb7-5857-4685-be1f-d57550cc96cc">2011-11-26T00:30:00+00:00</AssetStart>
+    <Provider xmlns="4873beb7-5857-4685-be1f-d57550cc96cc" xsi:nil="true"/>
+    <AcquiredFrom xmlns="4873beb7-5857-4685-be1f-d57550cc96cc">Internal MS</AcquiredFrom>
+    <FriendlyTitle xmlns="4873beb7-5857-4685-be1f-d57550cc96cc" xsi:nil="true"/>
+    <LastHandOff xmlns="4873beb7-5857-4685-be1f-d57550cc96cc" xsi:nil="true"/>
+    <TPClientViewer xmlns="4873beb7-5857-4685-be1f-d57550cc96cc" xsi:nil="true"/>
+    <TemplateStatus xmlns="4873beb7-5857-4685-be1f-d57550cc96cc">Complete</TemplateStatus>
+    <Downloads xmlns="4873beb7-5857-4685-be1f-d57550cc96cc">0</Downloads>
+    <OOCacheId xmlns="4873beb7-5857-4685-be1f-d57550cc96cc" xsi:nil="true"/>
+    <IsDeleted xmlns="4873beb7-5857-4685-be1f-d57550cc96cc">false</IsDeleted>
+    <LocPublishedDependentAssetsLookup xmlns="4873beb7-5857-4685-be1f-d57550cc96cc" xsi:nil="true"/>
+    <TPExecutable xmlns="4873beb7-5857-4685-be1f-d57550cc96cc" xsi:nil="true"/>
+    <EditorialTags xmlns="4873beb7-5857-4685-be1f-d57550cc96cc" xsi:nil="true"/>
+    <SubmitterId xmlns="4873beb7-5857-4685-be1f-d57550cc96cc" xsi:nil="true"/>
+    <ApprovalLog xmlns="4873beb7-5857-4685-be1f-d57550cc96cc" xsi:nil="true"/>
+    <AssetType xmlns="4873beb7-5857-4685-be1f-d57550cc96cc">TP</AssetType>
+    <BugNumber xmlns="4873beb7-5857-4685-be1f-d57550cc96cc" xsi:nil="true"/>
+    <CSXSubmissionDate xmlns="4873beb7-5857-4685-be1f-d57550cc96cc" xsi:nil="true"/>
+    <CSXUpdate xmlns="4873beb7-5857-4685-be1f-d57550cc96cc">false</CSXUpdate>
+    <Milestone xmlns="4873beb7-5857-4685-be1f-d57550cc96cc" xsi:nil="true"/>
+    <RecommendationsModifier xmlns="4873beb7-5857-4685-be1f-d57550cc96cc" xsi:nil="true"/>
+    <OriginAsset xmlns="4873beb7-5857-4685-be1f-d57550cc96cc" xsi:nil="true"/>
+    <TPComponent xmlns="4873beb7-5857-4685-be1f-d57550cc96cc" xsi:nil="true"/>
+    <AssetId xmlns="4873beb7-5857-4685-be1f-d57550cc96cc">TP102787989</AssetId>
+    <IntlLocPriority xmlns="4873beb7-5857-4685-be1f-d57550cc96cc" xsi:nil="true"/>
+    <PolicheckWords xmlns="4873beb7-5857-4685-be1f-d57550cc96cc" xsi:nil="true"/>
+    <TPLaunchHelpLink xmlns="4873beb7-5857-4685-be1f-d57550cc96cc" xsi:nil="true"/>
+    <TPApplication xmlns="4873beb7-5857-4685-be1f-d57550cc96cc" xsi:nil="true"/>
+    <CrawlForDependencies xmlns="4873beb7-5857-4685-be1f-d57550cc96cc">false</CrawlForDependencies>
+    <HandoffToMSDN xmlns="4873beb7-5857-4685-be1f-d57550cc96cc" xsi:nil="true"/>
+    <PlannedPubDate xmlns="4873beb7-5857-4685-be1f-d57550cc96cc" xsi:nil="true"/>
+    <IntlLangReviewer xmlns="4873beb7-5857-4685-be1f-d57550cc96cc" xsi:nil="true"/>
+    <TrustLevel xmlns="4873beb7-5857-4685-be1f-d57550cc96cc">1 Microsoft Managed Content</TrustLevel>
+    <LocLastLocAttemptVersionLookup xmlns="4873beb7-5857-4685-be1f-d57550cc96cc">694266</LocLastLocAttemptVersionLookup>
+    <LocProcessedForHandoffsLookup xmlns="4873beb7-5857-4685-be1f-d57550cc96cc" xsi:nil="true"/>
+    <IsSearchable xmlns="4873beb7-5857-4685-be1f-d57550cc96cc">true</IsSearchable>
+    <TemplateTemplateType xmlns="4873beb7-5857-4685-be1f-d57550cc96cc">PowerPoint Presentation Template</TemplateTemplateType>
+    <CampaignTagsTaxHTField0 xmlns="4873beb7-5857-4685-be1f-d57550cc96cc">
+      <Terms xmlns="http://schemas.microsoft.com/office/infopath/2007/PartnerControls"/>
+    </CampaignTagsTaxHTField0>
+    <TPNamespace xmlns="4873beb7-5857-4685-be1f-d57550cc96cc" xsi:nil="true"/>
+    <LocOverallPreviewStatusLookup xmlns="4873beb7-5857-4685-be1f-d57550cc96cc" xsi:nil="true"/>
+    <TaxCatchAll xmlns="4873beb7-5857-4685-be1f-d57550cc96cc"/>
+    <Markets xmlns="4873beb7-5857-4685-be1f-d57550cc96cc"/>
+    <UAProjectedTotalWords xmlns="4873beb7-5857-4685-be1f-d57550cc96cc" xsi:nil="true"/>
+    <IntlLangReview xmlns="4873beb7-5857-4685-be1f-d57550cc96cc" xsi:nil="true"/>
+    <OutputCachingOn xmlns="4873beb7-5857-4685-be1f-d57550cc96cc">false</OutputCachingOn>
+    <AverageRating xmlns="4873beb7-5857-4685-be1f-d57550cc96cc" xsi:nil="true"/>
+    <APAuthor xmlns="4873beb7-5857-4685-be1f-d57550cc96cc">
+      <UserInfo>
+        <DisplayName>REDMOND\kristaa</DisplayName>
+        <AccountId>136</AccountId>
+        <AccountType/>
+      </UserInfo>
+    </APAuthor>
+    <LocManualTestRequired xmlns="4873beb7-5857-4685-be1f-d57550cc96cc">false</LocManualTestRequired>
+    <TPCommandLine xmlns="4873beb7-5857-4685-be1f-d57550cc96cc" xsi:nil="true"/>
+    <TPAppVersion xmlns="4873beb7-5857-4685-be1f-d57550cc96cc" xsi:nil="true"/>
+    <EditorialStatus xmlns="4873beb7-5857-4685-be1f-d57550cc96cc">Complete</EditorialStatus>
+    <LastModifiedDateTime xmlns="4873beb7-5857-4685-be1f-d57550cc96cc" xsi:nil="true"/>
+    <ScenarioTagsTaxHTField0 xmlns="4873beb7-5857-4685-be1f-d57550cc96cc">
+      <Terms xmlns="http://schemas.microsoft.com/office/infopath/2007/PartnerControls"/>
+    </ScenarioTagsTaxHTField0>
+    <LocProcessedForMarketsLookup xmlns="4873beb7-5857-4685-be1f-d57550cc96cc" xsi:nil="true"/>
+    <TPLaunchHelpLinkType xmlns="4873beb7-5857-4685-be1f-d57550cc96cc">Template</TPLaunchHelpLinkType>
+    <OriginalRelease xmlns="4873beb7-5857-4685-be1f-d57550cc96cc">15</OriginalRelease>
+    <LocalizationTagsTaxHTField0 xmlns="4873beb7-5857-4685-be1f-d57550cc96cc">
+      <Terms xmlns="http://schemas.microsoft.com/office/infopath/2007/PartnerControls"/>
+    </LocalizationTagsTaxHTField0>
+    <UACurrentWords xmlns="4873beb7-5857-4685-be1f-d57550cc96cc" xsi:nil="true"/>
+    <ArtSampleDocs xmlns="4873beb7-5857-4685-be1f-d57550cc96cc" xsi:nil="true"/>
+    <UALocRecommendation xmlns="4873beb7-5857-4685-be1f-d57550cc96cc">Localize</UALocRecommendation>
+    <Manager xmlns="4873beb7-5857-4685-be1f-d57550cc96cc" xsi:nil="true"/>
+    <LocOverallHandbackStatusLookup xmlns="4873beb7-5857-4685-be1f-d57550cc96cc" xsi:nil="true"/>
+    <ShowIn xmlns="4873beb7-5857-4685-be1f-d57550cc96cc">Show everywhere</ShowIn>
+    <UANotes xmlns="4873beb7-5857-4685-be1f-d57550cc96cc" xsi:nil="true"/>
+    <InternalTagsTaxHTField0 xmlns="4873beb7-5857-4685-be1f-d57550cc96cc">
+      <Terms xmlns="http://schemas.microsoft.com/office/infopath/2007/PartnerControls"/>
+    </InternalTagsTaxHTField0>
+    <CSXHash xmlns="4873beb7-5857-4685-be1f-d57550cc96cc" xsi:nil="true"/>
+    <VoteCount xmlns="4873beb7-5857-4685-be1f-d57550cc96cc" xsi:nil="true"/>
+    <AssetExpire xmlns="4873beb7-5857-4685-be1f-d57550cc96cc">2029-05-12T07:00:00+00:00</AssetExpire>
+    <DSATActionTaken xmlns="4873beb7-5857-4685-be1f-d57550cc96cc" xsi:nil="true"/>
+    <CSXSubmissionMarket xmlns="4873beb7-5857-4685-be1f-d57550cc96cc" xsi:nil="true"/>
+    <LocMarketGroupTiers2 xmlns="4873beb7-5857-4685-be1f-d57550cc96cc" xsi:nil="true"/>
+  </documentManagement>
+</p:properties>
+</file>
+
+<file path=customXml/item2.xml><?xml version="1.0" encoding="utf-8"?>
 <ct:contentTypeSchema xmlns:ct="http://schemas.microsoft.com/office/2006/metadata/contentType" xmlns:ma="http://schemas.microsoft.com/office/2006/metadata/properties/metaAttributes" ct:_="" ma:_="" ma:contentTypeName="TemplateFile" ma:contentTypeID="0x0101006EDDDB5EE6D98C44930B742096920B300400F5B6D36B3EF94B4E9A635CDF2A18F5B8" ma:contentTypeVersion="72" ma:contentTypeDescription="Create a new document." ma:contentTypeScope="" ma:versionID="a23e56308344d904b51738559c3d67c9">
   <xsd:schema xmlns:xsd="http://www.w3.org/2001/XMLSchema" xmlns:xs="http://www.w3.org/2001/XMLSchema" xmlns:p="http://schemas.microsoft.com/office/2006/metadata/properties" xmlns:ns2="4873beb7-5857-4685-be1f-d57550cc96cc" targetNamespace="http://schemas.microsoft.com/office/2006/metadata/properties" ma:root="true" ma:fieldsID="cd0908cc4600e77bf5da051303e00c8d" ns2:_="">
     <xsd:import namespace="4873beb7-5857-4685-be1f-d57550cc96cc"/>
@@ -12240,142 +12376,6 @@
 </ct:contentTypeSchema>
 </file>
 
-<file path=customXml/item2.xml><?xml version="1.0" encoding="utf-8"?>
-<p:properties xmlns:p="http://schemas.microsoft.com/office/2006/metadata/properties" xmlns:xsi="http://www.w3.org/2001/XMLSchema-instance" xmlns:pc="http://schemas.microsoft.com/office/infopath/2007/PartnerControls">
-  <documentManagement>
-    <LocPublishedLinkedAssetsLookup xmlns="4873beb7-5857-4685-be1f-d57550cc96cc" xsi:nil="true"/>
-    <ApprovalStatus xmlns="4873beb7-5857-4685-be1f-d57550cc96cc">InProgress</ApprovalStatus>
-    <MarketSpecific xmlns="4873beb7-5857-4685-be1f-d57550cc96cc">false</MarketSpecific>
-    <LocComments xmlns="4873beb7-5857-4685-be1f-d57550cc96cc" xsi:nil="true"/>
-    <LocLastLocAttemptVersionTypeLookup xmlns="4873beb7-5857-4685-be1f-d57550cc96cc" xsi:nil="true"/>
-    <DirectSourceMarket xmlns="4873beb7-5857-4685-be1f-d57550cc96cc" xsi:nil="true"/>
-    <ThumbnailAssetId xmlns="4873beb7-5857-4685-be1f-d57550cc96cc" xsi:nil="true"/>
-    <PrimaryImageGen xmlns="4873beb7-5857-4685-be1f-d57550cc96cc">false</PrimaryImageGen>
-    <LocNewPublishedVersionLookup xmlns="4873beb7-5857-4685-be1f-d57550cc96cc" xsi:nil="true"/>
-    <LegacyData xmlns="4873beb7-5857-4685-be1f-d57550cc96cc" xsi:nil="true"/>
-    <LocRecommendedHandoff xmlns="4873beb7-5857-4685-be1f-d57550cc96cc" xsi:nil="true"/>
-    <BusinessGroup xmlns="4873beb7-5857-4685-be1f-d57550cc96cc" xsi:nil="true"/>
-    <BlockPublish xmlns="4873beb7-5857-4685-be1f-d57550cc96cc">false</BlockPublish>
-    <TPFriendlyName xmlns="4873beb7-5857-4685-be1f-d57550cc96cc" xsi:nil="true"/>
-    <LocOverallPublishStatusLookup xmlns="4873beb7-5857-4685-be1f-d57550cc96cc" xsi:nil="true"/>
-    <NumericId xmlns="4873beb7-5857-4685-be1f-d57550cc96cc" xsi:nil="true"/>
-    <APEditor xmlns="4873beb7-5857-4685-be1f-d57550cc96cc">
-      <UserInfo>
-        <DisplayName/>
-        <AccountId xsi:nil="true"/>
-        <AccountType/>
-      </UserInfo>
-    </APEditor>
-    <SourceTitle xmlns="4873beb7-5857-4685-be1f-d57550cc96cc" xsi:nil="true"/>
-    <OpenTemplate xmlns="4873beb7-5857-4685-be1f-d57550cc96cc">true</OpenTemplate>
-    <LocOverallLocStatusLookup xmlns="4873beb7-5857-4685-be1f-d57550cc96cc" xsi:nil="true"/>
-    <UALocComments xmlns="4873beb7-5857-4685-be1f-d57550cc96cc" xsi:nil="true"/>
-    <ParentAssetId xmlns="4873beb7-5857-4685-be1f-d57550cc96cc" xsi:nil="true"/>
-    <IntlLangReviewDate xmlns="4873beb7-5857-4685-be1f-d57550cc96cc" xsi:nil="true"/>
-    <FeatureTagsTaxHTField0 xmlns="4873beb7-5857-4685-be1f-d57550cc96cc">
-      <Terms xmlns="http://schemas.microsoft.com/office/infopath/2007/PartnerControls"/>
-    </FeatureTagsTaxHTField0>
-    <PublishStatusLookup xmlns="4873beb7-5857-4685-be1f-d57550cc96cc">
-      <Value>1345093</Value>
-    </PublishStatusLookup>
-    <Providers xmlns="4873beb7-5857-4685-be1f-d57550cc96cc" xsi:nil="true"/>
-    <MachineTranslated xmlns="4873beb7-5857-4685-be1f-d57550cc96cc">false</MachineTranslated>
-    <OriginalSourceMarket xmlns="4873beb7-5857-4685-be1f-d57550cc96cc" xsi:nil="true"/>
-    <APDescription xmlns="4873beb7-5857-4685-be1f-d57550cc96cc">This simple template design works for technology and  businesses, but it's versatile enough to use in other contexts.  It features multiple slide layouts designed for widescreen (16x9 resolution) and includes a sample SmartArt list and chart that are easily editable.</APDescription>
-    <ClipArtFilename xmlns="4873beb7-5857-4685-be1f-d57550cc96cc" xsi:nil="true"/>
-    <ContentItem xmlns="4873beb7-5857-4685-be1f-d57550cc96cc" xsi:nil="true"/>
-    <TPInstallLocation xmlns="4873beb7-5857-4685-be1f-d57550cc96cc" xsi:nil="true"/>
-    <PublishTargets xmlns="4873beb7-5857-4685-be1f-d57550cc96cc">OfficeOnlineVNext</PublishTargets>
-    <TimesCloned xmlns="4873beb7-5857-4685-be1f-d57550cc96cc" xsi:nil="true"/>
-    <AssetStart xmlns="4873beb7-5857-4685-be1f-d57550cc96cc">2011-11-26T00:30:00+00:00</AssetStart>
-    <Provider xmlns="4873beb7-5857-4685-be1f-d57550cc96cc" xsi:nil="true"/>
-    <AcquiredFrom xmlns="4873beb7-5857-4685-be1f-d57550cc96cc">Internal MS</AcquiredFrom>
-    <FriendlyTitle xmlns="4873beb7-5857-4685-be1f-d57550cc96cc" xsi:nil="true"/>
-    <LastHandOff xmlns="4873beb7-5857-4685-be1f-d57550cc96cc" xsi:nil="true"/>
-    <TPClientViewer xmlns="4873beb7-5857-4685-be1f-d57550cc96cc" xsi:nil="true"/>
-    <TemplateStatus xmlns="4873beb7-5857-4685-be1f-d57550cc96cc">Complete</TemplateStatus>
-    <Downloads xmlns="4873beb7-5857-4685-be1f-d57550cc96cc">0</Downloads>
-    <OOCacheId xmlns="4873beb7-5857-4685-be1f-d57550cc96cc" xsi:nil="true"/>
-    <IsDeleted xmlns="4873beb7-5857-4685-be1f-d57550cc96cc">false</IsDeleted>
-    <LocPublishedDependentAssetsLookup xmlns="4873beb7-5857-4685-be1f-d57550cc96cc" xsi:nil="true"/>
-    <TPExecutable xmlns="4873beb7-5857-4685-be1f-d57550cc96cc" xsi:nil="true"/>
-    <EditorialTags xmlns="4873beb7-5857-4685-be1f-d57550cc96cc" xsi:nil="true"/>
-    <SubmitterId xmlns="4873beb7-5857-4685-be1f-d57550cc96cc" xsi:nil="true"/>
-    <ApprovalLog xmlns="4873beb7-5857-4685-be1f-d57550cc96cc" xsi:nil="true"/>
-    <AssetType xmlns="4873beb7-5857-4685-be1f-d57550cc96cc">TP</AssetType>
-    <BugNumber xmlns="4873beb7-5857-4685-be1f-d57550cc96cc" xsi:nil="true"/>
-    <CSXSubmissionDate xmlns="4873beb7-5857-4685-be1f-d57550cc96cc" xsi:nil="true"/>
-    <CSXUpdate xmlns="4873beb7-5857-4685-be1f-d57550cc96cc">false</CSXUpdate>
-    <Milestone xmlns="4873beb7-5857-4685-be1f-d57550cc96cc" xsi:nil="true"/>
-    <RecommendationsModifier xmlns="4873beb7-5857-4685-be1f-d57550cc96cc" xsi:nil="true"/>
-    <OriginAsset xmlns="4873beb7-5857-4685-be1f-d57550cc96cc" xsi:nil="true"/>
-    <TPComponent xmlns="4873beb7-5857-4685-be1f-d57550cc96cc" xsi:nil="true"/>
-    <AssetId xmlns="4873beb7-5857-4685-be1f-d57550cc96cc">TP102787989</AssetId>
-    <IntlLocPriority xmlns="4873beb7-5857-4685-be1f-d57550cc96cc" xsi:nil="true"/>
-    <PolicheckWords xmlns="4873beb7-5857-4685-be1f-d57550cc96cc" xsi:nil="true"/>
-    <TPLaunchHelpLink xmlns="4873beb7-5857-4685-be1f-d57550cc96cc" xsi:nil="true"/>
-    <TPApplication xmlns="4873beb7-5857-4685-be1f-d57550cc96cc" xsi:nil="true"/>
-    <CrawlForDependencies xmlns="4873beb7-5857-4685-be1f-d57550cc96cc">false</CrawlForDependencies>
-    <HandoffToMSDN xmlns="4873beb7-5857-4685-be1f-d57550cc96cc" xsi:nil="true"/>
-    <PlannedPubDate xmlns="4873beb7-5857-4685-be1f-d57550cc96cc" xsi:nil="true"/>
-    <IntlLangReviewer xmlns="4873beb7-5857-4685-be1f-d57550cc96cc" xsi:nil="true"/>
-    <TrustLevel xmlns="4873beb7-5857-4685-be1f-d57550cc96cc">1 Microsoft Managed Content</TrustLevel>
-    <LocLastLocAttemptVersionLookup xmlns="4873beb7-5857-4685-be1f-d57550cc96cc">694266</LocLastLocAttemptVersionLookup>
-    <LocProcessedForHandoffsLookup xmlns="4873beb7-5857-4685-be1f-d57550cc96cc" xsi:nil="true"/>
-    <IsSearchable xmlns="4873beb7-5857-4685-be1f-d57550cc96cc">true</IsSearchable>
-    <TemplateTemplateType xmlns="4873beb7-5857-4685-be1f-d57550cc96cc">PowerPoint Presentation Template</TemplateTemplateType>
-    <CampaignTagsTaxHTField0 xmlns="4873beb7-5857-4685-be1f-d57550cc96cc">
-      <Terms xmlns="http://schemas.microsoft.com/office/infopath/2007/PartnerControls"/>
-    </CampaignTagsTaxHTField0>
-    <TPNamespace xmlns="4873beb7-5857-4685-be1f-d57550cc96cc" xsi:nil="true"/>
-    <LocOverallPreviewStatusLookup xmlns="4873beb7-5857-4685-be1f-d57550cc96cc" xsi:nil="true"/>
-    <TaxCatchAll xmlns="4873beb7-5857-4685-be1f-d57550cc96cc"/>
-    <Markets xmlns="4873beb7-5857-4685-be1f-d57550cc96cc"/>
-    <UAProjectedTotalWords xmlns="4873beb7-5857-4685-be1f-d57550cc96cc" xsi:nil="true"/>
-    <IntlLangReview xmlns="4873beb7-5857-4685-be1f-d57550cc96cc" xsi:nil="true"/>
-    <OutputCachingOn xmlns="4873beb7-5857-4685-be1f-d57550cc96cc">false</OutputCachingOn>
-    <AverageRating xmlns="4873beb7-5857-4685-be1f-d57550cc96cc" xsi:nil="true"/>
-    <APAuthor xmlns="4873beb7-5857-4685-be1f-d57550cc96cc">
-      <UserInfo>
-        <DisplayName>REDMOND\kristaa</DisplayName>
-        <AccountId>136</AccountId>
-        <AccountType/>
-      </UserInfo>
-    </APAuthor>
-    <LocManualTestRequired xmlns="4873beb7-5857-4685-be1f-d57550cc96cc">false</LocManualTestRequired>
-    <TPCommandLine xmlns="4873beb7-5857-4685-be1f-d57550cc96cc" xsi:nil="true"/>
-    <TPAppVersion xmlns="4873beb7-5857-4685-be1f-d57550cc96cc" xsi:nil="true"/>
-    <EditorialStatus xmlns="4873beb7-5857-4685-be1f-d57550cc96cc">Complete</EditorialStatus>
-    <LastModifiedDateTime xmlns="4873beb7-5857-4685-be1f-d57550cc96cc" xsi:nil="true"/>
-    <ScenarioTagsTaxHTField0 xmlns="4873beb7-5857-4685-be1f-d57550cc96cc">
-      <Terms xmlns="http://schemas.microsoft.com/office/infopath/2007/PartnerControls"/>
-    </ScenarioTagsTaxHTField0>
-    <LocProcessedForMarketsLookup xmlns="4873beb7-5857-4685-be1f-d57550cc96cc" xsi:nil="true"/>
-    <TPLaunchHelpLinkType xmlns="4873beb7-5857-4685-be1f-d57550cc96cc">Template</TPLaunchHelpLinkType>
-    <OriginalRelease xmlns="4873beb7-5857-4685-be1f-d57550cc96cc">15</OriginalRelease>
-    <LocalizationTagsTaxHTField0 xmlns="4873beb7-5857-4685-be1f-d57550cc96cc">
-      <Terms xmlns="http://schemas.microsoft.com/office/infopath/2007/PartnerControls"/>
-    </LocalizationTagsTaxHTField0>
-    <UACurrentWords xmlns="4873beb7-5857-4685-be1f-d57550cc96cc" xsi:nil="true"/>
-    <ArtSampleDocs xmlns="4873beb7-5857-4685-be1f-d57550cc96cc" xsi:nil="true"/>
-    <UALocRecommendation xmlns="4873beb7-5857-4685-be1f-d57550cc96cc">Localize</UALocRecommendation>
-    <Manager xmlns="4873beb7-5857-4685-be1f-d57550cc96cc" xsi:nil="true"/>
-    <LocOverallHandbackStatusLookup xmlns="4873beb7-5857-4685-be1f-d57550cc96cc" xsi:nil="true"/>
-    <ShowIn xmlns="4873beb7-5857-4685-be1f-d57550cc96cc">Show everywhere</ShowIn>
-    <UANotes xmlns="4873beb7-5857-4685-be1f-d57550cc96cc" xsi:nil="true"/>
-    <InternalTagsTaxHTField0 xmlns="4873beb7-5857-4685-be1f-d57550cc96cc">
-      <Terms xmlns="http://schemas.microsoft.com/office/infopath/2007/PartnerControls"/>
-    </InternalTagsTaxHTField0>
-    <CSXHash xmlns="4873beb7-5857-4685-be1f-d57550cc96cc" xsi:nil="true"/>
-    <VoteCount xmlns="4873beb7-5857-4685-be1f-d57550cc96cc" xsi:nil="true"/>
-    <AssetExpire xmlns="4873beb7-5857-4685-be1f-d57550cc96cc">2029-05-12T07:00:00+00:00</AssetExpire>
-    <DSATActionTaken xmlns="4873beb7-5857-4685-be1f-d57550cc96cc" xsi:nil="true"/>
-    <CSXSubmissionMarket xmlns="4873beb7-5857-4685-be1f-d57550cc96cc" xsi:nil="true"/>
-    <LocMarketGroupTiers2 xmlns="4873beb7-5857-4685-be1f-d57550cc96cc" xsi:nil="true"/>
-  </documentManagement>
-</p:properties>
-</file>
-
 <file path=customXml/item3.xml><?xml version="1.0" encoding="utf-8"?>
 <?mso-contentType ?>
 <FormTemplates xmlns="http://schemas.microsoft.com/sharepoint/v3/contenttype/forms">
@@ -12386,6 +12386,22 @@
 </file>
 
 <file path=customXml/itemProps1.xml><?xml version="1.0" encoding="utf-8"?>
+<ds:datastoreItem xmlns:ds="http://schemas.openxmlformats.org/officeDocument/2006/customXml" ds:itemID="{60C67BEE-D13F-4BD2-98A5-34D8A0977F68}">
+  <ds:schemaRefs>
+    <ds:schemaRef ds:uri="4873beb7-5857-4685-be1f-d57550cc96cc"/>
+    <ds:schemaRef ds:uri="http://schemas.openxmlformats.org/package/2006/metadata/core-properties"/>
+    <ds:schemaRef ds:uri="http://purl.org/dc/terms/"/>
+    <ds:schemaRef ds:uri="http://schemas.microsoft.com/office/2006/documentManagement/types"/>
+    <ds:schemaRef ds:uri="http://purl.org/dc/elements/1.1/"/>
+    <ds:schemaRef ds:uri="http://schemas.microsoft.com/office/2006/metadata/properties"/>
+    <ds:schemaRef ds:uri="http://schemas.microsoft.com/office/infopath/2007/PartnerControls"/>
+    <ds:schemaRef ds:uri="http://www.w3.org/XML/1998/namespace"/>
+    <ds:schemaRef ds:uri="http://purl.org/dc/dcmitype/"/>
+  </ds:schemaRefs>
+</ds:datastoreItem>
+</file>
+
+<file path=customXml/itemProps2.xml><?xml version="1.0" encoding="utf-8"?>
 <ds:datastoreItem xmlns:ds="http://schemas.openxmlformats.org/officeDocument/2006/customXml" ds:itemID="{A09BF4D4-EF60-4196-BFC3-9462D607978C}">
   <ds:schemaRefs>
     <ds:schemaRef ds:uri="http://schemas.microsoft.com/office/2006/metadata/contentType"/>
@@ -12403,22 +12419,6 @@
 </ds:datastoreItem>
 </file>
 
-<file path=customXml/itemProps2.xml><?xml version="1.0" encoding="utf-8"?>
-<ds:datastoreItem xmlns:ds="http://schemas.openxmlformats.org/officeDocument/2006/customXml" ds:itemID="{60C67BEE-D13F-4BD2-98A5-34D8A0977F68}">
-  <ds:schemaRefs>
-    <ds:schemaRef ds:uri="4873beb7-5857-4685-be1f-d57550cc96cc"/>
-    <ds:schemaRef ds:uri="http://schemas.openxmlformats.org/package/2006/metadata/core-properties"/>
-    <ds:schemaRef ds:uri="http://purl.org/dc/terms/"/>
-    <ds:schemaRef ds:uri="http://schemas.microsoft.com/office/2006/documentManagement/types"/>
-    <ds:schemaRef ds:uri="http://purl.org/dc/elements/1.1/"/>
-    <ds:schemaRef ds:uri="http://schemas.microsoft.com/office/2006/metadata/properties"/>
-    <ds:schemaRef ds:uri="http://schemas.microsoft.com/office/infopath/2007/PartnerControls"/>
-    <ds:schemaRef ds:uri="http://www.w3.org/XML/1998/namespace"/>
-    <ds:schemaRef ds:uri="http://purl.org/dc/dcmitype/"/>
-  </ds:schemaRefs>
-</ds:datastoreItem>
-</file>
-
 <file path=customXml/itemProps3.xml><?xml version="1.0" encoding="utf-8"?>
 <ds:datastoreItem xmlns:ds="http://schemas.openxmlformats.org/officeDocument/2006/customXml" ds:itemID="{3836F65B-1B07-41EE-A0E8-BC6EF3855225}">
   <ds:schemaRefs>

</xml_diff>

<commit_message>
Update Introduction to Julia.pptx
</commit_message>
<xml_diff>
--- a/Introduction to Julia.pptx
+++ b/Introduction to Julia.pptx
@@ -5,10 +5,10 @@
     <p:sldMasterId id="2147483660" r:id="rId4"/>
   </p:sldMasterIdLst>
   <p:notesMasterIdLst>
-    <p:notesMasterId r:id="rId31"/>
+    <p:notesMasterId r:id="rId32"/>
   </p:notesMasterIdLst>
   <p:handoutMasterIdLst>
-    <p:handoutMasterId r:id="rId32"/>
+    <p:handoutMasterId r:id="rId33"/>
   </p:handoutMasterIdLst>
   <p:sldIdLst>
     <p:sldId id="257" r:id="rId5"/>
@@ -34,9 +34,10 @@
     <p:sldId id="295" r:id="rId25"/>
     <p:sldId id="296" r:id="rId26"/>
     <p:sldId id="289" r:id="rId27"/>
-    <p:sldId id="275" r:id="rId28"/>
-    <p:sldId id="276" r:id="rId29"/>
-    <p:sldId id="284" r:id="rId30"/>
+    <p:sldId id="299" r:id="rId28"/>
+    <p:sldId id="275" r:id="rId29"/>
+    <p:sldId id="276" r:id="rId30"/>
+    <p:sldId id="284" r:id="rId31"/>
   </p:sldIdLst>
   <p:sldSz cx="12188825" cy="6858000"/>
   <p:notesSz cx="6858000" cy="9144000"/>
@@ -5352,6 +5353,89 @@
       </p:transition>
     </mc:Fallback>
   </mc:AlternateContent>
+  <p:timing>
+    <p:tnLst>
+      <p:par>
+        <p:cTn id="1" dur="indefinite" restart="never" nodeType="tmRoot">
+          <p:childTnLst>
+            <p:seq concurrent="1" nextAc="seek">
+              <p:cTn id="2" dur="indefinite" nodeType="mainSeq">
+                <p:childTnLst>
+                  <p:par>
+                    <p:cTn id="3" fill="hold">
+                      <p:stCondLst>
+                        <p:cond delay="indefinite"/>
+                      </p:stCondLst>
+                      <p:childTnLst>
+                        <p:par>
+                          <p:cTn id="4" fill="hold">
+                            <p:stCondLst>
+                              <p:cond delay="0"/>
+                            </p:stCondLst>
+                            <p:childTnLst>
+                              <p:par>
+                                <p:cTn id="5" presetID="10" presetClass="entr" presetSubtype="0" fill="hold" nodeType="clickEffect">
+                                  <p:stCondLst>
+                                    <p:cond delay="0"/>
+                                  </p:stCondLst>
+                                  <p:childTnLst>
+                                    <p:set>
+                                      <p:cBhvr>
+                                        <p:cTn id="6" dur="1" fill="hold">
+                                          <p:stCondLst>
+                                            <p:cond delay="0"/>
+                                          </p:stCondLst>
+                                        </p:cTn>
+                                        <p:tgtEl>
+                                          <p:spTgt spid="9"/>
+                                        </p:tgtEl>
+                                        <p:attrNameLst>
+                                          <p:attrName>style.visibility</p:attrName>
+                                        </p:attrNameLst>
+                                      </p:cBhvr>
+                                      <p:to>
+                                        <p:strVal val="visible"/>
+                                      </p:to>
+                                    </p:set>
+                                    <p:animEffect transition="in" filter="fade">
+                                      <p:cBhvr>
+                                        <p:cTn id="7" dur="500"/>
+                                        <p:tgtEl>
+                                          <p:spTgt spid="9"/>
+                                        </p:tgtEl>
+                                      </p:cBhvr>
+                                    </p:animEffect>
+                                  </p:childTnLst>
+                                </p:cTn>
+                              </p:par>
+                            </p:childTnLst>
+                          </p:cTn>
+                        </p:par>
+                      </p:childTnLst>
+                    </p:cTn>
+                  </p:par>
+                </p:childTnLst>
+              </p:cTn>
+              <p:prevCondLst>
+                <p:cond evt="onPrev" delay="0">
+                  <p:tgtEl>
+                    <p:sldTgt/>
+                  </p:tgtEl>
+                </p:cond>
+              </p:prevCondLst>
+              <p:nextCondLst>
+                <p:cond evt="onNext" delay="0">
+                  <p:tgtEl>
+                    <p:sldTgt/>
+                  </p:tgtEl>
+                </p:cond>
+              </p:nextCondLst>
+            </p:seq>
+          </p:childTnLst>
+        </p:cTn>
+      </p:par>
+    </p:tnLst>
+  </p:timing>
 </p:sld>
 </file>
 
@@ -5524,6 +5608,142 @@
       </p:transition>
     </mc:Fallback>
   </mc:AlternateContent>
+  <p:timing>
+    <p:tnLst>
+      <p:par>
+        <p:cTn id="1" dur="indefinite" restart="never" nodeType="tmRoot">
+          <p:childTnLst>
+            <p:seq concurrent="1" nextAc="seek">
+              <p:cTn id="2" dur="indefinite" nodeType="mainSeq">
+                <p:childTnLst>
+                  <p:par>
+                    <p:cTn id="3" fill="hold">
+                      <p:stCondLst>
+                        <p:cond delay="indefinite"/>
+                      </p:stCondLst>
+                      <p:childTnLst>
+                        <p:par>
+                          <p:cTn id="4" fill="hold">
+                            <p:stCondLst>
+                              <p:cond delay="0"/>
+                            </p:stCondLst>
+                            <p:childTnLst>
+                              <p:par>
+                                <p:cTn id="5" presetID="10" presetClass="entr" presetSubtype="0" fill="hold" nodeType="clickEffect">
+                                  <p:stCondLst>
+                                    <p:cond delay="0"/>
+                                  </p:stCondLst>
+                                  <p:childTnLst>
+                                    <p:set>
+                                      <p:cBhvr>
+                                        <p:cTn id="6" dur="1" fill="hold">
+                                          <p:stCondLst>
+                                            <p:cond delay="0"/>
+                                          </p:stCondLst>
+                                        </p:cTn>
+                                        <p:tgtEl>
+                                          <p:spTgt spid="11"/>
+                                        </p:tgtEl>
+                                        <p:attrNameLst>
+                                          <p:attrName>style.visibility</p:attrName>
+                                        </p:attrNameLst>
+                                      </p:cBhvr>
+                                      <p:to>
+                                        <p:strVal val="visible"/>
+                                      </p:to>
+                                    </p:set>
+                                    <p:animEffect transition="in" filter="fade">
+                                      <p:cBhvr>
+                                        <p:cTn id="7" dur="500"/>
+                                        <p:tgtEl>
+                                          <p:spTgt spid="11"/>
+                                        </p:tgtEl>
+                                      </p:cBhvr>
+                                    </p:animEffect>
+                                  </p:childTnLst>
+                                </p:cTn>
+                              </p:par>
+                            </p:childTnLst>
+                          </p:cTn>
+                        </p:par>
+                      </p:childTnLst>
+                    </p:cTn>
+                  </p:par>
+                  <p:par>
+                    <p:cTn id="8" fill="hold">
+                      <p:stCondLst>
+                        <p:cond delay="indefinite"/>
+                      </p:stCondLst>
+                      <p:childTnLst>
+                        <p:par>
+                          <p:cTn id="9" fill="hold">
+                            <p:stCondLst>
+                              <p:cond delay="0"/>
+                            </p:stCondLst>
+                            <p:childTnLst>
+                              <p:par>
+                                <p:cTn id="10" presetID="10" presetClass="entr" presetSubtype="0" fill="hold" nodeType="clickEffect">
+                                  <p:stCondLst>
+                                    <p:cond delay="0"/>
+                                  </p:stCondLst>
+                                  <p:childTnLst>
+                                    <p:set>
+                                      <p:cBhvr>
+                                        <p:cTn id="11" dur="1" fill="hold">
+                                          <p:stCondLst>
+                                            <p:cond delay="0"/>
+                                          </p:stCondLst>
+                                        </p:cTn>
+                                        <p:tgtEl>
+                                          <p:spTgt spid="13"/>
+                                        </p:tgtEl>
+                                        <p:attrNameLst>
+                                          <p:attrName>style.visibility</p:attrName>
+                                        </p:attrNameLst>
+                                      </p:cBhvr>
+                                      <p:to>
+                                        <p:strVal val="visible"/>
+                                      </p:to>
+                                    </p:set>
+                                    <p:animEffect transition="in" filter="fade">
+                                      <p:cBhvr>
+                                        <p:cTn id="12" dur="500"/>
+                                        <p:tgtEl>
+                                          <p:spTgt spid="13"/>
+                                        </p:tgtEl>
+                                      </p:cBhvr>
+                                    </p:animEffect>
+                                  </p:childTnLst>
+                                </p:cTn>
+                              </p:par>
+                            </p:childTnLst>
+                          </p:cTn>
+                        </p:par>
+                      </p:childTnLst>
+                    </p:cTn>
+                  </p:par>
+                </p:childTnLst>
+              </p:cTn>
+              <p:prevCondLst>
+                <p:cond evt="onPrev" delay="0">
+                  <p:tgtEl>
+                    <p:sldTgt/>
+                  </p:tgtEl>
+                </p:cond>
+              </p:prevCondLst>
+              <p:nextCondLst>
+                <p:cond evt="onNext" delay="0">
+                  <p:tgtEl>
+                    <p:sldTgt/>
+                  </p:tgtEl>
+                </p:cond>
+              </p:nextCondLst>
+            </p:seq>
+          </p:childTnLst>
+        </p:cTn>
+      </p:par>
+    </p:tnLst>
+  </p:timing>
 </p:sld>
 </file>
 
@@ -5725,6 +5945,13 @@
       </p:transition>
     </mc:Fallback>
   </mc:AlternateContent>
+  <p:timing>
+    <p:tnLst>
+      <p:par>
+        <p:cTn id="1" dur="indefinite" restart="never" nodeType="tmRoot"/>
+      </p:par>
+    </p:tnLst>
+  </p:timing>
 </p:sld>
 </file>
 
@@ -5802,86 +6029,101 @@
           </a:xfrm>
         </p:spPr>
       </p:pic>
-      <p:sp>
-        <p:nvSpPr>
-          <p:cNvPr id="6" name="Right Brace 5">
-            <a:extLst>
-              <a:ext uri="{FF2B5EF4-FFF2-40B4-BE49-F238E27FC236}">
-                <a16:creationId xmlns:a16="http://schemas.microsoft.com/office/drawing/2014/main" id="{5DEE5E07-1649-4209-A345-550492AC20F2}"/>
-              </a:ext>
-            </a:extLst>
-          </p:cNvPr>
-          <p:cNvSpPr/>
+      <p:grpSp>
+        <p:nvGrpSpPr>
+          <p:cNvPr id="3" name="Group 2"/>
+          <p:cNvGrpSpPr/>
           <p:nvPr/>
-        </p:nvSpPr>
-        <p:spPr>
+        </p:nvGrpSpPr>
+        <p:grpSpPr>
           <a:xfrm>
             <a:off x="5487887" y="3140968"/>
-            <a:ext cx="318493" cy="1800200"/>
+            <a:ext cx="2993875" cy="1800200"/>
+            <a:chOff x="5487887" y="3140968"/>
+            <a:chExt cx="2993875" cy="1800200"/>
           </a:xfrm>
-          <a:prstGeom prst="rightBrace">
-            <a:avLst/>
-          </a:prstGeom>
-          <a:ln/>
-        </p:spPr>
-        <p:style>
-          <a:lnRef idx="3">
-            <a:schemeClr val="accent5"/>
-          </a:lnRef>
-          <a:fillRef idx="0">
-            <a:schemeClr val="accent5"/>
-          </a:fillRef>
-          <a:effectRef idx="2">
-            <a:schemeClr val="accent5"/>
-          </a:effectRef>
-          <a:fontRef idx="minor">
-            <a:schemeClr val="tx1"/>
-          </a:fontRef>
-        </p:style>
-        <p:txBody>
-          <a:bodyPr rtlCol="0" anchor="ctr"/>
-          <a:lstStyle/>
-          <a:p>
-            <a:pPr algn="ctr"/>
-            <a:endParaRPr lang="en-GB"/>
-          </a:p>
-        </p:txBody>
-      </p:sp>
-      <p:sp>
-        <p:nvSpPr>
-          <p:cNvPr id="7" name="TextBox 6">
-            <a:extLst>
-              <a:ext uri="{FF2B5EF4-FFF2-40B4-BE49-F238E27FC236}">
-                <a16:creationId xmlns:a16="http://schemas.microsoft.com/office/drawing/2014/main" id="{93CA275A-E163-4EF7-B627-17FFC1096903}"/>
-              </a:ext>
-            </a:extLst>
-          </p:cNvPr>
-          <p:cNvSpPr txBox="1"/>
-          <p:nvPr/>
-        </p:nvSpPr>
-        <p:spPr>
-          <a:xfrm>
-            <a:off x="5889474" y="3564014"/>
-            <a:ext cx="2592288" cy="954107"/>
-          </a:xfrm>
-          <a:prstGeom prst="rect">
-            <a:avLst/>
-          </a:prstGeom>
-          <a:noFill/>
-        </p:spPr>
-        <p:txBody>
-          <a:bodyPr wrap="square" rtlCol="0">
-            <a:spAutoFit/>
-          </a:bodyPr>
-          <a:lstStyle/>
-          <a:p>
-            <a:r>
-              <a:rPr lang="en-GB" sz="2800" dirty="0"/>
-              <a:t>Pure python code</a:t>
-            </a:r>
-          </a:p>
-        </p:txBody>
-      </p:sp>
+        </p:grpSpPr>
+        <p:sp>
+          <p:nvSpPr>
+            <p:cNvPr id="6" name="Right Brace 5">
+              <a:extLst>
+                <a:ext uri="{FF2B5EF4-FFF2-40B4-BE49-F238E27FC236}">
+                  <a16:creationId xmlns:a16="http://schemas.microsoft.com/office/drawing/2014/main" id="{5DEE5E07-1649-4209-A345-550492AC20F2}"/>
+                </a:ext>
+              </a:extLst>
+            </p:cNvPr>
+            <p:cNvSpPr/>
+            <p:nvPr/>
+          </p:nvSpPr>
+          <p:spPr>
+            <a:xfrm>
+              <a:off x="5487887" y="3140968"/>
+              <a:ext cx="318493" cy="1800200"/>
+            </a:xfrm>
+            <a:prstGeom prst="rightBrace">
+              <a:avLst/>
+            </a:prstGeom>
+            <a:ln/>
+          </p:spPr>
+          <p:style>
+            <a:lnRef idx="3">
+              <a:schemeClr val="accent5"/>
+            </a:lnRef>
+            <a:fillRef idx="0">
+              <a:schemeClr val="accent5"/>
+            </a:fillRef>
+            <a:effectRef idx="2">
+              <a:schemeClr val="accent5"/>
+            </a:effectRef>
+            <a:fontRef idx="minor">
+              <a:schemeClr val="tx1"/>
+            </a:fontRef>
+          </p:style>
+          <p:txBody>
+            <a:bodyPr rtlCol="0" anchor="ctr"/>
+            <a:lstStyle/>
+            <a:p>
+              <a:pPr algn="ctr"/>
+              <a:endParaRPr lang="en-GB"/>
+            </a:p>
+          </p:txBody>
+        </p:sp>
+        <p:sp>
+          <p:nvSpPr>
+            <p:cNvPr id="7" name="TextBox 6">
+              <a:extLst>
+                <a:ext uri="{FF2B5EF4-FFF2-40B4-BE49-F238E27FC236}">
+                  <a16:creationId xmlns:a16="http://schemas.microsoft.com/office/drawing/2014/main" id="{93CA275A-E163-4EF7-B627-17FFC1096903}"/>
+                </a:ext>
+              </a:extLst>
+            </p:cNvPr>
+            <p:cNvSpPr txBox="1"/>
+            <p:nvPr/>
+          </p:nvSpPr>
+          <p:spPr>
+            <a:xfrm>
+              <a:off x="5889474" y="3564014"/>
+              <a:ext cx="2592288" cy="954107"/>
+            </a:xfrm>
+            <a:prstGeom prst="rect">
+              <a:avLst/>
+            </a:prstGeom>
+            <a:noFill/>
+          </p:spPr>
+          <p:txBody>
+            <a:bodyPr wrap="square" rtlCol="0">
+              <a:spAutoFit/>
+            </a:bodyPr>
+            <a:lstStyle/>
+            <a:p>
+              <a:r>
+                <a:rPr lang="en-GB" sz="2800" dirty="0"/>
+                <a:t>Pure python code</a:t>
+              </a:r>
+            </a:p>
+          </p:txBody>
+        </p:sp>
+      </p:grpSp>
     </p:spTree>
     <p:extLst>
       <p:ext uri="{BB962C8B-B14F-4D97-AF65-F5344CB8AC3E}">
@@ -5904,6 +6146,142 @@
       </p:transition>
     </mc:Fallback>
   </mc:AlternateContent>
+  <p:timing>
+    <p:tnLst>
+      <p:par>
+        <p:cTn id="1" dur="indefinite" restart="never" nodeType="tmRoot">
+          <p:childTnLst>
+            <p:seq concurrent="1" nextAc="seek">
+              <p:cTn id="2" dur="indefinite" nodeType="mainSeq">
+                <p:childTnLst>
+                  <p:par>
+                    <p:cTn id="3" fill="hold">
+                      <p:stCondLst>
+                        <p:cond delay="indefinite"/>
+                      </p:stCondLst>
+                      <p:childTnLst>
+                        <p:par>
+                          <p:cTn id="4" fill="hold">
+                            <p:stCondLst>
+                              <p:cond delay="0"/>
+                            </p:stCondLst>
+                            <p:childTnLst>
+                              <p:par>
+                                <p:cTn id="5" presetID="10" presetClass="entr" presetSubtype="0" fill="hold" nodeType="clickEffect">
+                                  <p:stCondLst>
+                                    <p:cond delay="0"/>
+                                  </p:stCondLst>
+                                  <p:childTnLst>
+                                    <p:set>
+                                      <p:cBhvr>
+                                        <p:cTn id="6" dur="1" fill="hold">
+                                          <p:stCondLst>
+                                            <p:cond delay="0"/>
+                                          </p:stCondLst>
+                                        </p:cTn>
+                                        <p:tgtEl>
+                                          <p:spTgt spid="5"/>
+                                        </p:tgtEl>
+                                        <p:attrNameLst>
+                                          <p:attrName>style.visibility</p:attrName>
+                                        </p:attrNameLst>
+                                      </p:cBhvr>
+                                      <p:to>
+                                        <p:strVal val="visible"/>
+                                      </p:to>
+                                    </p:set>
+                                    <p:animEffect transition="in" filter="fade">
+                                      <p:cBhvr>
+                                        <p:cTn id="7" dur="500"/>
+                                        <p:tgtEl>
+                                          <p:spTgt spid="5"/>
+                                        </p:tgtEl>
+                                      </p:cBhvr>
+                                    </p:animEffect>
+                                  </p:childTnLst>
+                                </p:cTn>
+                              </p:par>
+                            </p:childTnLst>
+                          </p:cTn>
+                        </p:par>
+                      </p:childTnLst>
+                    </p:cTn>
+                  </p:par>
+                  <p:par>
+                    <p:cTn id="8" fill="hold">
+                      <p:stCondLst>
+                        <p:cond delay="indefinite"/>
+                      </p:stCondLst>
+                      <p:childTnLst>
+                        <p:par>
+                          <p:cTn id="9" fill="hold">
+                            <p:stCondLst>
+                              <p:cond delay="0"/>
+                            </p:stCondLst>
+                            <p:childTnLst>
+                              <p:par>
+                                <p:cTn id="10" presetID="10" presetClass="entr" presetSubtype="0" fill="hold" nodeType="clickEffect">
+                                  <p:stCondLst>
+                                    <p:cond delay="0"/>
+                                  </p:stCondLst>
+                                  <p:childTnLst>
+                                    <p:set>
+                                      <p:cBhvr>
+                                        <p:cTn id="11" dur="1" fill="hold">
+                                          <p:stCondLst>
+                                            <p:cond delay="0"/>
+                                          </p:stCondLst>
+                                        </p:cTn>
+                                        <p:tgtEl>
+                                          <p:spTgt spid="3"/>
+                                        </p:tgtEl>
+                                        <p:attrNameLst>
+                                          <p:attrName>style.visibility</p:attrName>
+                                        </p:attrNameLst>
+                                      </p:cBhvr>
+                                      <p:to>
+                                        <p:strVal val="visible"/>
+                                      </p:to>
+                                    </p:set>
+                                    <p:animEffect transition="in" filter="fade">
+                                      <p:cBhvr>
+                                        <p:cTn id="12" dur="500"/>
+                                        <p:tgtEl>
+                                          <p:spTgt spid="3"/>
+                                        </p:tgtEl>
+                                      </p:cBhvr>
+                                    </p:animEffect>
+                                  </p:childTnLst>
+                                </p:cTn>
+                              </p:par>
+                            </p:childTnLst>
+                          </p:cTn>
+                        </p:par>
+                      </p:childTnLst>
+                    </p:cTn>
+                  </p:par>
+                </p:childTnLst>
+              </p:cTn>
+              <p:prevCondLst>
+                <p:cond evt="onPrev" delay="0">
+                  <p:tgtEl>
+                    <p:sldTgt/>
+                  </p:tgtEl>
+                </p:cond>
+              </p:prevCondLst>
+              <p:nextCondLst>
+                <p:cond evt="onNext" delay="0">
+                  <p:tgtEl>
+                    <p:sldTgt/>
+                  </p:tgtEl>
+                </p:cond>
+              </p:nextCondLst>
+            </p:seq>
+          </p:childTnLst>
+        </p:cTn>
+      </p:par>
+    </p:tnLst>
+  </p:timing>
 </p:sld>
 </file>
 
@@ -6034,6 +6412,142 @@
       </p:transition>
     </mc:Fallback>
   </mc:AlternateContent>
+  <p:timing>
+    <p:tnLst>
+      <p:par>
+        <p:cTn id="1" dur="indefinite" restart="never" nodeType="tmRoot">
+          <p:childTnLst>
+            <p:seq concurrent="1" nextAc="seek">
+              <p:cTn id="2" dur="indefinite" nodeType="mainSeq">
+                <p:childTnLst>
+                  <p:par>
+                    <p:cTn id="3" fill="hold">
+                      <p:stCondLst>
+                        <p:cond delay="indefinite"/>
+                      </p:stCondLst>
+                      <p:childTnLst>
+                        <p:par>
+                          <p:cTn id="4" fill="hold">
+                            <p:stCondLst>
+                              <p:cond delay="0"/>
+                            </p:stCondLst>
+                            <p:childTnLst>
+                              <p:par>
+                                <p:cTn id="5" presetID="10" presetClass="entr" presetSubtype="0" fill="hold" nodeType="clickEffect">
+                                  <p:stCondLst>
+                                    <p:cond delay="0"/>
+                                  </p:stCondLst>
+                                  <p:childTnLst>
+                                    <p:set>
+                                      <p:cBhvr>
+                                        <p:cTn id="6" dur="1" fill="hold">
+                                          <p:stCondLst>
+                                            <p:cond delay="0"/>
+                                          </p:stCondLst>
+                                        </p:cTn>
+                                        <p:tgtEl>
+                                          <p:spTgt spid="9"/>
+                                        </p:tgtEl>
+                                        <p:attrNameLst>
+                                          <p:attrName>style.visibility</p:attrName>
+                                        </p:attrNameLst>
+                                      </p:cBhvr>
+                                      <p:to>
+                                        <p:strVal val="visible"/>
+                                      </p:to>
+                                    </p:set>
+                                    <p:animEffect transition="in" filter="fade">
+                                      <p:cBhvr>
+                                        <p:cTn id="7" dur="500"/>
+                                        <p:tgtEl>
+                                          <p:spTgt spid="9"/>
+                                        </p:tgtEl>
+                                      </p:cBhvr>
+                                    </p:animEffect>
+                                  </p:childTnLst>
+                                </p:cTn>
+                              </p:par>
+                            </p:childTnLst>
+                          </p:cTn>
+                        </p:par>
+                      </p:childTnLst>
+                    </p:cTn>
+                  </p:par>
+                  <p:par>
+                    <p:cTn id="8" fill="hold">
+                      <p:stCondLst>
+                        <p:cond delay="indefinite"/>
+                      </p:stCondLst>
+                      <p:childTnLst>
+                        <p:par>
+                          <p:cTn id="9" fill="hold">
+                            <p:stCondLst>
+                              <p:cond delay="0"/>
+                            </p:stCondLst>
+                            <p:childTnLst>
+                              <p:par>
+                                <p:cTn id="10" presetID="10" presetClass="entr" presetSubtype="0" fill="hold" nodeType="clickEffect">
+                                  <p:stCondLst>
+                                    <p:cond delay="0"/>
+                                  </p:stCondLst>
+                                  <p:childTnLst>
+                                    <p:set>
+                                      <p:cBhvr>
+                                        <p:cTn id="11" dur="1" fill="hold">
+                                          <p:stCondLst>
+                                            <p:cond delay="0"/>
+                                          </p:stCondLst>
+                                        </p:cTn>
+                                        <p:tgtEl>
+                                          <p:spTgt spid="11"/>
+                                        </p:tgtEl>
+                                        <p:attrNameLst>
+                                          <p:attrName>style.visibility</p:attrName>
+                                        </p:attrNameLst>
+                                      </p:cBhvr>
+                                      <p:to>
+                                        <p:strVal val="visible"/>
+                                      </p:to>
+                                    </p:set>
+                                    <p:animEffect transition="in" filter="fade">
+                                      <p:cBhvr>
+                                        <p:cTn id="12" dur="500"/>
+                                        <p:tgtEl>
+                                          <p:spTgt spid="11"/>
+                                        </p:tgtEl>
+                                      </p:cBhvr>
+                                    </p:animEffect>
+                                  </p:childTnLst>
+                                </p:cTn>
+                              </p:par>
+                            </p:childTnLst>
+                          </p:cTn>
+                        </p:par>
+                      </p:childTnLst>
+                    </p:cTn>
+                  </p:par>
+                </p:childTnLst>
+              </p:cTn>
+              <p:prevCondLst>
+                <p:cond evt="onPrev" delay="0">
+                  <p:tgtEl>
+                    <p:sldTgt/>
+                  </p:tgtEl>
+                </p:cond>
+              </p:prevCondLst>
+              <p:nextCondLst>
+                <p:cond evt="onNext" delay="0">
+                  <p:tgtEl>
+                    <p:sldTgt/>
+                  </p:tgtEl>
+                </p:cond>
+              </p:nextCondLst>
+            </p:seq>
+          </p:childTnLst>
+        </p:cTn>
+      </p:par>
+    </p:tnLst>
+  </p:timing>
 </p:sld>
 </file>
 
@@ -6168,6 +6682,13 @@
       </p:transition>
     </mc:Fallback>
   </mc:AlternateContent>
+  <p:timing>
+    <p:tnLst>
+      <p:par>
+        <p:cTn id="1" dur="indefinite" restart="never" nodeType="tmRoot"/>
+      </p:par>
+    </p:tnLst>
+  </p:timing>
 </p:sld>
 </file>
 
@@ -6284,6 +6805,13 @@
       </p:transition>
     </mc:Fallback>
   </mc:AlternateContent>
+  <p:timing>
+    <p:tnLst>
+      <p:par>
+        <p:cTn id="1" dur="indefinite" restart="never" nodeType="tmRoot"/>
+      </p:par>
+    </p:tnLst>
+  </p:timing>
 </p:sld>
 </file>
 
@@ -6388,6 +6916,13 @@
       </p:transition>
     </mc:Fallback>
   </mc:AlternateContent>
+  <p:timing>
+    <p:tnLst>
+      <p:par>
+        <p:cTn id="1" dur="indefinite" restart="never" nodeType="tmRoot"/>
+      </p:par>
+    </p:tnLst>
+  </p:timing>
 </p:sld>
 </file>
 
@@ -6487,6 +7022,13 @@
       </p:transition>
     </mc:Fallback>
   </mc:AlternateContent>
+  <p:timing>
+    <p:tnLst>
+      <p:par>
+        <p:cTn id="1" dur="indefinite" restart="never" nodeType="tmRoot"/>
+      </p:par>
+    </p:tnLst>
+  </p:timing>
 </p:sld>
 </file>
 
@@ -6586,6 +7128,13 @@
       </p:transition>
     </mc:Fallback>
   </mc:AlternateContent>
+  <p:timing>
+    <p:tnLst>
+      <p:par>
+        <p:cTn id="1" dur="indefinite" restart="never" nodeType="tmRoot"/>
+      </p:par>
+    </p:tnLst>
+  </p:timing>
 </p:sld>
 </file>
 
@@ -6810,6 +7359,13 @@
       </p:transition>
     </mc:Fallback>
   </mc:AlternateContent>
+  <p:timing>
+    <p:tnLst>
+      <p:par>
+        <p:cTn id="1" dur="indefinite" restart="never" nodeType="tmRoot"/>
+      </p:par>
+    </p:tnLst>
+  </p:timing>
 </p:sld>
 </file>
 
@@ -6941,6 +7497,13 @@
       </p:transition>
     </mc:Fallback>
   </mc:AlternateContent>
+  <p:timing>
+    <p:tnLst>
+      <p:par>
+        <p:cTn id="1" dur="indefinite" restart="never" nodeType="tmRoot"/>
+      </p:par>
+    </p:tnLst>
+  </p:timing>
 </p:sld>
 </file>
 
@@ -7099,6 +7662,13 @@
       </p:transition>
     </mc:Fallback>
   </mc:AlternateContent>
+  <p:timing>
+    <p:tnLst>
+      <p:par>
+        <p:cTn id="1" dur="indefinite" restart="never" nodeType="tmRoot"/>
+      </p:par>
+    </p:tnLst>
+  </p:timing>
 </p:sld>
 </file>
 
@@ -7169,10 +7739,185 @@
       </p:transition>
     </mc:Fallback>
   </mc:AlternateContent>
+  <p:timing>
+    <p:tnLst>
+      <p:par>
+        <p:cTn id="1" dur="indefinite" restart="never" nodeType="tmRoot"/>
+      </p:par>
+    </p:tnLst>
+  </p:timing>
 </p:sld>
 </file>
 
 <file path=ppt/slides/slide24.xml><?xml version="1.0" encoding="utf-8"?>
+<p:sld xmlns:a="http://schemas.openxmlformats.org/drawingml/2006/main" xmlns:r="http://schemas.openxmlformats.org/officeDocument/2006/relationships" xmlns:p="http://schemas.openxmlformats.org/presentationml/2006/main">
+  <p:cSld>
+    <p:spTree>
+      <p:nvGrpSpPr>
+        <p:cNvPr id="1" name=""/>
+        <p:cNvGrpSpPr/>
+        <p:nvPr/>
+      </p:nvGrpSpPr>
+      <p:grpSpPr>
+        <a:xfrm>
+          <a:off x="0" y="0"/>
+          <a:ext cx="0" cy="0"/>
+          <a:chOff x="0" y="0"/>
+          <a:chExt cx="0" cy="0"/>
+        </a:xfrm>
+      </p:grpSpPr>
+      <p:sp>
+        <p:nvSpPr>
+          <p:cNvPr id="2" name="Title 1"/>
+          <p:cNvSpPr>
+            <a:spLocks noGrp="1"/>
+          </p:cNvSpPr>
+          <p:nvPr>
+            <p:ph type="title"/>
+          </p:nvPr>
+        </p:nvSpPr>
+        <p:spPr/>
+        <p:txBody>
+          <a:bodyPr/>
+          <a:lstStyle/>
+          <a:p>
+            <a:r>
+              <a:rPr lang="en-GB" dirty="0" smtClean="0"/>
+              <a:t>Questions?</a:t>
+            </a:r>
+            <a:endParaRPr lang="en-GB" dirty="0"/>
+          </a:p>
+        </p:txBody>
+      </p:sp>
+      <p:sp>
+        <p:nvSpPr>
+          <p:cNvPr id="3" name="Content Placeholder 2"/>
+          <p:cNvSpPr>
+            <a:spLocks noGrp="1"/>
+          </p:cNvSpPr>
+          <p:nvPr>
+            <p:ph idx="1"/>
+          </p:nvPr>
+        </p:nvSpPr>
+        <p:spPr/>
+        <p:txBody>
+          <a:bodyPr/>
+          <a:lstStyle/>
+          <a:p>
+            <a:r>
+              <a:rPr lang="en-GB" dirty="0" smtClean="0"/>
+              <a:t>Source code and </a:t>
+            </a:r>
+            <a:r>
+              <a:rPr lang="en-GB" dirty="0"/>
+              <a:t>slides </a:t>
+            </a:r>
+            <a:r>
+              <a:rPr lang="en-GB" dirty="0" smtClean="0"/>
+              <a:t>available at:</a:t>
+            </a:r>
+            <a:br>
+              <a:rPr lang="en-GB" dirty="0" smtClean="0"/>
+            </a:br>
+            <a:r>
+              <a:rPr lang="en-GB" dirty="0" smtClean="0">
+                <a:hlinkClick r:id="rId2"/>
+              </a:rPr>
+              <a:t>https</a:t>
+            </a:r>
+            <a:r>
+              <a:rPr lang="en-GB" dirty="0">
+                <a:hlinkClick r:id="rId2"/>
+              </a:rPr>
+              <a:t>://</a:t>
+            </a:r>
+            <a:r>
+              <a:rPr lang="en-GB" dirty="0" smtClean="0">
+                <a:hlinkClick r:id="rId2"/>
+              </a:rPr>
+              <a:t>github.com/JamieMair/intro-to-julia-talk</a:t>
+            </a:r>
+            <a:endParaRPr lang="en-GB" dirty="0" smtClean="0"/>
+          </a:p>
+          <a:p>
+            <a:r>
+              <a:rPr lang="en-GB" dirty="0" smtClean="0"/>
+              <a:t>Additional repository with parallel </a:t>
+            </a:r>
+            <a:r>
+              <a:rPr lang="en-GB"/>
+              <a:t>examples:</a:t>
+            </a:r>
+            <a:br>
+              <a:rPr lang="en-GB"/>
+            </a:br>
+            <a:r>
+              <a:rPr lang="en-GB">
+                <a:hlinkClick r:id="rId3"/>
+              </a:rPr>
+              <a:t>https</a:t>
+            </a:r>
+            <a:r>
+              <a:rPr lang="en-GB">
+                <a:hlinkClick r:id="rId3"/>
+              </a:rPr>
+              <a:t>://</a:t>
+            </a:r>
+            <a:r>
+              <a:rPr lang="en-GB" smtClean="0">
+                <a:hlinkClick r:id="rId3"/>
+              </a:rPr>
+              <a:t>github.com/JamieMair/julia-parallel-examples</a:t>
+            </a:r>
+            <a:endParaRPr lang="en-GB" smtClean="0"/>
+          </a:p>
+          <a:p>
+            <a:pPr marL="0" indent="0">
+              <a:buNone/>
+            </a:pPr>
+            <a:endParaRPr lang="en-GB" dirty="0" smtClean="0"/>
+          </a:p>
+          <a:p>
+            <a:pPr marL="0" indent="0">
+              <a:buNone/>
+            </a:pPr>
+            <a:endParaRPr lang="en-GB" dirty="0"/>
+          </a:p>
+        </p:txBody>
+      </p:sp>
+    </p:spTree>
+    <p:extLst>
+      <p:ext uri="{BB962C8B-B14F-4D97-AF65-F5344CB8AC3E}">
+        <p14:creationId xmlns:p14="http://schemas.microsoft.com/office/powerpoint/2010/main" val="416862611"/>
+      </p:ext>
+    </p:extLst>
+  </p:cSld>
+  <p:clrMapOvr>
+    <a:masterClrMapping/>
+  </p:clrMapOvr>
+  <mc:AlternateContent xmlns:mc="http://schemas.openxmlformats.org/markup-compatibility/2006" xmlns:p14="http://schemas.microsoft.com/office/powerpoint/2010/main">
+    <mc:Choice Requires="p14">
+      <p:transition spd="med" p14:dur="700">
+        <p:fade/>
+      </p:transition>
+    </mc:Choice>
+    <mc:Fallback xmlns="">
+      <p:transition spd="med">
+        <p:fade/>
+      </p:transition>
+    </mc:Fallback>
+  </mc:AlternateContent>
+  <p:timing>
+    <p:tnLst>
+      <p:par>
+        <p:cTn id="1" dur="indefinite" restart="never" nodeType="tmRoot"/>
+      </p:par>
+    </p:tnLst>
+  </p:timing>
+</p:sld>
+</file>
+
+<file path=ppt/slides/slide25.xml><?xml version="1.0" encoding="utf-8"?>
 <p:sld xmlns:a="http://schemas.openxmlformats.org/drawingml/2006/main" xmlns:r="http://schemas.openxmlformats.org/officeDocument/2006/relationships" xmlns:p="http://schemas.openxmlformats.org/presentationml/2006/main">
   <p:cSld>
     <p:spTree>
@@ -7496,7 +8241,7 @@
 </p:sld>
 </file>
 
-<file path=ppt/slides/slide25.xml><?xml version="1.0" encoding="utf-8"?>
+<file path=ppt/slides/slide26.xml><?xml version="1.0" encoding="utf-8"?>
 <p:sld xmlns:a="http://schemas.openxmlformats.org/drawingml/2006/main" xmlns:r="http://schemas.openxmlformats.org/officeDocument/2006/relationships" xmlns:p="http://schemas.openxmlformats.org/presentationml/2006/main">
   <p:cSld>
     <p:spTree>
@@ -7855,7 +8600,7 @@
 </p:sld>
 </file>
 
-<file path=ppt/slides/slide26.xml><?xml version="1.0" encoding="utf-8"?>
+<file path=ppt/slides/slide27.xml><?xml version="1.0" encoding="utf-8"?>
 <p:sld xmlns:a="http://schemas.openxmlformats.org/drawingml/2006/main" xmlns:r="http://schemas.openxmlformats.org/officeDocument/2006/relationships" xmlns:p="http://schemas.openxmlformats.org/presentationml/2006/main">
   <p:cSld>
     <p:spTree>
@@ -8726,166 +9471,6 @@
           </a:p>
         </p:txBody>
       </p:sp>
-      <mc:AlternateContent xmlns:mc="http://schemas.openxmlformats.org/markup-compatibility/2006" xmlns:a14="http://schemas.microsoft.com/office/drawing/2010/main">
-        <mc:Choice Requires="a14">
-          <p:sp>
-            <p:nvSpPr>
-              <p:cNvPr id="13" name="TextBox 12">
-                <a:extLst>
-                  <a:ext uri="{FF2B5EF4-FFF2-40B4-BE49-F238E27FC236}">
-                    <a16:creationId xmlns:a16="http://schemas.microsoft.com/office/drawing/2014/main" id="{C35967D0-FE5A-4C7F-A0AA-D68BA3D24A5A}"/>
-                  </a:ext>
-                </a:extLst>
-              </p:cNvPr>
-              <p:cNvSpPr txBox="1"/>
-              <p:nvPr/>
-            </p:nvSpPr>
-            <p:spPr>
-              <a:xfrm>
-                <a:off x="10368542" y="235884"/>
-                <a:ext cx="1800200" cy="830997"/>
-              </a:xfrm>
-              <a:prstGeom prst="rect">
-                <a:avLst/>
-              </a:prstGeom>
-              <a:noFill/>
-            </p:spPr>
-            <p:txBody>
-              <a:bodyPr wrap="square" rtlCol="0">
-                <a:spAutoFit/>
-              </a:bodyPr>
-              <a:lstStyle/>
-              <a:p>
-                <a:pPr/>
-                <a14:m>
-                  <m:oMathPara xmlns:m="http://schemas.openxmlformats.org/officeDocument/2006/math">
-                    <m:oMathParaPr>
-                      <m:jc m:val="centerGroup"/>
-                    </m:oMathParaPr>
-                    <m:oMath xmlns:m="http://schemas.openxmlformats.org/officeDocument/2006/math">
-                      <m:r>
-                        <a:rPr lang="en-GB" b="0" i="1" smtClean="0">
-                          <a:latin typeface="Cambria Math" panose="02040503050406030204" pitchFamily="18" charset="0"/>
-                        </a:rPr>
-                        <m:t>𝑁</m:t>
-                      </m:r>
-                      <m:r>
-                        <a:rPr lang="en-GB" b="0" i="1" smtClean="0">
-                          <a:latin typeface="Cambria Math" panose="02040503050406030204" pitchFamily="18" charset="0"/>
-                        </a:rPr>
-                        <m:t>=</m:t>
-                      </m:r>
-                      <m:sSup>
-                        <m:sSupPr>
-                          <m:ctrlPr>
-                            <a:rPr lang="en-GB" b="0" i="1" smtClean="0">
-                              <a:latin typeface="Cambria Math" panose="02040503050406030204" pitchFamily="18" charset="0"/>
-                            </a:rPr>
-                          </m:ctrlPr>
-                        </m:sSupPr>
-                        <m:e>
-                          <m:r>
-                            <a:rPr lang="en-GB" b="0" i="1" smtClean="0">
-                              <a:latin typeface="Cambria Math" panose="02040503050406030204" pitchFamily="18" charset="0"/>
-                            </a:rPr>
-                            <m:t>2</m:t>
-                          </m:r>
-                        </m:e>
-                        <m:sup>
-                          <m:r>
-                            <a:rPr lang="en-GB" b="0" i="1" smtClean="0">
-                              <a:latin typeface="Cambria Math" panose="02040503050406030204" pitchFamily="18" charset="0"/>
-                            </a:rPr>
-                            <m:t>10</m:t>
-                          </m:r>
-                        </m:sup>
-                      </m:sSup>
-                    </m:oMath>
-                  </m:oMathPara>
-                </a14:m>
-                <a:endParaRPr lang="en-GB" b="0" i="1" dirty="0">
-                  <a:latin typeface="Cambria Math" panose="02040503050406030204" pitchFamily="18" charset="0"/>
-                </a:endParaRPr>
-              </a:p>
-              <a:p>
-                <a:pPr/>
-                <a14:m>
-                  <m:oMathPara xmlns:m="http://schemas.openxmlformats.org/officeDocument/2006/math">
-                    <m:oMathParaPr>
-                      <m:jc m:val="centerGroup"/>
-                    </m:oMathParaPr>
-                    <m:oMath xmlns:m="http://schemas.openxmlformats.org/officeDocument/2006/math">
-                      <m:r>
-                        <a:rPr lang="en-GB" b="0" i="1" smtClean="0">
-                          <a:latin typeface="Cambria Math" panose="02040503050406030204" pitchFamily="18" charset="0"/>
-                        </a:rPr>
-                        <m:t> </m:t>
-                      </m:r>
-                      <m:r>
-                        <a:rPr lang="en-GB" b="0" i="1" smtClean="0">
-                          <a:latin typeface="Cambria Math" panose="02040503050406030204" pitchFamily="18" charset="0"/>
-                        </a:rPr>
-                        <m:t>𝑇</m:t>
-                      </m:r>
-                      <m:r>
-                        <a:rPr lang="en-GB" b="0" i="1" smtClean="0">
-                          <a:latin typeface="Cambria Math" panose="02040503050406030204" pitchFamily="18" charset="0"/>
-                        </a:rPr>
-                        <m:t>=100</m:t>
-                      </m:r>
-                    </m:oMath>
-                  </m:oMathPara>
-                </a14:m>
-                <a:endParaRPr lang="en-GB" dirty="0"/>
-              </a:p>
-            </p:txBody>
-          </p:sp>
-        </mc:Choice>
-        <mc:Fallback xmlns="">
-          <p:sp>
-            <p:nvSpPr>
-              <p:cNvPr id="13" name="TextBox 12">
-                <a:extLst>
-                  <a:ext uri="{FF2B5EF4-FFF2-40B4-BE49-F238E27FC236}">
-                    <a16:creationId xmlns:a16="http://schemas.microsoft.com/office/drawing/2014/main" id="{C35967D0-FE5A-4C7F-A0AA-D68BA3D24A5A}"/>
-                  </a:ext>
-                </a:extLst>
-              </p:cNvPr>
-              <p:cNvSpPr txBox="1">
-                <a:spLocks noRot="1" noChangeAspect="1" noMove="1" noResize="1" noEditPoints="1" noAdjustHandles="1" noChangeArrowheads="1" noChangeShapeType="1" noTextEdit="1"/>
-              </p:cNvSpPr>
-              <p:nvPr/>
-            </p:nvSpPr>
-            <p:spPr>
-              <a:xfrm>
-                <a:off x="10368542" y="235884"/>
-                <a:ext cx="1800200" cy="830997"/>
-              </a:xfrm>
-              <a:prstGeom prst="rect">
-                <a:avLst/>
-              </a:prstGeom>
-              <a:blipFill>
-                <a:blip r:embed="rId5"/>
-                <a:stretch>
-                  <a:fillRect/>
-                </a:stretch>
-              </a:blipFill>
-            </p:spPr>
-            <p:txBody>
-              <a:bodyPr/>
-              <a:lstStyle/>
-              <a:p>
-                <a:r>
-                  <a:rPr lang="en-GB">
-                    <a:noFill/>
-                  </a:rPr>
-                  <a:t> </a:t>
-                </a:r>
-              </a:p>
-            </p:txBody>
-          </p:sp>
-        </mc:Fallback>
-      </mc:AlternateContent>
     </p:spTree>
     <p:extLst>
       <p:ext uri="{BB962C8B-B14F-4D97-AF65-F5344CB8AC3E}">
@@ -8908,6 +9493,361 @@
       </p:transition>
     </mc:Fallback>
   </mc:AlternateContent>
+  <p:timing>
+    <p:tnLst>
+      <p:par>
+        <p:cTn id="1" dur="indefinite" restart="never" nodeType="tmRoot">
+          <p:childTnLst>
+            <p:seq concurrent="1" nextAc="seek">
+              <p:cTn id="2" dur="indefinite" nodeType="mainSeq">
+                <p:childTnLst>
+                  <p:par>
+                    <p:cTn id="3" fill="hold">
+                      <p:stCondLst>
+                        <p:cond delay="indefinite"/>
+                      </p:stCondLst>
+                      <p:childTnLst>
+                        <p:par>
+                          <p:cTn id="4" fill="hold">
+                            <p:stCondLst>
+                              <p:cond delay="0"/>
+                            </p:stCondLst>
+                            <p:childTnLst>
+                              <p:par>
+                                <p:cTn id="5" presetID="10" presetClass="entr" presetSubtype="0" fill="hold" grpId="0" nodeType="clickEffect">
+                                  <p:stCondLst>
+                                    <p:cond delay="0"/>
+                                  </p:stCondLst>
+                                  <p:childTnLst>
+                                    <p:set>
+                                      <p:cBhvr>
+                                        <p:cTn id="6" dur="1" fill="hold">
+                                          <p:stCondLst>
+                                            <p:cond delay="0"/>
+                                          </p:stCondLst>
+                                        </p:cTn>
+                                        <p:tgtEl>
+                                          <p:spTgt spid="12"/>
+                                        </p:tgtEl>
+                                        <p:attrNameLst>
+                                          <p:attrName>style.visibility</p:attrName>
+                                        </p:attrNameLst>
+                                      </p:cBhvr>
+                                      <p:to>
+                                        <p:strVal val="visible"/>
+                                      </p:to>
+                                    </p:set>
+                                    <p:animEffect transition="in" filter="fade">
+                                      <p:cBhvr>
+                                        <p:cTn id="7" dur="500"/>
+                                        <p:tgtEl>
+                                          <p:spTgt spid="12"/>
+                                        </p:tgtEl>
+                                      </p:cBhvr>
+                                    </p:animEffect>
+                                  </p:childTnLst>
+                                </p:cTn>
+                              </p:par>
+                            </p:childTnLst>
+                          </p:cTn>
+                        </p:par>
+                      </p:childTnLst>
+                    </p:cTn>
+                  </p:par>
+                  <p:par>
+                    <p:cTn id="8" fill="hold">
+                      <p:stCondLst>
+                        <p:cond delay="indefinite"/>
+                      </p:stCondLst>
+                      <p:childTnLst>
+                        <p:par>
+                          <p:cTn id="9" fill="hold">
+                            <p:stCondLst>
+                              <p:cond delay="0"/>
+                            </p:stCondLst>
+                            <p:childTnLst>
+                              <p:par>
+                                <p:cTn id="10" presetID="10" presetClass="entr" presetSubtype="0" fill="hold" grpId="0" nodeType="clickEffect">
+                                  <p:stCondLst>
+                                    <p:cond delay="0"/>
+                                  </p:stCondLst>
+                                  <p:childTnLst>
+                                    <p:set>
+                                      <p:cBhvr>
+                                        <p:cTn id="11" dur="1" fill="hold">
+                                          <p:stCondLst>
+                                            <p:cond delay="0"/>
+                                          </p:stCondLst>
+                                        </p:cTn>
+                                        <p:tgtEl>
+                                          <p:spTgt spid="15"/>
+                                        </p:tgtEl>
+                                        <p:attrNameLst>
+                                          <p:attrName>style.visibility</p:attrName>
+                                        </p:attrNameLst>
+                                      </p:cBhvr>
+                                      <p:to>
+                                        <p:strVal val="visible"/>
+                                      </p:to>
+                                    </p:set>
+                                    <p:animEffect transition="in" filter="fade">
+                                      <p:cBhvr>
+                                        <p:cTn id="12" dur="500"/>
+                                        <p:tgtEl>
+                                          <p:spTgt spid="15"/>
+                                        </p:tgtEl>
+                                      </p:cBhvr>
+                                    </p:animEffect>
+                                  </p:childTnLst>
+                                </p:cTn>
+                              </p:par>
+                            </p:childTnLst>
+                          </p:cTn>
+                        </p:par>
+                      </p:childTnLst>
+                    </p:cTn>
+                  </p:par>
+                  <p:par>
+                    <p:cTn id="13" fill="hold">
+                      <p:stCondLst>
+                        <p:cond delay="indefinite"/>
+                      </p:stCondLst>
+                      <p:childTnLst>
+                        <p:par>
+                          <p:cTn id="14" fill="hold">
+                            <p:stCondLst>
+                              <p:cond delay="0"/>
+                            </p:stCondLst>
+                            <p:childTnLst>
+                              <p:par>
+                                <p:cTn id="15" presetID="10" presetClass="entr" presetSubtype="0" fill="hold" nodeType="clickEffect">
+                                  <p:stCondLst>
+                                    <p:cond delay="0"/>
+                                  </p:stCondLst>
+                                  <p:childTnLst>
+                                    <p:set>
+                                      <p:cBhvr>
+                                        <p:cTn id="16" dur="1" fill="hold">
+                                          <p:stCondLst>
+                                            <p:cond delay="0"/>
+                                          </p:stCondLst>
+                                        </p:cTn>
+                                        <p:tgtEl>
+                                          <p:spTgt spid="5"/>
+                                        </p:tgtEl>
+                                        <p:attrNameLst>
+                                          <p:attrName>style.visibility</p:attrName>
+                                        </p:attrNameLst>
+                                      </p:cBhvr>
+                                      <p:to>
+                                        <p:strVal val="visible"/>
+                                      </p:to>
+                                    </p:set>
+                                    <p:animEffect transition="in" filter="fade">
+                                      <p:cBhvr>
+                                        <p:cTn id="17" dur="500"/>
+                                        <p:tgtEl>
+                                          <p:spTgt spid="5"/>
+                                        </p:tgtEl>
+                                      </p:cBhvr>
+                                    </p:animEffect>
+                                  </p:childTnLst>
+                                </p:cTn>
+                              </p:par>
+                            </p:childTnLst>
+                          </p:cTn>
+                        </p:par>
+                      </p:childTnLst>
+                    </p:cTn>
+                  </p:par>
+                  <p:par>
+                    <p:cTn id="18" fill="hold">
+                      <p:stCondLst>
+                        <p:cond delay="indefinite"/>
+                      </p:stCondLst>
+                      <p:childTnLst>
+                        <p:par>
+                          <p:cTn id="19" fill="hold">
+                            <p:stCondLst>
+                              <p:cond delay="0"/>
+                            </p:stCondLst>
+                            <p:childTnLst>
+                              <p:par>
+                                <p:cTn id="20" presetID="10" presetClass="entr" presetSubtype="0" fill="hold" grpId="0" nodeType="clickEffect">
+                                  <p:stCondLst>
+                                    <p:cond delay="0"/>
+                                  </p:stCondLst>
+                                  <p:childTnLst>
+                                    <p:set>
+                                      <p:cBhvr>
+                                        <p:cTn id="21" dur="1" fill="hold">
+                                          <p:stCondLst>
+                                            <p:cond delay="0"/>
+                                          </p:stCondLst>
+                                        </p:cTn>
+                                        <p:tgtEl>
+                                          <p:spTgt spid="10"/>
+                                        </p:tgtEl>
+                                        <p:attrNameLst>
+                                          <p:attrName>style.visibility</p:attrName>
+                                        </p:attrNameLst>
+                                      </p:cBhvr>
+                                      <p:to>
+                                        <p:strVal val="visible"/>
+                                      </p:to>
+                                    </p:set>
+                                    <p:animEffect transition="in" filter="fade">
+                                      <p:cBhvr>
+                                        <p:cTn id="22" dur="500"/>
+                                        <p:tgtEl>
+                                          <p:spTgt spid="10"/>
+                                        </p:tgtEl>
+                                      </p:cBhvr>
+                                    </p:animEffect>
+                                  </p:childTnLst>
+                                </p:cTn>
+                              </p:par>
+                            </p:childTnLst>
+                          </p:cTn>
+                        </p:par>
+                      </p:childTnLst>
+                    </p:cTn>
+                  </p:par>
+                  <p:par>
+                    <p:cTn id="23" fill="hold">
+                      <p:stCondLst>
+                        <p:cond delay="indefinite"/>
+                      </p:stCondLst>
+                      <p:childTnLst>
+                        <p:par>
+                          <p:cTn id="24" fill="hold">
+                            <p:stCondLst>
+                              <p:cond delay="0"/>
+                            </p:stCondLst>
+                            <p:childTnLst>
+                              <p:par>
+                                <p:cTn id="25" presetID="10" presetClass="entr" presetSubtype="0" fill="hold" grpId="0" nodeType="clickEffect">
+                                  <p:stCondLst>
+                                    <p:cond delay="0"/>
+                                  </p:stCondLst>
+                                  <p:childTnLst>
+                                    <p:set>
+                                      <p:cBhvr>
+                                        <p:cTn id="26" dur="1" fill="hold">
+                                          <p:stCondLst>
+                                            <p:cond delay="0"/>
+                                          </p:stCondLst>
+                                        </p:cTn>
+                                        <p:tgtEl>
+                                          <p:spTgt spid="14"/>
+                                        </p:tgtEl>
+                                        <p:attrNameLst>
+                                          <p:attrName>style.visibility</p:attrName>
+                                        </p:attrNameLst>
+                                      </p:cBhvr>
+                                      <p:to>
+                                        <p:strVal val="visible"/>
+                                      </p:to>
+                                    </p:set>
+                                    <p:animEffect transition="in" filter="fade">
+                                      <p:cBhvr>
+                                        <p:cTn id="27" dur="500"/>
+                                        <p:tgtEl>
+                                          <p:spTgt spid="14"/>
+                                        </p:tgtEl>
+                                      </p:cBhvr>
+                                    </p:animEffect>
+                                  </p:childTnLst>
+                                </p:cTn>
+                              </p:par>
+                            </p:childTnLst>
+                          </p:cTn>
+                        </p:par>
+                      </p:childTnLst>
+                    </p:cTn>
+                  </p:par>
+                  <p:par>
+                    <p:cTn id="28" fill="hold">
+                      <p:stCondLst>
+                        <p:cond delay="indefinite"/>
+                      </p:stCondLst>
+                      <p:childTnLst>
+                        <p:par>
+                          <p:cTn id="29" fill="hold">
+                            <p:stCondLst>
+                              <p:cond delay="0"/>
+                            </p:stCondLst>
+                            <p:childTnLst>
+                              <p:par>
+                                <p:cTn id="30" presetID="10" presetClass="entr" presetSubtype="0" fill="hold" grpId="0" nodeType="clickEffect">
+                                  <p:stCondLst>
+                                    <p:cond delay="0"/>
+                                  </p:stCondLst>
+                                  <p:childTnLst>
+                                    <p:set>
+                                      <p:cBhvr>
+                                        <p:cTn id="31" dur="1" fill="hold">
+                                          <p:stCondLst>
+                                            <p:cond delay="0"/>
+                                          </p:stCondLst>
+                                        </p:cTn>
+                                        <p:tgtEl>
+                                          <p:spTgt spid="16"/>
+                                        </p:tgtEl>
+                                        <p:attrNameLst>
+                                          <p:attrName>style.visibility</p:attrName>
+                                        </p:attrNameLst>
+                                      </p:cBhvr>
+                                      <p:to>
+                                        <p:strVal val="visible"/>
+                                      </p:to>
+                                    </p:set>
+                                    <p:animEffect transition="in" filter="fade">
+                                      <p:cBhvr>
+                                        <p:cTn id="32" dur="500"/>
+                                        <p:tgtEl>
+                                          <p:spTgt spid="16"/>
+                                        </p:tgtEl>
+                                      </p:cBhvr>
+                                    </p:animEffect>
+                                  </p:childTnLst>
+                                </p:cTn>
+                              </p:par>
+                            </p:childTnLst>
+                          </p:cTn>
+                        </p:par>
+                      </p:childTnLst>
+                    </p:cTn>
+                  </p:par>
+                </p:childTnLst>
+              </p:cTn>
+              <p:prevCondLst>
+                <p:cond evt="onPrev" delay="0">
+                  <p:tgtEl>
+                    <p:sldTgt/>
+                  </p:tgtEl>
+                </p:cond>
+              </p:prevCondLst>
+              <p:nextCondLst>
+                <p:cond evt="onNext" delay="0">
+                  <p:tgtEl>
+                    <p:sldTgt/>
+                  </p:tgtEl>
+                </p:cond>
+              </p:nextCondLst>
+            </p:seq>
+          </p:childTnLst>
+        </p:cTn>
+      </p:par>
+    </p:tnLst>
+    <p:bldLst>
+      <p:bldP spid="10" grpId="0"/>
+      <p:bldP spid="12" grpId="0"/>
+      <p:bldP spid="14" grpId="0"/>
+      <p:bldP spid="15" grpId="0"/>
+      <p:bldP spid="16" grpId="0"/>
+    </p:bldLst>
+  </p:timing>
 </p:sld>
 </file>
 
@@ -9401,6 +10341,13 @@
       </p:transition>
     </mc:Fallback>
   </mc:AlternateContent>
+  <p:timing>
+    <p:tnLst>
+      <p:par>
+        <p:cTn id="1" dur="indefinite" restart="never" nodeType="tmRoot"/>
+      </p:par>
+    </p:tnLst>
+  </p:timing>
 </p:sld>
 </file>
 
@@ -9875,166 +10822,6 @@
           </a:prstGeom>
         </p:spPr>
       </p:pic>
-      <mc:AlternateContent xmlns:mc="http://schemas.openxmlformats.org/markup-compatibility/2006" xmlns:a14="http://schemas.microsoft.com/office/drawing/2010/main">
-        <mc:Choice Requires="a14">
-          <p:sp>
-            <p:nvSpPr>
-              <p:cNvPr id="17" name="TextBox 16">
-                <a:extLst>
-                  <a:ext uri="{FF2B5EF4-FFF2-40B4-BE49-F238E27FC236}">
-                    <a16:creationId xmlns:a16="http://schemas.microsoft.com/office/drawing/2014/main" id="{860DB3A6-D2BC-4D73-8E6E-77137C3BCBCC}"/>
-                  </a:ext>
-                </a:extLst>
-              </p:cNvPr>
-              <p:cNvSpPr txBox="1"/>
-              <p:nvPr/>
-            </p:nvSpPr>
-            <p:spPr>
-              <a:xfrm>
-                <a:off x="10368542" y="235884"/>
-                <a:ext cx="1800200" cy="830997"/>
-              </a:xfrm>
-              <a:prstGeom prst="rect">
-                <a:avLst/>
-              </a:prstGeom>
-              <a:noFill/>
-            </p:spPr>
-            <p:txBody>
-              <a:bodyPr wrap="square" rtlCol="0">
-                <a:spAutoFit/>
-              </a:bodyPr>
-              <a:lstStyle/>
-              <a:p>
-                <a:pPr/>
-                <a14:m>
-                  <m:oMathPara xmlns:m="http://schemas.openxmlformats.org/officeDocument/2006/math">
-                    <m:oMathParaPr>
-                      <m:jc m:val="centerGroup"/>
-                    </m:oMathParaPr>
-                    <m:oMath xmlns:m="http://schemas.openxmlformats.org/officeDocument/2006/math">
-                      <m:r>
-                        <a:rPr lang="en-GB" b="0" i="1" smtClean="0">
-                          <a:latin typeface="Cambria Math" panose="02040503050406030204" pitchFamily="18" charset="0"/>
-                        </a:rPr>
-                        <m:t>𝑁</m:t>
-                      </m:r>
-                      <m:r>
-                        <a:rPr lang="en-GB" b="0" i="1" smtClean="0">
-                          <a:latin typeface="Cambria Math" panose="02040503050406030204" pitchFamily="18" charset="0"/>
-                        </a:rPr>
-                        <m:t>=</m:t>
-                      </m:r>
-                      <m:sSup>
-                        <m:sSupPr>
-                          <m:ctrlPr>
-                            <a:rPr lang="en-GB" b="0" i="1" smtClean="0">
-                              <a:latin typeface="Cambria Math" panose="02040503050406030204" pitchFamily="18" charset="0"/>
-                            </a:rPr>
-                          </m:ctrlPr>
-                        </m:sSupPr>
-                        <m:e>
-                          <m:r>
-                            <a:rPr lang="en-GB" b="0" i="1" smtClean="0">
-                              <a:latin typeface="Cambria Math" panose="02040503050406030204" pitchFamily="18" charset="0"/>
-                            </a:rPr>
-                            <m:t>2</m:t>
-                          </m:r>
-                        </m:e>
-                        <m:sup>
-                          <m:r>
-                            <a:rPr lang="en-GB" b="0" i="1" smtClean="0">
-                              <a:latin typeface="Cambria Math" panose="02040503050406030204" pitchFamily="18" charset="0"/>
-                            </a:rPr>
-                            <m:t>10</m:t>
-                          </m:r>
-                        </m:sup>
-                      </m:sSup>
-                    </m:oMath>
-                  </m:oMathPara>
-                </a14:m>
-                <a:endParaRPr lang="en-GB" b="0" i="1" dirty="0">
-                  <a:latin typeface="Cambria Math" panose="02040503050406030204" pitchFamily="18" charset="0"/>
-                </a:endParaRPr>
-              </a:p>
-              <a:p>
-                <a:pPr/>
-                <a14:m>
-                  <m:oMathPara xmlns:m="http://schemas.openxmlformats.org/officeDocument/2006/math">
-                    <m:oMathParaPr>
-                      <m:jc m:val="centerGroup"/>
-                    </m:oMathParaPr>
-                    <m:oMath xmlns:m="http://schemas.openxmlformats.org/officeDocument/2006/math">
-                      <m:r>
-                        <a:rPr lang="en-GB" b="0" i="1" smtClean="0">
-                          <a:latin typeface="Cambria Math" panose="02040503050406030204" pitchFamily="18" charset="0"/>
-                        </a:rPr>
-                        <m:t> </m:t>
-                      </m:r>
-                      <m:r>
-                        <a:rPr lang="en-GB" b="0" i="1" smtClean="0">
-                          <a:latin typeface="Cambria Math" panose="02040503050406030204" pitchFamily="18" charset="0"/>
-                        </a:rPr>
-                        <m:t>𝑇</m:t>
-                      </m:r>
-                      <m:r>
-                        <a:rPr lang="en-GB" b="0" i="1" smtClean="0">
-                          <a:latin typeface="Cambria Math" panose="02040503050406030204" pitchFamily="18" charset="0"/>
-                        </a:rPr>
-                        <m:t>=100</m:t>
-                      </m:r>
-                    </m:oMath>
-                  </m:oMathPara>
-                </a14:m>
-                <a:endParaRPr lang="en-GB" dirty="0"/>
-              </a:p>
-            </p:txBody>
-          </p:sp>
-        </mc:Choice>
-        <mc:Fallback xmlns="">
-          <p:sp>
-            <p:nvSpPr>
-              <p:cNvPr id="17" name="TextBox 16">
-                <a:extLst>
-                  <a:ext uri="{FF2B5EF4-FFF2-40B4-BE49-F238E27FC236}">
-                    <a16:creationId xmlns:a16="http://schemas.microsoft.com/office/drawing/2014/main" id="{860DB3A6-D2BC-4D73-8E6E-77137C3BCBCC}"/>
-                  </a:ext>
-                </a:extLst>
-              </p:cNvPr>
-              <p:cNvSpPr txBox="1">
-                <a:spLocks noRot="1" noChangeAspect="1" noMove="1" noResize="1" noEditPoints="1" noAdjustHandles="1" noChangeArrowheads="1" noChangeShapeType="1" noTextEdit="1"/>
-              </p:cNvSpPr>
-              <p:nvPr/>
-            </p:nvSpPr>
-            <p:spPr>
-              <a:xfrm>
-                <a:off x="10368542" y="235884"/>
-                <a:ext cx="1800200" cy="830997"/>
-              </a:xfrm>
-              <a:prstGeom prst="rect">
-                <a:avLst/>
-              </a:prstGeom>
-              <a:blipFill>
-                <a:blip r:embed="rId5"/>
-                <a:stretch>
-                  <a:fillRect/>
-                </a:stretch>
-              </a:blipFill>
-            </p:spPr>
-            <p:txBody>
-              <a:bodyPr/>
-              <a:lstStyle/>
-              <a:p>
-                <a:r>
-                  <a:rPr lang="en-GB">
-                    <a:noFill/>
-                  </a:rPr>
-                  <a:t> </a:t>
-                </a:r>
-              </a:p>
-            </p:txBody>
-          </p:sp>
-        </mc:Fallback>
-      </mc:AlternateContent>
     </p:spTree>
     <p:extLst>
       <p:ext uri="{BB962C8B-B14F-4D97-AF65-F5344CB8AC3E}">
@@ -10057,6 +10844,254 @@
       </p:transition>
     </mc:Fallback>
   </mc:AlternateContent>
+  <p:timing>
+    <p:tnLst>
+      <p:par>
+        <p:cTn id="1" dur="indefinite" restart="never" nodeType="tmRoot">
+          <p:childTnLst>
+            <p:seq concurrent="1" nextAc="seek">
+              <p:cTn id="2" dur="indefinite" nodeType="mainSeq">
+                <p:childTnLst>
+                  <p:par>
+                    <p:cTn id="3" fill="hold">
+                      <p:stCondLst>
+                        <p:cond delay="indefinite"/>
+                      </p:stCondLst>
+                      <p:childTnLst>
+                        <p:par>
+                          <p:cTn id="4" fill="hold">
+                            <p:stCondLst>
+                              <p:cond delay="0"/>
+                            </p:stCondLst>
+                            <p:childTnLst>
+                              <p:par>
+                                <p:cTn id="5" presetID="10" presetClass="entr" presetSubtype="0" fill="hold" grpId="0" nodeType="clickEffect">
+                                  <p:stCondLst>
+                                    <p:cond delay="0"/>
+                                  </p:stCondLst>
+                                  <p:childTnLst>
+                                    <p:set>
+                                      <p:cBhvr>
+                                        <p:cTn id="6" dur="1" fill="hold">
+                                          <p:stCondLst>
+                                            <p:cond delay="0"/>
+                                          </p:stCondLst>
+                                        </p:cTn>
+                                        <p:tgtEl>
+                                          <p:spTgt spid="12"/>
+                                        </p:tgtEl>
+                                        <p:attrNameLst>
+                                          <p:attrName>style.visibility</p:attrName>
+                                        </p:attrNameLst>
+                                      </p:cBhvr>
+                                      <p:to>
+                                        <p:strVal val="visible"/>
+                                      </p:to>
+                                    </p:set>
+                                    <p:animEffect transition="in" filter="fade">
+                                      <p:cBhvr>
+                                        <p:cTn id="7" dur="500"/>
+                                        <p:tgtEl>
+                                          <p:spTgt spid="12"/>
+                                        </p:tgtEl>
+                                      </p:cBhvr>
+                                    </p:animEffect>
+                                  </p:childTnLst>
+                                </p:cTn>
+                              </p:par>
+                            </p:childTnLst>
+                          </p:cTn>
+                        </p:par>
+                      </p:childTnLst>
+                    </p:cTn>
+                  </p:par>
+                  <p:par>
+                    <p:cTn id="8" fill="hold">
+                      <p:stCondLst>
+                        <p:cond delay="indefinite"/>
+                      </p:stCondLst>
+                      <p:childTnLst>
+                        <p:par>
+                          <p:cTn id="9" fill="hold">
+                            <p:stCondLst>
+                              <p:cond delay="0"/>
+                            </p:stCondLst>
+                            <p:childTnLst>
+                              <p:par>
+                                <p:cTn id="10" presetID="10" presetClass="entr" presetSubtype="0" fill="hold" grpId="0" nodeType="clickEffect">
+                                  <p:stCondLst>
+                                    <p:cond delay="0"/>
+                                  </p:stCondLst>
+                                  <p:childTnLst>
+                                    <p:set>
+                                      <p:cBhvr>
+                                        <p:cTn id="11" dur="1" fill="hold">
+                                          <p:stCondLst>
+                                            <p:cond delay="0"/>
+                                          </p:stCondLst>
+                                        </p:cTn>
+                                        <p:tgtEl>
+                                          <p:spTgt spid="14"/>
+                                        </p:tgtEl>
+                                        <p:attrNameLst>
+                                          <p:attrName>style.visibility</p:attrName>
+                                        </p:attrNameLst>
+                                      </p:cBhvr>
+                                      <p:to>
+                                        <p:strVal val="visible"/>
+                                      </p:to>
+                                    </p:set>
+                                    <p:animEffect transition="in" filter="fade">
+                                      <p:cBhvr>
+                                        <p:cTn id="12" dur="500"/>
+                                        <p:tgtEl>
+                                          <p:spTgt spid="14"/>
+                                        </p:tgtEl>
+                                      </p:cBhvr>
+                                    </p:animEffect>
+                                  </p:childTnLst>
+                                </p:cTn>
+                              </p:par>
+                            </p:childTnLst>
+                          </p:cTn>
+                        </p:par>
+                      </p:childTnLst>
+                    </p:cTn>
+                  </p:par>
+                  <p:par>
+                    <p:cTn id="13" fill="hold">
+                      <p:stCondLst>
+                        <p:cond delay="indefinite"/>
+                      </p:stCondLst>
+                      <p:childTnLst>
+                        <p:par>
+                          <p:cTn id="14" fill="hold">
+                            <p:stCondLst>
+                              <p:cond delay="0"/>
+                            </p:stCondLst>
+                            <p:childTnLst>
+                              <p:par>
+                                <p:cTn id="15" presetID="10" presetClass="entr" presetSubtype="0" fill="hold" grpId="0" nodeType="clickEffect">
+                                  <p:stCondLst>
+                                    <p:cond delay="0"/>
+                                  </p:stCondLst>
+                                  <p:childTnLst>
+                                    <p:set>
+                                      <p:cBhvr>
+                                        <p:cTn id="16" dur="1" fill="hold">
+                                          <p:stCondLst>
+                                            <p:cond delay="0"/>
+                                          </p:stCondLst>
+                                        </p:cTn>
+                                        <p:tgtEl>
+                                          <p:spTgt spid="15"/>
+                                        </p:tgtEl>
+                                        <p:attrNameLst>
+                                          <p:attrName>style.visibility</p:attrName>
+                                        </p:attrNameLst>
+                                      </p:cBhvr>
+                                      <p:to>
+                                        <p:strVal val="visible"/>
+                                      </p:to>
+                                    </p:set>
+                                    <p:animEffect transition="in" filter="fade">
+                                      <p:cBhvr>
+                                        <p:cTn id="17" dur="500"/>
+                                        <p:tgtEl>
+                                          <p:spTgt spid="15"/>
+                                        </p:tgtEl>
+                                      </p:cBhvr>
+                                    </p:animEffect>
+                                  </p:childTnLst>
+                                </p:cTn>
+                              </p:par>
+                            </p:childTnLst>
+                          </p:cTn>
+                        </p:par>
+                      </p:childTnLst>
+                    </p:cTn>
+                  </p:par>
+                  <p:par>
+                    <p:cTn id="18" fill="hold">
+                      <p:stCondLst>
+                        <p:cond delay="indefinite"/>
+                      </p:stCondLst>
+                      <p:childTnLst>
+                        <p:par>
+                          <p:cTn id="19" fill="hold">
+                            <p:stCondLst>
+                              <p:cond delay="0"/>
+                            </p:stCondLst>
+                            <p:childTnLst>
+                              <p:par>
+                                <p:cTn id="20" presetID="10" presetClass="entr" presetSubtype="0" fill="hold" grpId="0" nodeType="clickEffect">
+                                  <p:stCondLst>
+                                    <p:cond delay="0"/>
+                                  </p:stCondLst>
+                                  <p:childTnLst>
+                                    <p:set>
+                                      <p:cBhvr>
+                                        <p:cTn id="21" dur="1" fill="hold">
+                                          <p:stCondLst>
+                                            <p:cond delay="0"/>
+                                          </p:stCondLst>
+                                        </p:cTn>
+                                        <p:tgtEl>
+                                          <p:spTgt spid="16"/>
+                                        </p:tgtEl>
+                                        <p:attrNameLst>
+                                          <p:attrName>style.visibility</p:attrName>
+                                        </p:attrNameLst>
+                                      </p:cBhvr>
+                                      <p:to>
+                                        <p:strVal val="visible"/>
+                                      </p:to>
+                                    </p:set>
+                                    <p:animEffect transition="in" filter="fade">
+                                      <p:cBhvr>
+                                        <p:cTn id="22" dur="500"/>
+                                        <p:tgtEl>
+                                          <p:spTgt spid="16"/>
+                                        </p:tgtEl>
+                                      </p:cBhvr>
+                                    </p:animEffect>
+                                  </p:childTnLst>
+                                </p:cTn>
+                              </p:par>
+                            </p:childTnLst>
+                          </p:cTn>
+                        </p:par>
+                      </p:childTnLst>
+                    </p:cTn>
+                  </p:par>
+                </p:childTnLst>
+              </p:cTn>
+              <p:prevCondLst>
+                <p:cond evt="onPrev" delay="0">
+                  <p:tgtEl>
+                    <p:sldTgt/>
+                  </p:tgtEl>
+                </p:cond>
+              </p:prevCondLst>
+              <p:nextCondLst>
+                <p:cond evt="onNext" delay="0">
+                  <p:tgtEl>
+                    <p:sldTgt/>
+                  </p:tgtEl>
+                </p:cond>
+              </p:nextCondLst>
+            </p:seq>
+          </p:childTnLst>
+        </p:cTn>
+      </p:par>
+    </p:tnLst>
+    <p:bldLst>
+      <p:bldP spid="12" grpId="0"/>
+      <p:bldP spid="14" grpId="0"/>
+      <p:bldP spid="15" grpId="0"/>
+      <p:bldP spid="16" grpId="0"/>
+    </p:bldLst>
+  </p:timing>
 </p:sld>
 </file>
 
@@ -10170,6 +11205,13 @@
       </p:transition>
     </mc:Fallback>
   </mc:AlternateContent>
+  <p:timing>
+    <p:tnLst>
+      <p:par>
+        <p:cTn id="1" dur="indefinite" restart="never" nodeType="tmRoot"/>
+      </p:par>
+    </p:tnLst>
+  </p:timing>
 </p:sld>
 </file>
 
@@ -10247,6 +11289,13 @@
       </p:transition>
     </mc:Fallback>
   </mc:AlternateContent>
+  <p:timing>
+    <p:tnLst>
+      <p:par>
+        <p:cTn id="1" dur="indefinite" restart="never" nodeType="tmRoot"/>
+      </p:par>
+    </p:tnLst>
+  </p:timing>
 </p:sld>
 </file>
 
@@ -11201,139 +12250,12 @@
 </file>
 
 <file path=customXml/item1.xml><?xml version="1.0" encoding="utf-8"?>
-<p:properties xmlns:p="http://schemas.microsoft.com/office/2006/metadata/properties" xmlns:xsi="http://www.w3.org/2001/XMLSchema-instance" xmlns:pc="http://schemas.microsoft.com/office/infopath/2007/PartnerControls">
-  <documentManagement>
-    <LocPublishedLinkedAssetsLookup xmlns="4873beb7-5857-4685-be1f-d57550cc96cc" xsi:nil="true"/>
-    <ApprovalStatus xmlns="4873beb7-5857-4685-be1f-d57550cc96cc">InProgress</ApprovalStatus>
-    <MarketSpecific xmlns="4873beb7-5857-4685-be1f-d57550cc96cc">false</MarketSpecific>
-    <LocComments xmlns="4873beb7-5857-4685-be1f-d57550cc96cc" xsi:nil="true"/>
-    <LocLastLocAttemptVersionTypeLookup xmlns="4873beb7-5857-4685-be1f-d57550cc96cc" xsi:nil="true"/>
-    <DirectSourceMarket xmlns="4873beb7-5857-4685-be1f-d57550cc96cc" xsi:nil="true"/>
-    <ThumbnailAssetId xmlns="4873beb7-5857-4685-be1f-d57550cc96cc" xsi:nil="true"/>
-    <PrimaryImageGen xmlns="4873beb7-5857-4685-be1f-d57550cc96cc">false</PrimaryImageGen>
-    <LocNewPublishedVersionLookup xmlns="4873beb7-5857-4685-be1f-d57550cc96cc" xsi:nil="true"/>
-    <LegacyData xmlns="4873beb7-5857-4685-be1f-d57550cc96cc" xsi:nil="true"/>
-    <LocRecommendedHandoff xmlns="4873beb7-5857-4685-be1f-d57550cc96cc" xsi:nil="true"/>
-    <BusinessGroup xmlns="4873beb7-5857-4685-be1f-d57550cc96cc" xsi:nil="true"/>
-    <BlockPublish xmlns="4873beb7-5857-4685-be1f-d57550cc96cc">false</BlockPublish>
-    <TPFriendlyName xmlns="4873beb7-5857-4685-be1f-d57550cc96cc" xsi:nil="true"/>
-    <LocOverallPublishStatusLookup xmlns="4873beb7-5857-4685-be1f-d57550cc96cc" xsi:nil="true"/>
-    <NumericId xmlns="4873beb7-5857-4685-be1f-d57550cc96cc" xsi:nil="true"/>
-    <APEditor xmlns="4873beb7-5857-4685-be1f-d57550cc96cc">
-      <UserInfo>
-        <DisplayName/>
-        <AccountId xsi:nil="true"/>
-        <AccountType/>
-      </UserInfo>
-    </APEditor>
-    <SourceTitle xmlns="4873beb7-5857-4685-be1f-d57550cc96cc" xsi:nil="true"/>
-    <OpenTemplate xmlns="4873beb7-5857-4685-be1f-d57550cc96cc">true</OpenTemplate>
-    <LocOverallLocStatusLookup xmlns="4873beb7-5857-4685-be1f-d57550cc96cc" xsi:nil="true"/>
-    <UALocComments xmlns="4873beb7-5857-4685-be1f-d57550cc96cc" xsi:nil="true"/>
-    <ParentAssetId xmlns="4873beb7-5857-4685-be1f-d57550cc96cc" xsi:nil="true"/>
-    <IntlLangReviewDate xmlns="4873beb7-5857-4685-be1f-d57550cc96cc" xsi:nil="true"/>
-    <FeatureTagsTaxHTField0 xmlns="4873beb7-5857-4685-be1f-d57550cc96cc">
-      <Terms xmlns="http://schemas.microsoft.com/office/infopath/2007/PartnerControls"/>
-    </FeatureTagsTaxHTField0>
-    <PublishStatusLookup xmlns="4873beb7-5857-4685-be1f-d57550cc96cc">
-      <Value>1345093</Value>
-    </PublishStatusLookup>
-    <Providers xmlns="4873beb7-5857-4685-be1f-d57550cc96cc" xsi:nil="true"/>
-    <MachineTranslated xmlns="4873beb7-5857-4685-be1f-d57550cc96cc">false</MachineTranslated>
-    <OriginalSourceMarket xmlns="4873beb7-5857-4685-be1f-d57550cc96cc" xsi:nil="true"/>
-    <APDescription xmlns="4873beb7-5857-4685-be1f-d57550cc96cc">This simple template design works for technology and  businesses, but it's versatile enough to use in other contexts.  It features multiple slide layouts designed for widescreen (16x9 resolution) and includes a sample SmartArt list and chart that are easily editable.</APDescription>
-    <ClipArtFilename xmlns="4873beb7-5857-4685-be1f-d57550cc96cc" xsi:nil="true"/>
-    <ContentItem xmlns="4873beb7-5857-4685-be1f-d57550cc96cc" xsi:nil="true"/>
-    <TPInstallLocation xmlns="4873beb7-5857-4685-be1f-d57550cc96cc" xsi:nil="true"/>
-    <PublishTargets xmlns="4873beb7-5857-4685-be1f-d57550cc96cc">OfficeOnlineVNext</PublishTargets>
-    <TimesCloned xmlns="4873beb7-5857-4685-be1f-d57550cc96cc" xsi:nil="true"/>
-    <AssetStart xmlns="4873beb7-5857-4685-be1f-d57550cc96cc">2011-11-26T00:30:00+00:00</AssetStart>
-    <Provider xmlns="4873beb7-5857-4685-be1f-d57550cc96cc" xsi:nil="true"/>
-    <AcquiredFrom xmlns="4873beb7-5857-4685-be1f-d57550cc96cc">Internal MS</AcquiredFrom>
-    <FriendlyTitle xmlns="4873beb7-5857-4685-be1f-d57550cc96cc" xsi:nil="true"/>
-    <LastHandOff xmlns="4873beb7-5857-4685-be1f-d57550cc96cc" xsi:nil="true"/>
-    <TPClientViewer xmlns="4873beb7-5857-4685-be1f-d57550cc96cc" xsi:nil="true"/>
-    <TemplateStatus xmlns="4873beb7-5857-4685-be1f-d57550cc96cc">Complete</TemplateStatus>
-    <Downloads xmlns="4873beb7-5857-4685-be1f-d57550cc96cc">0</Downloads>
-    <OOCacheId xmlns="4873beb7-5857-4685-be1f-d57550cc96cc" xsi:nil="true"/>
-    <IsDeleted xmlns="4873beb7-5857-4685-be1f-d57550cc96cc">false</IsDeleted>
-    <LocPublishedDependentAssetsLookup xmlns="4873beb7-5857-4685-be1f-d57550cc96cc" xsi:nil="true"/>
-    <TPExecutable xmlns="4873beb7-5857-4685-be1f-d57550cc96cc" xsi:nil="true"/>
-    <EditorialTags xmlns="4873beb7-5857-4685-be1f-d57550cc96cc" xsi:nil="true"/>
-    <SubmitterId xmlns="4873beb7-5857-4685-be1f-d57550cc96cc" xsi:nil="true"/>
-    <ApprovalLog xmlns="4873beb7-5857-4685-be1f-d57550cc96cc" xsi:nil="true"/>
-    <AssetType xmlns="4873beb7-5857-4685-be1f-d57550cc96cc">TP</AssetType>
-    <BugNumber xmlns="4873beb7-5857-4685-be1f-d57550cc96cc" xsi:nil="true"/>
-    <CSXSubmissionDate xmlns="4873beb7-5857-4685-be1f-d57550cc96cc" xsi:nil="true"/>
-    <CSXUpdate xmlns="4873beb7-5857-4685-be1f-d57550cc96cc">false</CSXUpdate>
-    <Milestone xmlns="4873beb7-5857-4685-be1f-d57550cc96cc" xsi:nil="true"/>
-    <RecommendationsModifier xmlns="4873beb7-5857-4685-be1f-d57550cc96cc" xsi:nil="true"/>
-    <OriginAsset xmlns="4873beb7-5857-4685-be1f-d57550cc96cc" xsi:nil="true"/>
-    <TPComponent xmlns="4873beb7-5857-4685-be1f-d57550cc96cc" xsi:nil="true"/>
-    <AssetId xmlns="4873beb7-5857-4685-be1f-d57550cc96cc">TP102787989</AssetId>
-    <IntlLocPriority xmlns="4873beb7-5857-4685-be1f-d57550cc96cc" xsi:nil="true"/>
-    <PolicheckWords xmlns="4873beb7-5857-4685-be1f-d57550cc96cc" xsi:nil="true"/>
-    <TPLaunchHelpLink xmlns="4873beb7-5857-4685-be1f-d57550cc96cc" xsi:nil="true"/>
-    <TPApplication xmlns="4873beb7-5857-4685-be1f-d57550cc96cc" xsi:nil="true"/>
-    <CrawlForDependencies xmlns="4873beb7-5857-4685-be1f-d57550cc96cc">false</CrawlForDependencies>
-    <HandoffToMSDN xmlns="4873beb7-5857-4685-be1f-d57550cc96cc" xsi:nil="true"/>
-    <PlannedPubDate xmlns="4873beb7-5857-4685-be1f-d57550cc96cc" xsi:nil="true"/>
-    <IntlLangReviewer xmlns="4873beb7-5857-4685-be1f-d57550cc96cc" xsi:nil="true"/>
-    <TrustLevel xmlns="4873beb7-5857-4685-be1f-d57550cc96cc">1 Microsoft Managed Content</TrustLevel>
-    <LocLastLocAttemptVersionLookup xmlns="4873beb7-5857-4685-be1f-d57550cc96cc">694266</LocLastLocAttemptVersionLookup>
-    <LocProcessedForHandoffsLookup xmlns="4873beb7-5857-4685-be1f-d57550cc96cc" xsi:nil="true"/>
-    <IsSearchable xmlns="4873beb7-5857-4685-be1f-d57550cc96cc">true</IsSearchable>
-    <TemplateTemplateType xmlns="4873beb7-5857-4685-be1f-d57550cc96cc">PowerPoint Presentation Template</TemplateTemplateType>
-    <CampaignTagsTaxHTField0 xmlns="4873beb7-5857-4685-be1f-d57550cc96cc">
-      <Terms xmlns="http://schemas.microsoft.com/office/infopath/2007/PartnerControls"/>
-    </CampaignTagsTaxHTField0>
-    <TPNamespace xmlns="4873beb7-5857-4685-be1f-d57550cc96cc" xsi:nil="true"/>
-    <LocOverallPreviewStatusLookup xmlns="4873beb7-5857-4685-be1f-d57550cc96cc" xsi:nil="true"/>
-    <TaxCatchAll xmlns="4873beb7-5857-4685-be1f-d57550cc96cc"/>
-    <Markets xmlns="4873beb7-5857-4685-be1f-d57550cc96cc"/>
-    <UAProjectedTotalWords xmlns="4873beb7-5857-4685-be1f-d57550cc96cc" xsi:nil="true"/>
-    <IntlLangReview xmlns="4873beb7-5857-4685-be1f-d57550cc96cc" xsi:nil="true"/>
-    <OutputCachingOn xmlns="4873beb7-5857-4685-be1f-d57550cc96cc">false</OutputCachingOn>
-    <AverageRating xmlns="4873beb7-5857-4685-be1f-d57550cc96cc" xsi:nil="true"/>
-    <APAuthor xmlns="4873beb7-5857-4685-be1f-d57550cc96cc">
-      <UserInfo>
-        <DisplayName>REDMOND\kristaa</DisplayName>
-        <AccountId>136</AccountId>
-        <AccountType/>
-      </UserInfo>
-    </APAuthor>
-    <LocManualTestRequired xmlns="4873beb7-5857-4685-be1f-d57550cc96cc">false</LocManualTestRequired>
-    <TPCommandLine xmlns="4873beb7-5857-4685-be1f-d57550cc96cc" xsi:nil="true"/>
-    <TPAppVersion xmlns="4873beb7-5857-4685-be1f-d57550cc96cc" xsi:nil="true"/>
-    <EditorialStatus xmlns="4873beb7-5857-4685-be1f-d57550cc96cc">Complete</EditorialStatus>
-    <LastModifiedDateTime xmlns="4873beb7-5857-4685-be1f-d57550cc96cc" xsi:nil="true"/>
-    <ScenarioTagsTaxHTField0 xmlns="4873beb7-5857-4685-be1f-d57550cc96cc">
-      <Terms xmlns="http://schemas.microsoft.com/office/infopath/2007/PartnerControls"/>
-    </ScenarioTagsTaxHTField0>
-    <LocProcessedForMarketsLookup xmlns="4873beb7-5857-4685-be1f-d57550cc96cc" xsi:nil="true"/>
-    <TPLaunchHelpLinkType xmlns="4873beb7-5857-4685-be1f-d57550cc96cc">Template</TPLaunchHelpLinkType>
-    <OriginalRelease xmlns="4873beb7-5857-4685-be1f-d57550cc96cc">15</OriginalRelease>
-    <LocalizationTagsTaxHTField0 xmlns="4873beb7-5857-4685-be1f-d57550cc96cc">
-      <Terms xmlns="http://schemas.microsoft.com/office/infopath/2007/PartnerControls"/>
-    </LocalizationTagsTaxHTField0>
-    <UACurrentWords xmlns="4873beb7-5857-4685-be1f-d57550cc96cc" xsi:nil="true"/>
-    <ArtSampleDocs xmlns="4873beb7-5857-4685-be1f-d57550cc96cc" xsi:nil="true"/>
-    <UALocRecommendation xmlns="4873beb7-5857-4685-be1f-d57550cc96cc">Localize</UALocRecommendation>
-    <Manager xmlns="4873beb7-5857-4685-be1f-d57550cc96cc" xsi:nil="true"/>
-    <LocOverallHandbackStatusLookup xmlns="4873beb7-5857-4685-be1f-d57550cc96cc" xsi:nil="true"/>
-    <ShowIn xmlns="4873beb7-5857-4685-be1f-d57550cc96cc">Show everywhere</ShowIn>
-    <UANotes xmlns="4873beb7-5857-4685-be1f-d57550cc96cc" xsi:nil="true"/>
-    <InternalTagsTaxHTField0 xmlns="4873beb7-5857-4685-be1f-d57550cc96cc">
-      <Terms xmlns="http://schemas.microsoft.com/office/infopath/2007/PartnerControls"/>
-    </InternalTagsTaxHTField0>
-    <CSXHash xmlns="4873beb7-5857-4685-be1f-d57550cc96cc" xsi:nil="true"/>
-    <VoteCount xmlns="4873beb7-5857-4685-be1f-d57550cc96cc" xsi:nil="true"/>
-    <AssetExpire xmlns="4873beb7-5857-4685-be1f-d57550cc96cc">2029-05-12T07:00:00+00:00</AssetExpire>
-    <DSATActionTaken xmlns="4873beb7-5857-4685-be1f-d57550cc96cc" xsi:nil="true"/>
-    <CSXSubmissionMarket xmlns="4873beb7-5857-4685-be1f-d57550cc96cc" xsi:nil="true"/>
-    <LocMarketGroupTiers2 xmlns="4873beb7-5857-4685-be1f-d57550cc96cc" xsi:nil="true"/>
-  </documentManagement>
-</p:properties>
+<?mso-contentType ?>
+<FormTemplates xmlns="http://schemas.microsoft.com/sharepoint/v3/contenttype/forms">
+  <Display>DocumentLibraryForm</Display>
+  <Edit>AssetEditForm</Edit>
+  <New>DocumentLibraryForm</New>
+</FormTemplates>
 </file>
 
 <file path=customXml/item2.xml><?xml version="1.0" encoding="utf-8"?>
@@ -12377,26 +13299,145 @@
 </file>
 
 <file path=customXml/item3.xml><?xml version="1.0" encoding="utf-8"?>
-<?mso-contentType ?>
-<FormTemplates xmlns="http://schemas.microsoft.com/sharepoint/v3/contenttype/forms">
-  <Display>DocumentLibraryForm</Display>
-  <Edit>AssetEditForm</Edit>
-  <New>DocumentLibraryForm</New>
-</FormTemplates>
+<p:properties xmlns:p="http://schemas.microsoft.com/office/2006/metadata/properties" xmlns:xsi="http://www.w3.org/2001/XMLSchema-instance" xmlns:pc="http://schemas.microsoft.com/office/infopath/2007/PartnerControls">
+  <documentManagement>
+    <LocPublishedLinkedAssetsLookup xmlns="4873beb7-5857-4685-be1f-d57550cc96cc" xsi:nil="true"/>
+    <ApprovalStatus xmlns="4873beb7-5857-4685-be1f-d57550cc96cc">InProgress</ApprovalStatus>
+    <MarketSpecific xmlns="4873beb7-5857-4685-be1f-d57550cc96cc">false</MarketSpecific>
+    <LocComments xmlns="4873beb7-5857-4685-be1f-d57550cc96cc" xsi:nil="true"/>
+    <LocLastLocAttemptVersionTypeLookup xmlns="4873beb7-5857-4685-be1f-d57550cc96cc" xsi:nil="true"/>
+    <DirectSourceMarket xmlns="4873beb7-5857-4685-be1f-d57550cc96cc" xsi:nil="true"/>
+    <ThumbnailAssetId xmlns="4873beb7-5857-4685-be1f-d57550cc96cc" xsi:nil="true"/>
+    <PrimaryImageGen xmlns="4873beb7-5857-4685-be1f-d57550cc96cc">false</PrimaryImageGen>
+    <LocNewPublishedVersionLookup xmlns="4873beb7-5857-4685-be1f-d57550cc96cc" xsi:nil="true"/>
+    <LegacyData xmlns="4873beb7-5857-4685-be1f-d57550cc96cc" xsi:nil="true"/>
+    <LocRecommendedHandoff xmlns="4873beb7-5857-4685-be1f-d57550cc96cc" xsi:nil="true"/>
+    <BusinessGroup xmlns="4873beb7-5857-4685-be1f-d57550cc96cc" xsi:nil="true"/>
+    <BlockPublish xmlns="4873beb7-5857-4685-be1f-d57550cc96cc">false</BlockPublish>
+    <TPFriendlyName xmlns="4873beb7-5857-4685-be1f-d57550cc96cc" xsi:nil="true"/>
+    <LocOverallPublishStatusLookup xmlns="4873beb7-5857-4685-be1f-d57550cc96cc" xsi:nil="true"/>
+    <NumericId xmlns="4873beb7-5857-4685-be1f-d57550cc96cc" xsi:nil="true"/>
+    <APEditor xmlns="4873beb7-5857-4685-be1f-d57550cc96cc">
+      <UserInfo>
+        <DisplayName/>
+        <AccountId xsi:nil="true"/>
+        <AccountType/>
+      </UserInfo>
+    </APEditor>
+    <SourceTitle xmlns="4873beb7-5857-4685-be1f-d57550cc96cc" xsi:nil="true"/>
+    <OpenTemplate xmlns="4873beb7-5857-4685-be1f-d57550cc96cc">true</OpenTemplate>
+    <LocOverallLocStatusLookup xmlns="4873beb7-5857-4685-be1f-d57550cc96cc" xsi:nil="true"/>
+    <UALocComments xmlns="4873beb7-5857-4685-be1f-d57550cc96cc" xsi:nil="true"/>
+    <ParentAssetId xmlns="4873beb7-5857-4685-be1f-d57550cc96cc" xsi:nil="true"/>
+    <IntlLangReviewDate xmlns="4873beb7-5857-4685-be1f-d57550cc96cc" xsi:nil="true"/>
+    <FeatureTagsTaxHTField0 xmlns="4873beb7-5857-4685-be1f-d57550cc96cc">
+      <Terms xmlns="http://schemas.microsoft.com/office/infopath/2007/PartnerControls"/>
+    </FeatureTagsTaxHTField0>
+    <PublishStatusLookup xmlns="4873beb7-5857-4685-be1f-d57550cc96cc">
+      <Value>1345093</Value>
+    </PublishStatusLookup>
+    <Providers xmlns="4873beb7-5857-4685-be1f-d57550cc96cc" xsi:nil="true"/>
+    <MachineTranslated xmlns="4873beb7-5857-4685-be1f-d57550cc96cc">false</MachineTranslated>
+    <OriginalSourceMarket xmlns="4873beb7-5857-4685-be1f-d57550cc96cc" xsi:nil="true"/>
+    <APDescription xmlns="4873beb7-5857-4685-be1f-d57550cc96cc">This simple template design works for technology and  businesses, but it's versatile enough to use in other contexts.  It features multiple slide layouts designed for widescreen (16x9 resolution) and includes a sample SmartArt list and chart that are easily editable.</APDescription>
+    <ClipArtFilename xmlns="4873beb7-5857-4685-be1f-d57550cc96cc" xsi:nil="true"/>
+    <ContentItem xmlns="4873beb7-5857-4685-be1f-d57550cc96cc" xsi:nil="true"/>
+    <TPInstallLocation xmlns="4873beb7-5857-4685-be1f-d57550cc96cc" xsi:nil="true"/>
+    <PublishTargets xmlns="4873beb7-5857-4685-be1f-d57550cc96cc">OfficeOnlineVNext</PublishTargets>
+    <TimesCloned xmlns="4873beb7-5857-4685-be1f-d57550cc96cc" xsi:nil="true"/>
+    <AssetStart xmlns="4873beb7-5857-4685-be1f-d57550cc96cc">2011-11-26T00:30:00+00:00</AssetStart>
+    <Provider xmlns="4873beb7-5857-4685-be1f-d57550cc96cc" xsi:nil="true"/>
+    <AcquiredFrom xmlns="4873beb7-5857-4685-be1f-d57550cc96cc">Internal MS</AcquiredFrom>
+    <FriendlyTitle xmlns="4873beb7-5857-4685-be1f-d57550cc96cc" xsi:nil="true"/>
+    <LastHandOff xmlns="4873beb7-5857-4685-be1f-d57550cc96cc" xsi:nil="true"/>
+    <TPClientViewer xmlns="4873beb7-5857-4685-be1f-d57550cc96cc" xsi:nil="true"/>
+    <TemplateStatus xmlns="4873beb7-5857-4685-be1f-d57550cc96cc">Complete</TemplateStatus>
+    <Downloads xmlns="4873beb7-5857-4685-be1f-d57550cc96cc">0</Downloads>
+    <OOCacheId xmlns="4873beb7-5857-4685-be1f-d57550cc96cc" xsi:nil="true"/>
+    <IsDeleted xmlns="4873beb7-5857-4685-be1f-d57550cc96cc">false</IsDeleted>
+    <LocPublishedDependentAssetsLookup xmlns="4873beb7-5857-4685-be1f-d57550cc96cc" xsi:nil="true"/>
+    <TPExecutable xmlns="4873beb7-5857-4685-be1f-d57550cc96cc" xsi:nil="true"/>
+    <EditorialTags xmlns="4873beb7-5857-4685-be1f-d57550cc96cc" xsi:nil="true"/>
+    <SubmitterId xmlns="4873beb7-5857-4685-be1f-d57550cc96cc" xsi:nil="true"/>
+    <ApprovalLog xmlns="4873beb7-5857-4685-be1f-d57550cc96cc" xsi:nil="true"/>
+    <AssetType xmlns="4873beb7-5857-4685-be1f-d57550cc96cc">TP</AssetType>
+    <BugNumber xmlns="4873beb7-5857-4685-be1f-d57550cc96cc" xsi:nil="true"/>
+    <CSXSubmissionDate xmlns="4873beb7-5857-4685-be1f-d57550cc96cc" xsi:nil="true"/>
+    <CSXUpdate xmlns="4873beb7-5857-4685-be1f-d57550cc96cc">false</CSXUpdate>
+    <Milestone xmlns="4873beb7-5857-4685-be1f-d57550cc96cc" xsi:nil="true"/>
+    <RecommendationsModifier xmlns="4873beb7-5857-4685-be1f-d57550cc96cc" xsi:nil="true"/>
+    <OriginAsset xmlns="4873beb7-5857-4685-be1f-d57550cc96cc" xsi:nil="true"/>
+    <TPComponent xmlns="4873beb7-5857-4685-be1f-d57550cc96cc" xsi:nil="true"/>
+    <AssetId xmlns="4873beb7-5857-4685-be1f-d57550cc96cc">TP102787989</AssetId>
+    <IntlLocPriority xmlns="4873beb7-5857-4685-be1f-d57550cc96cc" xsi:nil="true"/>
+    <PolicheckWords xmlns="4873beb7-5857-4685-be1f-d57550cc96cc" xsi:nil="true"/>
+    <TPLaunchHelpLink xmlns="4873beb7-5857-4685-be1f-d57550cc96cc" xsi:nil="true"/>
+    <TPApplication xmlns="4873beb7-5857-4685-be1f-d57550cc96cc" xsi:nil="true"/>
+    <CrawlForDependencies xmlns="4873beb7-5857-4685-be1f-d57550cc96cc">false</CrawlForDependencies>
+    <HandoffToMSDN xmlns="4873beb7-5857-4685-be1f-d57550cc96cc" xsi:nil="true"/>
+    <PlannedPubDate xmlns="4873beb7-5857-4685-be1f-d57550cc96cc" xsi:nil="true"/>
+    <IntlLangReviewer xmlns="4873beb7-5857-4685-be1f-d57550cc96cc" xsi:nil="true"/>
+    <TrustLevel xmlns="4873beb7-5857-4685-be1f-d57550cc96cc">1 Microsoft Managed Content</TrustLevel>
+    <LocLastLocAttemptVersionLookup xmlns="4873beb7-5857-4685-be1f-d57550cc96cc">694266</LocLastLocAttemptVersionLookup>
+    <LocProcessedForHandoffsLookup xmlns="4873beb7-5857-4685-be1f-d57550cc96cc" xsi:nil="true"/>
+    <IsSearchable xmlns="4873beb7-5857-4685-be1f-d57550cc96cc">true</IsSearchable>
+    <TemplateTemplateType xmlns="4873beb7-5857-4685-be1f-d57550cc96cc">PowerPoint Presentation Template</TemplateTemplateType>
+    <CampaignTagsTaxHTField0 xmlns="4873beb7-5857-4685-be1f-d57550cc96cc">
+      <Terms xmlns="http://schemas.microsoft.com/office/infopath/2007/PartnerControls"/>
+    </CampaignTagsTaxHTField0>
+    <TPNamespace xmlns="4873beb7-5857-4685-be1f-d57550cc96cc" xsi:nil="true"/>
+    <LocOverallPreviewStatusLookup xmlns="4873beb7-5857-4685-be1f-d57550cc96cc" xsi:nil="true"/>
+    <TaxCatchAll xmlns="4873beb7-5857-4685-be1f-d57550cc96cc"/>
+    <Markets xmlns="4873beb7-5857-4685-be1f-d57550cc96cc"/>
+    <UAProjectedTotalWords xmlns="4873beb7-5857-4685-be1f-d57550cc96cc" xsi:nil="true"/>
+    <IntlLangReview xmlns="4873beb7-5857-4685-be1f-d57550cc96cc" xsi:nil="true"/>
+    <OutputCachingOn xmlns="4873beb7-5857-4685-be1f-d57550cc96cc">false</OutputCachingOn>
+    <AverageRating xmlns="4873beb7-5857-4685-be1f-d57550cc96cc" xsi:nil="true"/>
+    <APAuthor xmlns="4873beb7-5857-4685-be1f-d57550cc96cc">
+      <UserInfo>
+        <DisplayName>REDMOND\kristaa</DisplayName>
+        <AccountId>136</AccountId>
+        <AccountType/>
+      </UserInfo>
+    </APAuthor>
+    <LocManualTestRequired xmlns="4873beb7-5857-4685-be1f-d57550cc96cc">false</LocManualTestRequired>
+    <TPCommandLine xmlns="4873beb7-5857-4685-be1f-d57550cc96cc" xsi:nil="true"/>
+    <TPAppVersion xmlns="4873beb7-5857-4685-be1f-d57550cc96cc" xsi:nil="true"/>
+    <EditorialStatus xmlns="4873beb7-5857-4685-be1f-d57550cc96cc">Complete</EditorialStatus>
+    <LastModifiedDateTime xmlns="4873beb7-5857-4685-be1f-d57550cc96cc" xsi:nil="true"/>
+    <ScenarioTagsTaxHTField0 xmlns="4873beb7-5857-4685-be1f-d57550cc96cc">
+      <Terms xmlns="http://schemas.microsoft.com/office/infopath/2007/PartnerControls"/>
+    </ScenarioTagsTaxHTField0>
+    <LocProcessedForMarketsLookup xmlns="4873beb7-5857-4685-be1f-d57550cc96cc" xsi:nil="true"/>
+    <TPLaunchHelpLinkType xmlns="4873beb7-5857-4685-be1f-d57550cc96cc">Template</TPLaunchHelpLinkType>
+    <OriginalRelease xmlns="4873beb7-5857-4685-be1f-d57550cc96cc">15</OriginalRelease>
+    <LocalizationTagsTaxHTField0 xmlns="4873beb7-5857-4685-be1f-d57550cc96cc">
+      <Terms xmlns="http://schemas.microsoft.com/office/infopath/2007/PartnerControls"/>
+    </LocalizationTagsTaxHTField0>
+    <UACurrentWords xmlns="4873beb7-5857-4685-be1f-d57550cc96cc" xsi:nil="true"/>
+    <ArtSampleDocs xmlns="4873beb7-5857-4685-be1f-d57550cc96cc" xsi:nil="true"/>
+    <UALocRecommendation xmlns="4873beb7-5857-4685-be1f-d57550cc96cc">Localize</UALocRecommendation>
+    <Manager xmlns="4873beb7-5857-4685-be1f-d57550cc96cc" xsi:nil="true"/>
+    <LocOverallHandbackStatusLookup xmlns="4873beb7-5857-4685-be1f-d57550cc96cc" xsi:nil="true"/>
+    <ShowIn xmlns="4873beb7-5857-4685-be1f-d57550cc96cc">Show everywhere</ShowIn>
+    <UANotes xmlns="4873beb7-5857-4685-be1f-d57550cc96cc" xsi:nil="true"/>
+    <InternalTagsTaxHTField0 xmlns="4873beb7-5857-4685-be1f-d57550cc96cc">
+      <Terms xmlns="http://schemas.microsoft.com/office/infopath/2007/PartnerControls"/>
+    </InternalTagsTaxHTField0>
+    <CSXHash xmlns="4873beb7-5857-4685-be1f-d57550cc96cc" xsi:nil="true"/>
+    <VoteCount xmlns="4873beb7-5857-4685-be1f-d57550cc96cc" xsi:nil="true"/>
+    <AssetExpire xmlns="4873beb7-5857-4685-be1f-d57550cc96cc">2029-05-12T07:00:00+00:00</AssetExpire>
+    <DSATActionTaken xmlns="4873beb7-5857-4685-be1f-d57550cc96cc" xsi:nil="true"/>
+    <CSXSubmissionMarket xmlns="4873beb7-5857-4685-be1f-d57550cc96cc" xsi:nil="true"/>
+    <LocMarketGroupTiers2 xmlns="4873beb7-5857-4685-be1f-d57550cc96cc" xsi:nil="true"/>
+  </documentManagement>
+</p:properties>
 </file>
 
 <file path=customXml/itemProps1.xml><?xml version="1.0" encoding="utf-8"?>
-<ds:datastoreItem xmlns:ds="http://schemas.openxmlformats.org/officeDocument/2006/customXml" ds:itemID="{60C67BEE-D13F-4BD2-98A5-34D8A0977F68}">
+<ds:datastoreItem xmlns:ds="http://schemas.openxmlformats.org/officeDocument/2006/customXml" ds:itemID="{3836F65B-1B07-41EE-A0E8-BC6EF3855225}">
   <ds:schemaRefs>
-    <ds:schemaRef ds:uri="4873beb7-5857-4685-be1f-d57550cc96cc"/>
-    <ds:schemaRef ds:uri="http://schemas.openxmlformats.org/package/2006/metadata/core-properties"/>
-    <ds:schemaRef ds:uri="http://purl.org/dc/terms/"/>
-    <ds:schemaRef ds:uri="http://schemas.microsoft.com/office/2006/documentManagement/types"/>
-    <ds:schemaRef ds:uri="http://purl.org/dc/elements/1.1/"/>
-    <ds:schemaRef ds:uri="http://schemas.microsoft.com/office/2006/metadata/properties"/>
-    <ds:schemaRef ds:uri="http://schemas.microsoft.com/office/infopath/2007/PartnerControls"/>
-    <ds:schemaRef ds:uri="http://www.w3.org/XML/1998/namespace"/>
-    <ds:schemaRef ds:uri="http://purl.org/dc/dcmitype/"/>
+    <ds:schemaRef ds:uri="http://schemas.microsoft.com/sharepoint/v3/contenttype/forms"/>
   </ds:schemaRefs>
 </ds:datastoreItem>
 </file>
@@ -12420,9 +13461,17 @@
 </file>
 
 <file path=customXml/itemProps3.xml><?xml version="1.0" encoding="utf-8"?>
-<ds:datastoreItem xmlns:ds="http://schemas.openxmlformats.org/officeDocument/2006/customXml" ds:itemID="{3836F65B-1B07-41EE-A0E8-BC6EF3855225}">
+<ds:datastoreItem xmlns:ds="http://schemas.openxmlformats.org/officeDocument/2006/customXml" ds:itemID="{60C67BEE-D13F-4BD2-98A5-34D8A0977F68}">
   <ds:schemaRefs>
-    <ds:schemaRef ds:uri="http://schemas.microsoft.com/sharepoint/v3/contenttype/forms"/>
+    <ds:schemaRef ds:uri="4873beb7-5857-4685-be1f-d57550cc96cc"/>
+    <ds:schemaRef ds:uri="http://schemas.openxmlformats.org/package/2006/metadata/core-properties"/>
+    <ds:schemaRef ds:uri="http://purl.org/dc/terms/"/>
+    <ds:schemaRef ds:uri="http://schemas.microsoft.com/office/2006/documentManagement/types"/>
+    <ds:schemaRef ds:uri="http://purl.org/dc/elements/1.1/"/>
+    <ds:schemaRef ds:uri="http://schemas.microsoft.com/office/2006/metadata/properties"/>
+    <ds:schemaRef ds:uri="http://schemas.microsoft.com/office/infopath/2007/PartnerControls"/>
+    <ds:schemaRef ds:uri="http://www.w3.org/XML/1998/namespace"/>
+    <ds:schemaRef ds:uri="http://purl.org/dc/dcmitype/"/>
   </ds:schemaRefs>
 </ds:datastoreItem>
 </file>
</xml_diff>